<commit_message>
Modified the plots of AURC in the manuscript
</commit_message>
<xml_diff>
--- a/Manuscript/Figures/AURC_EFFCI06.pptx
+++ b/Manuscript/Figures/AURC_EFFCI06.pptx
@@ -6,6 +6,7 @@
   </p:sldMasterIdLst>
   <p:sldIdLst>
     <p:sldId id="259" r:id="rId2"/>
+    <p:sldId id="260" r:id="rId3"/>
   </p:sldIdLst>
   <p:sldSz cx="6119813" cy="5400675"/>
   <p:notesSz cx="6858000" cy="9144000"/>
@@ -115,7 +116,7 @@
 <file path=ppt/revisionInfo.xml><?xml version="1.0" encoding="utf-8"?>
 <p1510:revInfo xmlns:a="http://schemas.openxmlformats.org/drawingml/2006/main" xmlns:r="http://schemas.openxmlformats.org/officeDocument/2006/relationships" xmlns:p1510="http://schemas.microsoft.com/office/powerpoint/2015/10/main">
   <p1510:revLst>
-    <p1510:client id="{AEACF5B8-E1B8-484D-AA65-19A39BABB57B}" v="29" dt="2022-01-18T16:34:11.502"/>
+    <p1510:client id="{AEACF5B8-E1B8-484D-AA65-19A39BABB57B}" v="32" dt="2022-01-18T17:12:02.653"/>
   </p1510:revLst>
 </p1510:revInfo>
 </file>
@@ -124,13 +125,13 @@
 <pc:chgInfo xmlns:a="http://schemas.openxmlformats.org/drawingml/2006/main" xmlns:r="http://schemas.openxmlformats.org/officeDocument/2006/relationships" xmlns:ac="http://schemas.microsoft.com/office/drawing/2013/main/command" xmlns:pc="http://schemas.microsoft.com/office/powerpoint/2013/main/command">
   <pc:docChgLst>
     <pc:chgData name="Fatima Pillosu" userId="a6295d4dc9e22643" providerId="LiveId" clId="{AEACF5B8-E1B8-484D-AA65-19A39BABB57B}"/>
-    <pc:docChg chg="undo redo custSel delSld modSld">
-      <pc:chgData name="Fatima Pillosu" userId="a6295d4dc9e22643" providerId="LiveId" clId="{AEACF5B8-E1B8-484D-AA65-19A39BABB57B}" dt="2022-01-18T16:39:47.242" v="560" actId="167"/>
+    <pc:docChg chg="undo redo custSel addSld delSld modSld">
+      <pc:chgData name="Fatima Pillosu" userId="a6295d4dc9e22643" providerId="LiveId" clId="{AEACF5B8-E1B8-484D-AA65-19A39BABB57B}" dt="2022-01-18T17:12:56.461" v="625" actId="1076"/>
       <pc:docMkLst>
         <pc:docMk/>
       </pc:docMkLst>
       <pc:sldChg chg="addSp delSp modSp mod">
-        <pc:chgData name="Fatima Pillosu" userId="a6295d4dc9e22643" providerId="LiveId" clId="{AEACF5B8-E1B8-484D-AA65-19A39BABB57B}" dt="2022-01-18T16:39:47.242" v="560" actId="167"/>
+        <pc:chgData name="Fatima Pillosu" userId="a6295d4dc9e22643" providerId="LiveId" clId="{AEACF5B8-E1B8-484D-AA65-19A39BABB57B}" dt="2022-01-18T17:12:56.461" v="625" actId="1076"/>
         <pc:sldMkLst>
           <pc:docMk/>
           <pc:sldMk cId="1489261767" sldId="259"/>
@@ -159,8 +160,8 @@
             <ac:spMk id="4" creationId="{6658AA8B-9FBA-437F-A3A9-6BE46CFC77E0}"/>
           </ac:spMkLst>
         </pc:spChg>
-        <pc:spChg chg="add mod ord">
-          <ac:chgData name="Fatima Pillosu" userId="a6295d4dc9e22643" providerId="LiveId" clId="{AEACF5B8-E1B8-484D-AA65-19A39BABB57B}" dt="2022-01-18T16:39:47.242" v="560" actId="167"/>
+        <pc:spChg chg="add del mod ord">
+          <ac:chgData name="Fatima Pillosu" userId="a6295d4dc9e22643" providerId="LiveId" clId="{AEACF5B8-E1B8-484D-AA65-19A39BABB57B}" dt="2022-01-18T17:09:57.788" v="562" actId="478"/>
           <ac:spMkLst>
             <pc:docMk/>
             <pc:sldMk cId="1489261767" sldId="259"/>
@@ -240,15 +241,15 @@
           </ac:spMkLst>
         </pc:spChg>
         <pc:spChg chg="add mod">
-          <ac:chgData name="Fatima Pillosu" userId="a6295d4dc9e22643" providerId="LiveId" clId="{AEACF5B8-E1B8-484D-AA65-19A39BABB57B}" dt="2022-01-18T15:50:12.137" v="356" actId="1036"/>
+          <ac:chgData name="Fatima Pillosu" userId="a6295d4dc9e22643" providerId="LiveId" clId="{AEACF5B8-E1B8-484D-AA65-19A39BABB57B}" dt="2022-01-18T17:12:56.461" v="625" actId="1076"/>
           <ac:spMkLst>
             <pc:docMk/>
             <pc:sldMk cId="1489261767" sldId="259"/>
             <ac:spMk id="59" creationId="{EDB8C1D3-804C-4636-B781-F3F8431A369B}"/>
           </ac:spMkLst>
         </pc:spChg>
-        <pc:spChg chg="add mod">
-          <ac:chgData name="Fatima Pillosu" userId="a6295d4dc9e22643" providerId="LiveId" clId="{AEACF5B8-E1B8-484D-AA65-19A39BABB57B}" dt="2022-01-18T16:31:17.211" v="507" actId="1036"/>
+        <pc:spChg chg="add del mod">
+          <ac:chgData name="Fatima Pillosu" userId="a6295d4dc9e22643" providerId="LiveId" clId="{AEACF5B8-E1B8-484D-AA65-19A39BABB57B}" dt="2022-01-18T17:09:57.788" v="562" actId="478"/>
           <ac:spMkLst>
             <pc:docMk/>
             <pc:sldMk cId="1489261767" sldId="259"/>
@@ -280,7 +281,23 @@
           </ac:spMkLst>
         </pc:spChg>
         <pc:spChg chg="add mod">
-          <ac:chgData name="Fatima Pillosu" userId="a6295d4dc9e22643" providerId="LiveId" clId="{AEACF5B8-E1B8-484D-AA65-19A39BABB57B}" dt="2022-01-18T15:50:12.137" v="356" actId="1036"/>
+          <ac:chgData name="Fatima Pillosu" userId="a6295d4dc9e22643" providerId="LiveId" clId="{AEACF5B8-E1B8-484D-AA65-19A39BABB57B}" dt="2022-01-18T17:12:45.474" v="623" actId="1076"/>
+          <ac:spMkLst>
+            <pc:docMk/>
+            <pc:sldMk cId="1489261767" sldId="259"/>
+            <ac:spMk id="73" creationId="{C1D12DF9-87B0-4222-A6B9-241033479852}"/>
+          </ac:spMkLst>
+        </pc:spChg>
+        <pc:spChg chg="add mod">
+          <ac:chgData name="Fatima Pillosu" userId="a6295d4dc9e22643" providerId="LiveId" clId="{AEACF5B8-E1B8-484D-AA65-19A39BABB57B}" dt="2022-01-18T17:12:12.929" v="609" actId="14100"/>
+          <ac:spMkLst>
+            <pc:docMk/>
+            <pc:sldMk cId="1489261767" sldId="259"/>
+            <ac:spMk id="74" creationId="{731D2FA9-E557-41FD-8400-9864995A64F0}"/>
+          </ac:spMkLst>
+        </pc:spChg>
+        <pc:spChg chg="add del mod">
+          <ac:chgData name="Fatima Pillosu" userId="a6295d4dc9e22643" providerId="LiveId" clId="{AEACF5B8-E1B8-484D-AA65-19A39BABB57B}" dt="2022-01-18T17:09:57.788" v="562" actId="478"/>
           <ac:spMkLst>
             <pc:docMk/>
             <pc:sldMk cId="1489261767" sldId="259"/>
@@ -303,32 +320,32 @@
             <ac:spMk id="84" creationId="{DCA229DB-8991-4C74-A0F1-F0C1F1931148}"/>
           </ac:spMkLst>
         </pc:spChg>
-        <pc:spChg chg="add mod">
-          <ac:chgData name="Fatima Pillosu" userId="a6295d4dc9e22643" providerId="LiveId" clId="{AEACF5B8-E1B8-484D-AA65-19A39BABB57B}" dt="2022-01-18T15:50:12.137" v="356" actId="1036"/>
+        <pc:spChg chg="add del mod">
+          <ac:chgData name="Fatima Pillosu" userId="a6295d4dc9e22643" providerId="LiveId" clId="{AEACF5B8-E1B8-484D-AA65-19A39BABB57B}" dt="2022-01-18T17:10:04.362" v="563" actId="478"/>
           <ac:spMkLst>
             <pc:docMk/>
             <pc:sldMk cId="1489261767" sldId="259"/>
             <ac:spMk id="85" creationId="{0249158A-4189-483C-8D72-5DD69FC3D3B2}"/>
           </ac:spMkLst>
         </pc:spChg>
-        <pc:spChg chg="add mod">
-          <ac:chgData name="Fatima Pillosu" userId="a6295d4dc9e22643" providerId="LiveId" clId="{AEACF5B8-E1B8-484D-AA65-19A39BABB57B}" dt="2022-01-18T15:50:12.137" v="356" actId="1036"/>
+        <pc:spChg chg="add del mod">
+          <ac:chgData name="Fatima Pillosu" userId="a6295d4dc9e22643" providerId="LiveId" clId="{AEACF5B8-E1B8-484D-AA65-19A39BABB57B}" dt="2022-01-18T17:10:04.362" v="563" actId="478"/>
           <ac:spMkLst>
             <pc:docMk/>
             <pc:sldMk cId="1489261767" sldId="259"/>
             <ac:spMk id="86" creationId="{9E48FFDA-5009-456E-AB67-6011D65FD542}"/>
           </ac:spMkLst>
         </pc:spChg>
-        <pc:spChg chg="add mod">
-          <ac:chgData name="Fatima Pillosu" userId="a6295d4dc9e22643" providerId="LiveId" clId="{AEACF5B8-E1B8-484D-AA65-19A39BABB57B}" dt="2022-01-18T15:50:12.137" v="356" actId="1036"/>
+        <pc:spChg chg="add del mod">
+          <ac:chgData name="Fatima Pillosu" userId="a6295d4dc9e22643" providerId="LiveId" clId="{AEACF5B8-E1B8-484D-AA65-19A39BABB57B}" dt="2022-01-18T17:10:04.362" v="563" actId="478"/>
           <ac:spMkLst>
             <pc:docMk/>
             <pc:sldMk cId="1489261767" sldId="259"/>
             <ac:spMk id="87" creationId="{AA154F77-0799-4142-A090-A67AAC423B5D}"/>
           </ac:spMkLst>
         </pc:spChg>
-        <pc:spChg chg="add mod ord">
-          <ac:chgData name="Fatima Pillosu" userId="a6295d4dc9e22643" providerId="LiveId" clId="{AEACF5B8-E1B8-484D-AA65-19A39BABB57B}" dt="2022-01-18T16:34:01.054" v="538" actId="166"/>
+        <pc:spChg chg="add del mod ord">
+          <ac:chgData name="Fatima Pillosu" userId="a6295d4dc9e22643" providerId="LiveId" clId="{AEACF5B8-E1B8-484D-AA65-19A39BABB57B}" dt="2022-01-18T17:09:57.788" v="562" actId="478"/>
           <ac:spMkLst>
             <pc:docMk/>
             <pc:sldMk cId="1489261767" sldId="259"/>
@@ -336,7 +353,7 @@
           </ac:spMkLst>
         </pc:spChg>
         <pc:spChg chg="add mod">
-          <ac:chgData name="Fatima Pillosu" userId="a6295d4dc9e22643" providerId="LiveId" clId="{AEACF5B8-E1B8-484D-AA65-19A39BABB57B}" dt="2022-01-18T15:50:12.137" v="356" actId="1036"/>
+          <ac:chgData name="Fatima Pillosu" userId="a6295d4dc9e22643" providerId="LiveId" clId="{AEACF5B8-E1B8-484D-AA65-19A39BABB57B}" dt="2022-01-18T17:12:51.615" v="624" actId="1076"/>
           <ac:spMkLst>
             <pc:docMk/>
             <pc:sldMk cId="1489261767" sldId="259"/>
@@ -351,8 +368,8 @@
             <ac:spMk id="122" creationId="{2F7C763A-07EF-4B45-9716-3857550CF6EF}"/>
           </ac:spMkLst>
         </pc:spChg>
-        <pc:spChg chg="add mod">
-          <ac:chgData name="Fatima Pillosu" userId="a6295d4dc9e22643" providerId="LiveId" clId="{AEACF5B8-E1B8-484D-AA65-19A39BABB57B}" dt="2022-01-18T16:35:38.650" v="556" actId="14100"/>
+        <pc:spChg chg="add del mod">
+          <ac:chgData name="Fatima Pillosu" userId="a6295d4dc9e22643" providerId="LiveId" clId="{AEACF5B8-E1B8-484D-AA65-19A39BABB57B}" dt="2022-01-18T17:09:57.788" v="562" actId="478"/>
           <ac:spMkLst>
             <pc:docMk/>
             <pc:sldMk cId="1489261767" sldId="259"/>
@@ -391,6 +408,38 @@
             <ac:spMk id="161" creationId="{91D08E8B-4E44-4400-9BC5-3BD9EF49592E}"/>
           </ac:spMkLst>
         </pc:spChg>
+        <pc:picChg chg="add mod modCrop">
+          <ac:chgData name="Fatima Pillosu" userId="a6295d4dc9e22643" providerId="LiveId" clId="{AEACF5B8-E1B8-484D-AA65-19A39BABB57B}" dt="2022-01-18T17:12:39.514" v="622" actId="1038"/>
+          <ac:picMkLst>
+            <pc:docMk/>
+            <pc:sldMk cId="1489261767" sldId="259"/>
+            <ac:picMk id="3" creationId="{AA2AE781-3369-4FEB-9AFD-D06BB5047BFC}"/>
+          </ac:picMkLst>
+        </pc:picChg>
+        <pc:picChg chg="add mod modCrop">
+          <ac:chgData name="Fatima Pillosu" userId="a6295d4dc9e22643" providerId="LiveId" clId="{AEACF5B8-E1B8-484D-AA65-19A39BABB57B}" dt="2022-01-18T17:12:39.514" v="622" actId="1038"/>
+          <ac:picMkLst>
+            <pc:docMk/>
+            <pc:sldMk cId="1489261767" sldId="259"/>
+            <ac:picMk id="5" creationId="{647CB8AE-FCBA-4B1B-8002-42FD30E3A189}"/>
+          </ac:picMkLst>
+        </pc:picChg>
+        <pc:picChg chg="add mod modCrop">
+          <ac:chgData name="Fatima Pillosu" userId="a6295d4dc9e22643" providerId="LiveId" clId="{AEACF5B8-E1B8-484D-AA65-19A39BABB57B}" dt="2022-01-18T17:12:39.514" v="622" actId="1038"/>
+          <ac:picMkLst>
+            <pc:docMk/>
+            <pc:sldMk cId="1489261767" sldId="259"/>
+            <ac:picMk id="7" creationId="{C5D75D13-E7EE-4CAA-8EE6-75C55E3EABCC}"/>
+          </ac:picMkLst>
+        </pc:picChg>
+        <pc:picChg chg="add mod modCrop">
+          <ac:chgData name="Fatima Pillosu" userId="a6295d4dc9e22643" providerId="LiveId" clId="{AEACF5B8-E1B8-484D-AA65-19A39BABB57B}" dt="2022-01-18T17:12:39.514" v="622" actId="1038"/>
+          <ac:picMkLst>
+            <pc:docMk/>
+            <pc:sldMk cId="1489261767" sldId="259"/>
+            <ac:picMk id="9" creationId="{9D6BA245-8585-4D56-B1A9-2CA927A6C293}"/>
+          </ac:picMkLst>
+        </pc:picChg>
         <pc:picChg chg="del mod">
           <ac:chgData name="Fatima Pillosu" userId="a6295d4dc9e22643" providerId="LiveId" clId="{AEACF5B8-E1B8-484D-AA65-19A39BABB57B}" dt="2022-01-18T15:49:48.420" v="351" actId="21"/>
           <ac:picMkLst>
@@ -415,8 +464,8 @@
             <ac:picMk id="43" creationId="{D218246B-01E4-4C08-9D41-DB884FC7028F}"/>
           </ac:picMkLst>
         </pc:picChg>
-        <pc:picChg chg="add mod">
-          <ac:chgData name="Fatima Pillosu" userId="a6295d4dc9e22643" providerId="LiveId" clId="{AEACF5B8-E1B8-484D-AA65-19A39BABB57B}" dt="2022-01-18T15:50:12.137" v="356" actId="1036"/>
+        <pc:picChg chg="add del mod">
+          <ac:chgData name="Fatima Pillosu" userId="a6295d4dc9e22643" providerId="LiveId" clId="{AEACF5B8-E1B8-484D-AA65-19A39BABB57B}" dt="2022-01-18T17:10:05.970" v="565" actId="478"/>
           <ac:picMkLst>
             <pc:docMk/>
             <pc:sldMk cId="1489261767" sldId="259"/>
@@ -431,24 +480,24 @@
             <ac:picMk id="57" creationId="{38C701DB-1B3C-44A2-B715-7645338A51AD}"/>
           </ac:picMkLst>
         </pc:picChg>
-        <pc:picChg chg="add mod">
-          <ac:chgData name="Fatima Pillosu" userId="a6295d4dc9e22643" providerId="LiveId" clId="{AEACF5B8-E1B8-484D-AA65-19A39BABB57B}" dt="2022-01-18T15:50:12.137" v="356" actId="1036"/>
+        <pc:picChg chg="add del mod">
+          <ac:chgData name="Fatima Pillosu" userId="a6295d4dc9e22643" providerId="LiveId" clId="{AEACF5B8-E1B8-484D-AA65-19A39BABB57B}" dt="2022-01-18T17:10:05.481" v="564" actId="478"/>
           <ac:picMkLst>
             <pc:docMk/>
             <pc:sldMk cId="1489261767" sldId="259"/>
             <ac:picMk id="58" creationId="{6BDD4B2C-0287-4AB0-9F5C-4E24A08845F8}"/>
           </ac:picMkLst>
         </pc:picChg>
-        <pc:picChg chg="add mod">
-          <ac:chgData name="Fatima Pillosu" userId="a6295d4dc9e22643" providerId="LiveId" clId="{AEACF5B8-E1B8-484D-AA65-19A39BABB57B}" dt="2022-01-18T15:50:12.137" v="356" actId="1036"/>
+        <pc:picChg chg="add del mod">
+          <ac:chgData name="Fatima Pillosu" userId="a6295d4dc9e22643" providerId="LiveId" clId="{AEACF5B8-E1B8-484D-AA65-19A39BABB57B}" dt="2022-01-18T17:09:57.788" v="562" actId="478"/>
           <ac:picMkLst>
             <pc:docMk/>
             <pc:sldMk cId="1489261767" sldId="259"/>
             <ac:picMk id="61" creationId="{15681698-39BD-4815-B989-535604F83C98}"/>
           </ac:picMkLst>
         </pc:picChg>
-        <pc:picChg chg="add mod">
-          <ac:chgData name="Fatima Pillosu" userId="a6295d4dc9e22643" providerId="LiveId" clId="{AEACF5B8-E1B8-484D-AA65-19A39BABB57B}" dt="2022-01-18T15:50:12.137" v="356" actId="1036"/>
+        <pc:picChg chg="add del mod">
+          <ac:chgData name="Fatima Pillosu" userId="a6295d4dc9e22643" providerId="LiveId" clId="{AEACF5B8-E1B8-484D-AA65-19A39BABB57B}" dt="2022-01-18T17:09:57.788" v="562" actId="478"/>
           <ac:picMkLst>
             <pc:docMk/>
             <pc:sldMk cId="1489261767" sldId="259"/>
@@ -496,343 +545,343 @@
           </ac:cxnSpMkLst>
         </pc:cxnChg>
         <pc:cxnChg chg="add del mod ord">
-          <ac:chgData name="Fatima Pillosu" userId="a6295d4dc9e22643" providerId="LiveId" clId="{AEACF5B8-E1B8-484D-AA65-19A39BABB57B}" dt="2022-01-18T16:39:47.242" v="560" actId="167"/>
+          <ac:chgData name="Fatima Pillosu" userId="a6295d4dc9e22643" providerId="LiveId" clId="{AEACF5B8-E1B8-484D-AA65-19A39BABB57B}" dt="2022-01-18T17:09:57.788" v="562" actId="478"/>
           <ac:cxnSpMkLst>
             <pc:docMk/>
             <pc:sldMk cId="1489261767" sldId="259"/>
             <ac:cxnSpMk id="90" creationId="{345F1F1F-24FA-4369-9630-5A3B8D20A985}"/>
           </ac:cxnSpMkLst>
         </pc:cxnChg>
-        <pc:cxnChg chg="add mod ord">
-          <ac:chgData name="Fatima Pillosu" userId="a6295d4dc9e22643" providerId="LiveId" clId="{AEACF5B8-E1B8-484D-AA65-19A39BABB57B}" dt="2022-01-18T16:39:47.242" v="560" actId="167"/>
+        <pc:cxnChg chg="add del mod ord">
+          <ac:chgData name="Fatima Pillosu" userId="a6295d4dc9e22643" providerId="LiveId" clId="{AEACF5B8-E1B8-484D-AA65-19A39BABB57B}" dt="2022-01-18T17:09:57.788" v="562" actId="478"/>
           <ac:cxnSpMkLst>
             <pc:docMk/>
             <pc:sldMk cId="1489261767" sldId="259"/>
             <ac:cxnSpMk id="91" creationId="{52DA2BFD-9BF9-4C18-8459-5FED50E88395}"/>
           </ac:cxnSpMkLst>
         </pc:cxnChg>
-        <pc:cxnChg chg="add mod ord">
-          <ac:chgData name="Fatima Pillosu" userId="a6295d4dc9e22643" providerId="LiveId" clId="{AEACF5B8-E1B8-484D-AA65-19A39BABB57B}" dt="2022-01-18T16:39:47.242" v="560" actId="167"/>
+        <pc:cxnChg chg="add del mod ord">
+          <ac:chgData name="Fatima Pillosu" userId="a6295d4dc9e22643" providerId="LiveId" clId="{AEACF5B8-E1B8-484D-AA65-19A39BABB57B}" dt="2022-01-18T17:09:57.788" v="562" actId="478"/>
           <ac:cxnSpMkLst>
             <pc:docMk/>
             <pc:sldMk cId="1489261767" sldId="259"/>
             <ac:cxnSpMk id="92" creationId="{A3E60E95-8A56-4184-B513-1C0DF77ED817}"/>
           </ac:cxnSpMkLst>
         </pc:cxnChg>
-        <pc:cxnChg chg="add mod ord">
-          <ac:chgData name="Fatima Pillosu" userId="a6295d4dc9e22643" providerId="LiveId" clId="{AEACF5B8-E1B8-484D-AA65-19A39BABB57B}" dt="2022-01-18T16:39:47.242" v="560" actId="167"/>
+        <pc:cxnChg chg="add del mod ord">
+          <ac:chgData name="Fatima Pillosu" userId="a6295d4dc9e22643" providerId="LiveId" clId="{AEACF5B8-E1B8-484D-AA65-19A39BABB57B}" dt="2022-01-18T17:09:57.788" v="562" actId="478"/>
           <ac:cxnSpMkLst>
             <pc:docMk/>
             <pc:sldMk cId="1489261767" sldId="259"/>
             <ac:cxnSpMk id="93" creationId="{E0F7B734-A084-40C4-A161-F2293A25C0C6}"/>
           </ac:cxnSpMkLst>
         </pc:cxnChg>
-        <pc:cxnChg chg="add mod ord">
-          <ac:chgData name="Fatima Pillosu" userId="a6295d4dc9e22643" providerId="LiveId" clId="{AEACF5B8-E1B8-484D-AA65-19A39BABB57B}" dt="2022-01-18T16:39:47.242" v="560" actId="167"/>
+        <pc:cxnChg chg="add del mod ord">
+          <ac:chgData name="Fatima Pillosu" userId="a6295d4dc9e22643" providerId="LiveId" clId="{AEACF5B8-E1B8-484D-AA65-19A39BABB57B}" dt="2022-01-18T17:09:57.788" v="562" actId="478"/>
           <ac:cxnSpMkLst>
             <pc:docMk/>
             <pc:sldMk cId="1489261767" sldId="259"/>
             <ac:cxnSpMk id="94" creationId="{FD4C843F-CBA6-4B85-8F30-AC99A328A9AD}"/>
           </ac:cxnSpMkLst>
         </pc:cxnChg>
-        <pc:cxnChg chg="add mod ord">
-          <ac:chgData name="Fatima Pillosu" userId="a6295d4dc9e22643" providerId="LiveId" clId="{AEACF5B8-E1B8-484D-AA65-19A39BABB57B}" dt="2022-01-18T16:39:47.242" v="560" actId="167"/>
+        <pc:cxnChg chg="add del mod ord">
+          <ac:chgData name="Fatima Pillosu" userId="a6295d4dc9e22643" providerId="LiveId" clId="{AEACF5B8-E1B8-484D-AA65-19A39BABB57B}" dt="2022-01-18T17:09:57.788" v="562" actId="478"/>
           <ac:cxnSpMkLst>
             <pc:docMk/>
             <pc:sldMk cId="1489261767" sldId="259"/>
             <ac:cxnSpMk id="95" creationId="{7C0D8D8F-105D-4715-9519-65344A7B6C43}"/>
           </ac:cxnSpMkLst>
         </pc:cxnChg>
-        <pc:cxnChg chg="add mod ord">
-          <ac:chgData name="Fatima Pillosu" userId="a6295d4dc9e22643" providerId="LiveId" clId="{AEACF5B8-E1B8-484D-AA65-19A39BABB57B}" dt="2022-01-18T16:39:47.242" v="560" actId="167"/>
+        <pc:cxnChg chg="add del mod ord">
+          <ac:chgData name="Fatima Pillosu" userId="a6295d4dc9e22643" providerId="LiveId" clId="{AEACF5B8-E1B8-484D-AA65-19A39BABB57B}" dt="2022-01-18T17:09:57.788" v="562" actId="478"/>
           <ac:cxnSpMkLst>
             <pc:docMk/>
             <pc:sldMk cId="1489261767" sldId="259"/>
             <ac:cxnSpMk id="96" creationId="{792482D7-B865-4B40-AB03-1758A58AB4EC}"/>
           </ac:cxnSpMkLst>
         </pc:cxnChg>
-        <pc:cxnChg chg="add mod ord">
-          <ac:chgData name="Fatima Pillosu" userId="a6295d4dc9e22643" providerId="LiveId" clId="{AEACF5B8-E1B8-484D-AA65-19A39BABB57B}" dt="2022-01-18T16:39:47.242" v="560" actId="167"/>
+        <pc:cxnChg chg="add del mod ord">
+          <ac:chgData name="Fatima Pillosu" userId="a6295d4dc9e22643" providerId="LiveId" clId="{AEACF5B8-E1B8-484D-AA65-19A39BABB57B}" dt="2022-01-18T17:09:57.788" v="562" actId="478"/>
           <ac:cxnSpMkLst>
             <pc:docMk/>
             <pc:sldMk cId="1489261767" sldId="259"/>
             <ac:cxnSpMk id="97" creationId="{54845AC9-C388-4EEB-9596-1482E6E726C2}"/>
           </ac:cxnSpMkLst>
         </pc:cxnChg>
-        <pc:cxnChg chg="add mod ord">
-          <ac:chgData name="Fatima Pillosu" userId="a6295d4dc9e22643" providerId="LiveId" clId="{AEACF5B8-E1B8-484D-AA65-19A39BABB57B}" dt="2022-01-18T16:39:47.242" v="560" actId="167"/>
+        <pc:cxnChg chg="add del mod ord">
+          <ac:chgData name="Fatima Pillosu" userId="a6295d4dc9e22643" providerId="LiveId" clId="{AEACF5B8-E1B8-484D-AA65-19A39BABB57B}" dt="2022-01-18T17:09:57.788" v="562" actId="478"/>
           <ac:cxnSpMkLst>
             <pc:docMk/>
             <pc:sldMk cId="1489261767" sldId="259"/>
             <ac:cxnSpMk id="98" creationId="{DEB542EE-EDEE-47FA-8E4A-511401D672FA}"/>
           </ac:cxnSpMkLst>
         </pc:cxnChg>
-        <pc:cxnChg chg="add mod ord">
-          <ac:chgData name="Fatima Pillosu" userId="a6295d4dc9e22643" providerId="LiveId" clId="{AEACF5B8-E1B8-484D-AA65-19A39BABB57B}" dt="2022-01-18T16:39:47.242" v="560" actId="167"/>
+        <pc:cxnChg chg="add del mod ord">
+          <ac:chgData name="Fatima Pillosu" userId="a6295d4dc9e22643" providerId="LiveId" clId="{AEACF5B8-E1B8-484D-AA65-19A39BABB57B}" dt="2022-01-18T17:09:57.788" v="562" actId="478"/>
           <ac:cxnSpMkLst>
             <pc:docMk/>
             <pc:sldMk cId="1489261767" sldId="259"/>
             <ac:cxnSpMk id="99" creationId="{B174E479-DB75-4CBC-B336-7A04FB2ACFD8}"/>
           </ac:cxnSpMkLst>
         </pc:cxnChg>
-        <pc:cxnChg chg="add mod ord">
-          <ac:chgData name="Fatima Pillosu" userId="a6295d4dc9e22643" providerId="LiveId" clId="{AEACF5B8-E1B8-484D-AA65-19A39BABB57B}" dt="2022-01-18T16:39:47.242" v="560" actId="167"/>
+        <pc:cxnChg chg="add del mod ord">
+          <ac:chgData name="Fatima Pillosu" userId="a6295d4dc9e22643" providerId="LiveId" clId="{AEACF5B8-E1B8-484D-AA65-19A39BABB57B}" dt="2022-01-18T17:09:57.788" v="562" actId="478"/>
           <ac:cxnSpMkLst>
             <pc:docMk/>
             <pc:sldMk cId="1489261767" sldId="259"/>
             <ac:cxnSpMk id="100" creationId="{A0110D80-B1AD-45EB-AB8D-9EC44C439428}"/>
           </ac:cxnSpMkLst>
         </pc:cxnChg>
-        <pc:cxnChg chg="add mod ord">
-          <ac:chgData name="Fatima Pillosu" userId="a6295d4dc9e22643" providerId="LiveId" clId="{AEACF5B8-E1B8-484D-AA65-19A39BABB57B}" dt="2022-01-18T16:39:47.242" v="560" actId="167"/>
+        <pc:cxnChg chg="add del mod ord">
+          <ac:chgData name="Fatima Pillosu" userId="a6295d4dc9e22643" providerId="LiveId" clId="{AEACF5B8-E1B8-484D-AA65-19A39BABB57B}" dt="2022-01-18T17:09:57.788" v="562" actId="478"/>
           <ac:cxnSpMkLst>
             <pc:docMk/>
             <pc:sldMk cId="1489261767" sldId="259"/>
             <ac:cxnSpMk id="101" creationId="{0EE6CF00-665A-4C6E-AA69-E6921082FAF5}"/>
           </ac:cxnSpMkLst>
         </pc:cxnChg>
-        <pc:cxnChg chg="add mod ord">
-          <ac:chgData name="Fatima Pillosu" userId="a6295d4dc9e22643" providerId="LiveId" clId="{AEACF5B8-E1B8-484D-AA65-19A39BABB57B}" dt="2022-01-18T16:39:47.242" v="560" actId="167"/>
+        <pc:cxnChg chg="add del mod ord">
+          <ac:chgData name="Fatima Pillosu" userId="a6295d4dc9e22643" providerId="LiveId" clId="{AEACF5B8-E1B8-484D-AA65-19A39BABB57B}" dt="2022-01-18T17:09:57.788" v="562" actId="478"/>
           <ac:cxnSpMkLst>
             <pc:docMk/>
             <pc:sldMk cId="1489261767" sldId="259"/>
             <ac:cxnSpMk id="102" creationId="{74117661-CEC8-4490-A850-1D55A29634D4}"/>
           </ac:cxnSpMkLst>
         </pc:cxnChg>
-        <pc:cxnChg chg="add mod ord">
-          <ac:chgData name="Fatima Pillosu" userId="a6295d4dc9e22643" providerId="LiveId" clId="{AEACF5B8-E1B8-484D-AA65-19A39BABB57B}" dt="2022-01-18T16:39:47.242" v="560" actId="167"/>
+        <pc:cxnChg chg="add del mod ord">
+          <ac:chgData name="Fatima Pillosu" userId="a6295d4dc9e22643" providerId="LiveId" clId="{AEACF5B8-E1B8-484D-AA65-19A39BABB57B}" dt="2022-01-18T17:09:57.788" v="562" actId="478"/>
           <ac:cxnSpMkLst>
             <pc:docMk/>
             <pc:sldMk cId="1489261767" sldId="259"/>
             <ac:cxnSpMk id="103" creationId="{268F678A-468F-427F-BC81-0FF680BF3DA7}"/>
           </ac:cxnSpMkLst>
         </pc:cxnChg>
-        <pc:cxnChg chg="add mod ord">
-          <ac:chgData name="Fatima Pillosu" userId="a6295d4dc9e22643" providerId="LiveId" clId="{AEACF5B8-E1B8-484D-AA65-19A39BABB57B}" dt="2022-01-18T16:39:47.242" v="560" actId="167"/>
+        <pc:cxnChg chg="add del mod ord">
+          <ac:chgData name="Fatima Pillosu" userId="a6295d4dc9e22643" providerId="LiveId" clId="{AEACF5B8-E1B8-484D-AA65-19A39BABB57B}" dt="2022-01-18T17:09:57.788" v="562" actId="478"/>
           <ac:cxnSpMkLst>
             <pc:docMk/>
             <pc:sldMk cId="1489261767" sldId="259"/>
             <ac:cxnSpMk id="104" creationId="{308F3207-65D8-4CEC-9682-F1F214940F9F}"/>
           </ac:cxnSpMkLst>
         </pc:cxnChg>
-        <pc:cxnChg chg="add mod ord">
-          <ac:chgData name="Fatima Pillosu" userId="a6295d4dc9e22643" providerId="LiveId" clId="{AEACF5B8-E1B8-484D-AA65-19A39BABB57B}" dt="2022-01-18T16:39:47.242" v="560" actId="167"/>
+        <pc:cxnChg chg="add del mod ord">
+          <ac:chgData name="Fatima Pillosu" userId="a6295d4dc9e22643" providerId="LiveId" clId="{AEACF5B8-E1B8-484D-AA65-19A39BABB57B}" dt="2022-01-18T17:09:57.788" v="562" actId="478"/>
           <ac:cxnSpMkLst>
             <pc:docMk/>
             <pc:sldMk cId="1489261767" sldId="259"/>
             <ac:cxnSpMk id="105" creationId="{055DC60E-222B-4E21-BD96-9316959125E8}"/>
           </ac:cxnSpMkLst>
         </pc:cxnChg>
-        <pc:cxnChg chg="add mod ord">
-          <ac:chgData name="Fatima Pillosu" userId="a6295d4dc9e22643" providerId="LiveId" clId="{AEACF5B8-E1B8-484D-AA65-19A39BABB57B}" dt="2022-01-18T16:39:47.242" v="560" actId="167"/>
+        <pc:cxnChg chg="add del mod ord">
+          <ac:chgData name="Fatima Pillosu" userId="a6295d4dc9e22643" providerId="LiveId" clId="{AEACF5B8-E1B8-484D-AA65-19A39BABB57B}" dt="2022-01-18T17:09:57.788" v="562" actId="478"/>
           <ac:cxnSpMkLst>
             <pc:docMk/>
             <pc:sldMk cId="1489261767" sldId="259"/>
             <ac:cxnSpMk id="106" creationId="{1BCB4E40-8502-4B95-81EC-75D5B3A48AB9}"/>
           </ac:cxnSpMkLst>
         </pc:cxnChg>
-        <pc:cxnChg chg="add mod ord">
-          <ac:chgData name="Fatima Pillosu" userId="a6295d4dc9e22643" providerId="LiveId" clId="{AEACF5B8-E1B8-484D-AA65-19A39BABB57B}" dt="2022-01-18T16:39:47.242" v="560" actId="167"/>
+        <pc:cxnChg chg="add del mod ord">
+          <ac:chgData name="Fatima Pillosu" userId="a6295d4dc9e22643" providerId="LiveId" clId="{AEACF5B8-E1B8-484D-AA65-19A39BABB57B}" dt="2022-01-18T17:09:57.788" v="562" actId="478"/>
           <ac:cxnSpMkLst>
             <pc:docMk/>
             <pc:sldMk cId="1489261767" sldId="259"/>
             <ac:cxnSpMk id="107" creationId="{C280B49A-2440-4B14-AD18-466E0FD82938}"/>
           </ac:cxnSpMkLst>
         </pc:cxnChg>
-        <pc:cxnChg chg="add mod ord">
-          <ac:chgData name="Fatima Pillosu" userId="a6295d4dc9e22643" providerId="LiveId" clId="{AEACF5B8-E1B8-484D-AA65-19A39BABB57B}" dt="2022-01-18T16:39:47.242" v="560" actId="167"/>
+        <pc:cxnChg chg="add del mod ord">
+          <ac:chgData name="Fatima Pillosu" userId="a6295d4dc9e22643" providerId="LiveId" clId="{AEACF5B8-E1B8-484D-AA65-19A39BABB57B}" dt="2022-01-18T17:09:57.788" v="562" actId="478"/>
           <ac:cxnSpMkLst>
             <pc:docMk/>
             <pc:sldMk cId="1489261767" sldId="259"/>
             <ac:cxnSpMk id="108" creationId="{F7724B37-1EED-496A-AD30-4D6193E5C741}"/>
           </ac:cxnSpMkLst>
         </pc:cxnChg>
-        <pc:cxnChg chg="add mod ord">
-          <ac:chgData name="Fatima Pillosu" userId="a6295d4dc9e22643" providerId="LiveId" clId="{AEACF5B8-E1B8-484D-AA65-19A39BABB57B}" dt="2022-01-18T16:39:47.242" v="560" actId="167"/>
+        <pc:cxnChg chg="add del mod ord">
+          <ac:chgData name="Fatima Pillosu" userId="a6295d4dc9e22643" providerId="LiveId" clId="{AEACF5B8-E1B8-484D-AA65-19A39BABB57B}" dt="2022-01-18T17:09:57.788" v="562" actId="478"/>
           <ac:cxnSpMkLst>
             <pc:docMk/>
             <pc:sldMk cId="1489261767" sldId="259"/>
             <ac:cxnSpMk id="109" creationId="{0A736758-5AC6-49AC-8C0D-113BE604462C}"/>
           </ac:cxnSpMkLst>
         </pc:cxnChg>
-        <pc:cxnChg chg="add mod ord">
-          <ac:chgData name="Fatima Pillosu" userId="a6295d4dc9e22643" providerId="LiveId" clId="{AEACF5B8-E1B8-484D-AA65-19A39BABB57B}" dt="2022-01-18T16:39:47.242" v="560" actId="167"/>
+        <pc:cxnChg chg="add del mod ord">
+          <ac:chgData name="Fatima Pillosu" userId="a6295d4dc9e22643" providerId="LiveId" clId="{AEACF5B8-E1B8-484D-AA65-19A39BABB57B}" dt="2022-01-18T17:09:57.788" v="562" actId="478"/>
           <ac:cxnSpMkLst>
             <pc:docMk/>
             <pc:sldMk cId="1489261767" sldId="259"/>
             <ac:cxnSpMk id="110" creationId="{254FDB97-6209-4A63-9C0B-D77D22DB2301}"/>
           </ac:cxnSpMkLst>
         </pc:cxnChg>
-        <pc:cxnChg chg="add mod ord">
-          <ac:chgData name="Fatima Pillosu" userId="a6295d4dc9e22643" providerId="LiveId" clId="{AEACF5B8-E1B8-484D-AA65-19A39BABB57B}" dt="2022-01-18T16:39:47.242" v="560" actId="167"/>
+        <pc:cxnChg chg="add del mod ord">
+          <ac:chgData name="Fatima Pillosu" userId="a6295d4dc9e22643" providerId="LiveId" clId="{AEACF5B8-E1B8-484D-AA65-19A39BABB57B}" dt="2022-01-18T17:09:57.788" v="562" actId="478"/>
           <ac:cxnSpMkLst>
             <pc:docMk/>
             <pc:sldMk cId="1489261767" sldId="259"/>
             <ac:cxnSpMk id="111" creationId="{9E9ECBA3-A02B-430E-872F-9BF13F214215}"/>
           </ac:cxnSpMkLst>
         </pc:cxnChg>
-        <pc:cxnChg chg="add mod ord">
-          <ac:chgData name="Fatima Pillosu" userId="a6295d4dc9e22643" providerId="LiveId" clId="{AEACF5B8-E1B8-484D-AA65-19A39BABB57B}" dt="2022-01-18T16:39:47.242" v="560" actId="167"/>
+        <pc:cxnChg chg="add del mod ord">
+          <ac:chgData name="Fatima Pillosu" userId="a6295d4dc9e22643" providerId="LiveId" clId="{AEACF5B8-E1B8-484D-AA65-19A39BABB57B}" dt="2022-01-18T17:09:57.788" v="562" actId="478"/>
           <ac:cxnSpMkLst>
             <pc:docMk/>
             <pc:sldMk cId="1489261767" sldId="259"/>
             <ac:cxnSpMk id="112" creationId="{C365EFD3-7C0F-430A-996A-DDEE151103A2}"/>
           </ac:cxnSpMkLst>
         </pc:cxnChg>
-        <pc:cxnChg chg="add mod ord">
-          <ac:chgData name="Fatima Pillosu" userId="a6295d4dc9e22643" providerId="LiveId" clId="{AEACF5B8-E1B8-484D-AA65-19A39BABB57B}" dt="2022-01-18T16:39:47.242" v="560" actId="167"/>
+        <pc:cxnChg chg="add del mod ord">
+          <ac:chgData name="Fatima Pillosu" userId="a6295d4dc9e22643" providerId="LiveId" clId="{AEACF5B8-E1B8-484D-AA65-19A39BABB57B}" dt="2022-01-18T17:09:57.788" v="562" actId="478"/>
           <ac:cxnSpMkLst>
             <pc:docMk/>
             <pc:sldMk cId="1489261767" sldId="259"/>
             <ac:cxnSpMk id="113" creationId="{67FC9C21-CF99-4A03-87A2-CB94F23282CD}"/>
           </ac:cxnSpMkLst>
         </pc:cxnChg>
-        <pc:cxnChg chg="add mod ord">
-          <ac:chgData name="Fatima Pillosu" userId="a6295d4dc9e22643" providerId="LiveId" clId="{AEACF5B8-E1B8-484D-AA65-19A39BABB57B}" dt="2022-01-18T16:39:47.242" v="560" actId="167"/>
+        <pc:cxnChg chg="add del mod ord">
+          <ac:chgData name="Fatima Pillosu" userId="a6295d4dc9e22643" providerId="LiveId" clId="{AEACF5B8-E1B8-484D-AA65-19A39BABB57B}" dt="2022-01-18T17:09:57.788" v="562" actId="478"/>
           <ac:cxnSpMkLst>
             <pc:docMk/>
             <pc:sldMk cId="1489261767" sldId="259"/>
             <ac:cxnSpMk id="114" creationId="{E03E486F-3A32-4C9E-9AC4-A09AB0F561FF}"/>
           </ac:cxnSpMkLst>
         </pc:cxnChg>
-        <pc:cxnChg chg="add mod ord">
-          <ac:chgData name="Fatima Pillosu" userId="a6295d4dc9e22643" providerId="LiveId" clId="{AEACF5B8-E1B8-484D-AA65-19A39BABB57B}" dt="2022-01-18T16:39:47.242" v="560" actId="167"/>
+        <pc:cxnChg chg="add del mod ord">
+          <ac:chgData name="Fatima Pillosu" userId="a6295d4dc9e22643" providerId="LiveId" clId="{AEACF5B8-E1B8-484D-AA65-19A39BABB57B}" dt="2022-01-18T17:09:57.788" v="562" actId="478"/>
           <ac:cxnSpMkLst>
             <pc:docMk/>
             <pc:sldMk cId="1489261767" sldId="259"/>
             <ac:cxnSpMk id="115" creationId="{C39EEBFE-4D1E-4DFA-8F52-37FAB367DBD7}"/>
           </ac:cxnSpMkLst>
         </pc:cxnChg>
-        <pc:cxnChg chg="add mod ord">
-          <ac:chgData name="Fatima Pillosu" userId="a6295d4dc9e22643" providerId="LiveId" clId="{AEACF5B8-E1B8-484D-AA65-19A39BABB57B}" dt="2022-01-18T16:39:47.242" v="560" actId="167"/>
+        <pc:cxnChg chg="add del mod ord">
+          <ac:chgData name="Fatima Pillosu" userId="a6295d4dc9e22643" providerId="LiveId" clId="{AEACF5B8-E1B8-484D-AA65-19A39BABB57B}" dt="2022-01-18T17:09:57.788" v="562" actId="478"/>
           <ac:cxnSpMkLst>
             <pc:docMk/>
             <pc:sldMk cId="1489261767" sldId="259"/>
             <ac:cxnSpMk id="116" creationId="{316DCD4D-D2DF-45EC-9FA6-268E4BF01DC4}"/>
           </ac:cxnSpMkLst>
         </pc:cxnChg>
-        <pc:cxnChg chg="add mod ord">
-          <ac:chgData name="Fatima Pillosu" userId="a6295d4dc9e22643" providerId="LiveId" clId="{AEACF5B8-E1B8-484D-AA65-19A39BABB57B}" dt="2022-01-18T16:39:47.242" v="560" actId="167"/>
+        <pc:cxnChg chg="add del mod ord">
+          <ac:chgData name="Fatima Pillosu" userId="a6295d4dc9e22643" providerId="LiveId" clId="{AEACF5B8-E1B8-484D-AA65-19A39BABB57B}" dt="2022-01-18T17:09:57.788" v="562" actId="478"/>
           <ac:cxnSpMkLst>
             <pc:docMk/>
             <pc:sldMk cId="1489261767" sldId="259"/>
             <ac:cxnSpMk id="117" creationId="{EAEEC749-7FD3-43C0-9724-9B405773272E}"/>
           </ac:cxnSpMkLst>
         </pc:cxnChg>
-        <pc:cxnChg chg="add mod ord">
-          <ac:chgData name="Fatima Pillosu" userId="a6295d4dc9e22643" providerId="LiveId" clId="{AEACF5B8-E1B8-484D-AA65-19A39BABB57B}" dt="2022-01-18T16:39:47.242" v="560" actId="167"/>
+        <pc:cxnChg chg="add del mod ord">
+          <ac:chgData name="Fatima Pillosu" userId="a6295d4dc9e22643" providerId="LiveId" clId="{AEACF5B8-E1B8-484D-AA65-19A39BABB57B}" dt="2022-01-18T17:09:57.788" v="562" actId="478"/>
           <ac:cxnSpMkLst>
             <pc:docMk/>
             <pc:sldMk cId="1489261767" sldId="259"/>
             <ac:cxnSpMk id="118" creationId="{ACA9747F-D152-4E65-8A14-2951383A9672}"/>
           </ac:cxnSpMkLst>
         </pc:cxnChg>
-        <pc:cxnChg chg="add mod ord">
-          <ac:chgData name="Fatima Pillosu" userId="a6295d4dc9e22643" providerId="LiveId" clId="{AEACF5B8-E1B8-484D-AA65-19A39BABB57B}" dt="2022-01-18T16:39:47.242" v="560" actId="167"/>
+        <pc:cxnChg chg="add del mod ord">
+          <ac:chgData name="Fatima Pillosu" userId="a6295d4dc9e22643" providerId="LiveId" clId="{AEACF5B8-E1B8-484D-AA65-19A39BABB57B}" dt="2022-01-18T17:09:57.788" v="562" actId="478"/>
           <ac:cxnSpMkLst>
             <pc:docMk/>
             <pc:sldMk cId="1489261767" sldId="259"/>
             <ac:cxnSpMk id="119" creationId="{29CA71A9-3042-4E56-8B2A-6A1E0E9A1B8B}"/>
           </ac:cxnSpMkLst>
         </pc:cxnChg>
-        <pc:cxnChg chg="add mod ord">
-          <ac:chgData name="Fatima Pillosu" userId="a6295d4dc9e22643" providerId="LiveId" clId="{AEACF5B8-E1B8-484D-AA65-19A39BABB57B}" dt="2022-01-18T16:39:47.242" v="560" actId="167"/>
+        <pc:cxnChg chg="add del mod ord">
+          <ac:chgData name="Fatima Pillosu" userId="a6295d4dc9e22643" providerId="LiveId" clId="{AEACF5B8-E1B8-484D-AA65-19A39BABB57B}" dt="2022-01-18T17:09:57.788" v="562" actId="478"/>
           <ac:cxnSpMkLst>
             <pc:docMk/>
             <pc:sldMk cId="1489261767" sldId="259"/>
             <ac:cxnSpMk id="120" creationId="{513EE874-16CD-47BE-900D-105A02CC04CE}"/>
           </ac:cxnSpMkLst>
         </pc:cxnChg>
-        <pc:cxnChg chg="add mod ord">
-          <ac:chgData name="Fatima Pillosu" userId="a6295d4dc9e22643" providerId="LiveId" clId="{AEACF5B8-E1B8-484D-AA65-19A39BABB57B}" dt="2022-01-18T16:39:47.242" v="560" actId="167"/>
+        <pc:cxnChg chg="add del mod ord">
+          <ac:chgData name="Fatima Pillosu" userId="a6295d4dc9e22643" providerId="LiveId" clId="{AEACF5B8-E1B8-484D-AA65-19A39BABB57B}" dt="2022-01-18T17:09:57.788" v="562" actId="478"/>
           <ac:cxnSpMkLst>
             <pc:docMk/>
             <pc:sldMk cId="1489261767" sldId="259"/>
             <ac:cxnSpMk id="121" creationId="{3004E992-93FD-4AD1-90E7-783FB341BCAA}"/>
           </ac:cxnSpMkLst>
         </pc:cxnChg>
-        <pc:cxnChg chg="add mod ord">
-          <ac:chgData name="Fatima Pillosu" userId="a6295d4dc9e22643" providerId="LiveId" clId="{AEACF5B8-E1B8-484D-AA65-19A39BABB57B}" dt="2022-01-18T16:39:47.242" v="560" actId="167"/>
+        <pc:cxnChg chg="add del mod ord">
+          <ac:chgData name="Fatima Pillosu" userId="a6295d4dc9e22643" providerId="LiveId" clId="{AEACF5B8-E1B8-484D-AA65-19A39BABB57B}" dt="2022-01-18T17:09:57.788" v="562" actId="478"/>
           <ac:cxnSpMkLst>
             <pc:docMk/>
             <pc:sldMk cId="1489261767" sldId="259"/>
             <ac:cxnSpMk id="123" creationId="{4FDFC4D7-0D9C-45A8-B987-9402A73D9013}"/>
           </ac:cxnSpMkLst>
         </pc:cxnChg>
-        <pc:cxnChg chg="add mod ord">
-          <ac:chgData name="Fatima Pillosu" userId="a6295d4dc9e22643" providerId="LiveId" clId="{AEACF5B8-E1B8-484D-AA65-19A39BABB57B}" dt="2022-01-18T16:39:47.242" v="560" actId="167"/>
+        <pc:cxnChg chg="add del mod ord">
+          <ac:chgData name="Fatima Pillosu" userId="a6295d4dc9e22643" providerId="LiveId" clId="{AEACF5B8-E1B8-484D-AA65-19A39BABB57B}" dt="2022-01-18T17:09:57.788" v="562" actId="478"/>
           <ac:cxnSpMkLst>
             <pc:docMk/>
             <pc:sldMk cId="1489261767" sldId="259"/>
             <ac:cxnSpMk id="124" creationId="{DC61E9BE-7D5F-47B6-805E-1DA10895EDB6}"/>
           </ac:cxnSpMkLst>
         </pc:cxnChg>
-        <pc:cxnChg chg="add mod ord">
-          <ac:chgData name="Fatima Pillosu" userId="a6295d4dc9e22643" providerId="LiveId" clId="{AEACF5B8-E1B8-484D-AA65-19A39BABB57B}" dt="2022-01-18T16:39:47.242" v="560" actId="167"/>
+        <pc:cxnChg chg="add del mod ord">
+          <ac:chgData name="Fatima Pillosu" userId="a6295d4dc9e22643" providerId="LiveId" clId="{AEACF5B8-E1B8-484D-AA65-19A39BABB57B}" dt="2022-01-18T17:09:57.788" v="562" actId="478"/>
           <ac:cxnSpMkLst>
             <pc:docMk/>
             <pc:sldMk cId="1489261767" sldId="259"/>
             <ac:cxnSpMk id="125" creationId="{B4818C73-50B7-4001-ABEB-E7ECAA88AF8C}"/>
           </ac:cxnSpMkLst>
         </pc:cxnChg>
-        <pc:cxnChg chg="add mod ord">
-          <ac:chgData name="Fatima Pillosu" userId="a6295d4dc9e22643" providerId="LiveId" clId="{AEACF5B8-E1B8-484D-AA65-19A39BABB57B}" dt="2022-01-18T16:39:47.242" v="560" actId="167"/>
+        <pc:cxnChg chg="add del mod ord">
+          <ac:chgData name="Fatima Pillosu" userId="a6295d4dc9e22643" providerId="LiveId" clId="{AEACF5B8-E1B8-484D-AA65-19A39BABB57B}" dt="2022-01-18T17:09:57.788" v="562" actId="478"/>
           <ac:cxnSpMkLst>
             <pc:docMk/>
             <pc:sldMk cId="1489261767" sldId="259"/>
             <ac:cxnSpMk id="126" creationId="{D6EDD5C8-3336-4EA3-BD8D-9C243DDB7FBD}"/>
           </ac:cxnSpMkLst>
         </pc:cxnChg>
-        <pc:cxnChg chg="add mod ord">
-          <ac:chgData name="Fatima Pillosu" userId="a6295d4dc9e22643" providerId="LiveId" clId="{AEACF5B8-E1B8-484D-AA65-19A39BABB57B}" dt="2022-01-18T16:39:47.242" v="560" actId="167"/>
+        <pc:cxnChg chg="add del mod ord">
+          <ac:chgData name="Fatima Pillosu" userId="a6295d4dc9e22643" providerId="LiveId" clId="{AEACF5B8-E1B8-484D-AA65-19A39BABB57B}" dt="2022-01-18T17:09:57.788" v="562" actId="478"/>
           <ac:cxnSpMkLst>
             <pc:docMk/>
             <pc:sldMk cId="1489261767" sldId="259"/>
             <ac:cxnSpMk id="127" creationId="{69A33F02-114D-49FA-9DC0-E92B504966D4}"/>
           </ac:cxnSpMkLst>
         </pc:cxnChg>
-        <pc:cxnChg chg="add mod ord">
-          <ac:chgData name="Fatima Pillosu" userId="a6295d4dc9e22643" providerId="LiveId" clId="{AEACF5B8-E1B8-484D-AA65-19A39BABB57B}" dt="2022-01-18T16:39:47.242" v="560" actId="167"/>
+        <pc:cxnChg chg="add del mod ord">
+          <ac:chgData name="Fatima Pillosu" userId="a6295d4dc9e22643" providerId="LiveId" clId="{AEACF5B8-E1B8-484D-AA65-19A39BABB57B}" dt="2022-01-18T17:09:57.788" v="562" actId="478"/>
           <ac:cxnSpMkLst>
             <pc:docMk/>
             <pc:sldMk cId="1489261767" sldId="259"/>
             <ac:cxnSpMk id="128" creationId="{8301B603-9482-4ED2-8F83-76DE781BCBA1}"/>
           </ac:cxnSpMkLst>
         </pc:cxnChg>
-        <pc:cxnChg chg="add mod ord">
-          <ac:chgData name="Fatima Pillosu" userId="a6295d4dc9e22643" providerId="LiveId" clId="{AEACF5B8-E1B8-484D-AA65-19A39BABB57B}" dt="2022-01-18T16:39:47.242" v="560" actId="167"/>
+        <pc:cxnChg chg="add del mod ord">
+          <ac:chgData name="Fatima Pillosu" userId="a6295d4dc9e22643" providerId="LiveId" clId="{AEACF5B8-E1B8-484D-AA65-19A39BABB57B}" dt="2022-01-18T17:09:57.788" v="562" actId="478"/>
           <ac:cxnSpMkLst>
             <pc:docMk/>
             <pc:sldMk cId="1489261767" sldId="259"/>
             <ac:cxnSpMk id="129" creationId="{720985E9-3FD9-4AC5-A937-A35B5C0EE3DD}"/>
           </ac:cxnSpMkLst>
         </pc:cxnChg>
-        <pc:cxnChg chg="add mod ord">
-          <ac:chgData name="Fatima Pillosu" userId="a6295d4dc9e22643" providerId="LiveId" clId="{AEACF5B8-E1B8-484D-AA65-19A39BABB57B}" dt="2022-01-18T16:39:47.242" v="560" actId="167"/>
+        <pc:cxnChg chg="add del mod ord">
+          <ac:chgData name="Fatima Pillosu" userId="a6295d4dc9e22643" providerId="LiveId" clId="{AEACF5B8-E1B8-484D-AA65-19A39BABB57B}" dt="2022-01-18T17:09:57.788" v="562" actId="478"/>
           <ac:cxnSpMkLst>
             <pc:docMk/>
             <pc:sldMk cId="1489261767" sldId="259"/>
             <ac:cxnSpMk id="130" creationId="{C271842B-5A19-4B4B-8CA9-3BEF69DE3995}"/>
           </ac:cxnSpMkLst>
         </pc:cxnChg>
-        <pc:cxnChg chg="add mod ord">
-          <ac:chgData name="Fatima Pillosu" userId="a6295d4dc9e22643" providerId="LiveId" clId="{AEACF5B8-E1B8-484D-AA65-19A39BABB57B}" dt="2022-01-18T16:39:47.242" v="560" actId="167"/>
+        <pc:cxnChg chg="add del mod ord">
+          <ac:chgData name="Fatima Pillosu" userId="a6295d4dc9e22643" providerId="LiveId" clId="{AEACF5B8-E1B8-484D-AA65-19A39BABB57B}" dt="2022-01-18T17:09:57.788" v="562" actId="478"/>
           <ac:cxnSpMkLst>
             <pc:docMk/>
             <pc:sldMk cId="1489261767" sldId="259"/>
             <ac:cxnSpMk id="131" creationId="{3B78EF68-0462-4676-8BE2-F578098E6645}"/>
           </ac:cxnSpMkLst>
         </pc:cxnChg>
-        <pc:cxnChg chg="add mod ord">
-          <ac:chgData name="Fatima Pillosu" userId="a6295d4dc9e22643" providerId="LiveId" clId="{AEACF5B8-E1B8-484D-AA65-19A39BABB57B}" dt="2022-01-18T16:39:47.242" v="560" actId="167"/>
+        <pc:cxnChg chg="add del mod ord">
+          <ac:chgData name="Fatima Pillosu" userId="a6295d4dc9e22643" providerId="LiveId" clId="{AEACF5B8-E1B8-484D-AA65-19A39BABB57B}" dt="2022-01-18T17:09:57.788" v="562" actId="478"/>
           <ac:cxnSpMkLst>
             <pc:docMk/>
             <pc:sldMk cId="1489261767" sldId="259"/>
             <ac:cxnSpMk id="132" creationId="{34D9085C-5EF4-4A1C-810A-D63FD9359E76}"/>
           </ac:cxnSpMkLst>
         </pc:cxnChg>
-        <pc:cxnChg chg="add mod">
-          <ac:chgData name="Fatima Pillosu" userId="a6295d4dc9e22643" providerId="LiveId" clId="{AEACF5B8-E1B8-484D-AA65-19A39BABB57B}" dt="2022-01-18T16:33:54.301" v="537" actId="1582"/>
+        <pc:cxnChg chg="add del mod">
+          <ac:chgData name="Fatima Pillosu" userId="a6295d4dc9e22643" providerId="LiveId" clId="{AEACF5B8-E1B8-484D-AA65-19A39BABB57B}" dt="2022-01-18T17:09:57.788" v="562" actId="478"/>
           <ac:cxnSpMkLst>
             <pc:docMk/>
             <pc:sldMk cId="1489261767" sldId="259"/>
@@ -845,6 +894,13 @@
         <pc:sldMkLst>
           <pc:docMk/>
           <pc:sldMk cId="3036955875" sldId="260"/>
+        </pc:sldMkLst>
+      </pc:sldChg>
+      <pc:sldChg chg="add">
+        <pc:chgData name="Fatima Pillosu" userId="a6295d4dc9e22643" providerId="LiveId" clId="{AEACF5B8-E1B8-484D-AA65-19A39BABB57B}" dt="2022-01-18T17:09:47.785" v="561" actId="2890"/>
+        <pc:sldMkLst>
+          <pc:docMk/>
+          <pc:sldMk cId="4285056876" sldId="260"/>
         </pc:sldMkLst>
       </pc:sldChg>
     </pc:docChg>
@@ -3711,91 +3767,21 @@
           <a:chExt cx="0" cy="0"/>
         </a:xfrm>
       </p:grpSpPr>
-      <p:pic>
-        <p:nvPicPr>
-          <p:cNvPr id="55" name="Picture 54" descr="Chart&#10;&#10;Description automatically generated">
-            <a:extLst>
-              <a:ext uri="{FF2B5EF4-FFF2-40B4-BE49-F238E27FC236}">
-                <a16:creationId xmlns:a16="http://schemas.microsoft.com/office/drawing/2014/main" id="{249B8000-1A10-4146-8DE7-F408D67A99D2}"/>
-              </a:ext>
-            </a:extLst>
-          </p:cNvPr>
-          <p:cNvPicPr>
-            <a:picLocks noChangeAspect="1"/>
-          </p:cNvPicPr>
-          <p:nvPr/>
-        </p:nvPicPr>
-        <p:blipFill rotWithShape="1">
-          <a:blip r:embed="rId2">
-            <a:extLst>
-              <a:ext uri="{28A0092B-C50C-407E-A947-70E740481C1C}">
-                <a14:useLocalDpi xmlns:a14="http://schemas.microsoft.com/office/drawing/2010/main" val="0"/>
-              </a:ext>
-            </a:extLst>
-          </a:blip>
-          <a:srcRect l="6006" t="4644" r="8119"/>
-          <a:stretch/>
-        </p:blipFill>
+      <p:sp>
+        <p:nvSpPr>
+          <p:cNvPr id="59" name="TextBox 58">
+            <a:extLst>
+              <a:ext uri="{FF2B5EF4-FFF2-40B4-BE49-F238E27FC236}">
+                <a16:creationId xmlns:a16="http://schemas.microsoft.com/office/drawing/2014/main" id="{EDB8C1D3-804C-4636-B781-F3F8431A369B}"/>
+              </a:ext>
+            </a:extLst>
+          </p:cNvPr>
+          <p:cNvSpPr txBox="1"/>
+          <p:nvPr/>
+        </p:nvSpPr>
         <p:spPr>
           <a:xfrm>
-            <a:off x="3139700" y="2798797"/>
-            <a:ext cx="2880000" cy="2397531"/>
-          </a:xfrm>
-          <a:prstGeom prst="rect">
-            <a:avLst/>
-          </a:prstGeom>
-        </p:spPr>
-      </p:pic>
-      <p:pic>
-        <p:nvPicPr>
-          <p:cNvPr id="58" name="Picture 57" descr="Chart&#10;&#10;Description automatically generated">
-            <a:extLst>
-              <a:ext uri="{FF2B5EF4-FFF2-40B4-BE49-F238E27FC236}">
-                <a16:creationId xmlns:a16="http://schemas.microsoft.com/office/drawing/2014/main" id="{6BDD4B2C-0287-4AB0-9F5C-4E24A08845F8}"/>
-              </a:ext>
-            </a:extLst>
-          </p:cNvPr>
-          <p:cNvPicPr>
-            <a:picLocks noChangeAspect="1"/>
-          </p:cNvPicPr>
-          <p:nvPr/>
-        </p:nvPicPr>
-        <p:blipFill rotWithShape="1">
-          <a:blip r:embed="rId3">
-            <a:extLst>
-              <a:ext uri="{28A0092B-C50C-407E-A947-70E740481C1C}">
-                <a14:useLocalDpi xmlns:a14="http://schemas.microsoft.com/office/drawing/2010/main" val="0"/>
-              </a:ext>
-            </a:extLst>
-          </a:blip>
-          <a:srcRect l="6006" t="4644" r="8119"/>
-          <a:stretch/>
-        </p:blipFill>
-        <p:spPr>
-          <a:xfrm>
-            <a:off x="188405" y="2798797"/>
-            <a:ext cx="2880000" cy="2397531"/>
-          </a:xfrm>
-          <a:prstGeom prst="rect">
-            <a:avLst/>
-          </a:prstGeom>
-        </p:spPr>
-      </p:pic>
-      <p:sp>
-        <p:nvSpPr>
-          <p:cNvPr id="59" name="TextBox 58">
-            <a:extLst>
-              <a:ext uri="{FF2B5EF4-FFF2-40B4-BE49-F238E27FC236}">
-                <a16:creationId xmlns:a16="http://schemas.microsoft.com/office/drawing/2014/main" id="{EDB8C1D3-804C-4636-B781-F3F8431A369B}"/>
-              </a:ext>
-            </a:extLst>
-          </p:cNvPr>
-          <p:cNvSpPr txBox="1"/>
-          <p:nvPr/>
-        </p:nvSpPr>
-        <p:spPr>
-          <a:xfrm>
-            <a:off x="3369216" y="5175973"/>
+            <a:off x="3330121" y="5029497"/>
             <a:ext cx="2650484" cy="215444"/>
           </a:xfrm>
           <a:prstGeom prst="rect">
@@ -3817,92 +3803,22 @@
           </a:p>
         </p:txBody>
       </p:sp>
-      <p:pic>
-        <p:nvPicPr>
-          <p:cNvPr id="61" name="Picture 60" descr="Chart&#10;&#10;Description automatically generated">
-            <a:extLst>
-              <a:ext uri="{FF2B5EF4-FFF2-40B4-BE49-F238E27FC236}">
-                <a16:creationId xmlns:a16="http://schemas.microsoft.com/office/drawing/2014/main" id="{15681698-39BD-4815-B989-535604F83C98}"/>
-              </a:ext>
-            </a:extLst>
-          </p:cNvPr>
-          <p:cNvPicPr>
-            <a:picLocks noChangeAspect="1"/>
-          </p:cNvPicPr>
-          <p:nvPr/>
-        </p:nvPicPr>
-        <p:blipFill rotWithShape="1">
-          <a:blip r:embed="rId4">
-            <a:extLst>
-              <a:ext uri="{28A0092B-C50C-407E-A947-70E740481C1C}">
-                <a14:useLocalDpi xmlns:a14="http://schemas.microsoft.com/office/drawing/2010/main" val="0"/>
-              </a:ext>
-            </a:extLst>
-          </a:blip>
-          <a:srcRect l="6006" t="4644" r="8119"/>
-          <a:stretch/>
-        </p:blipFill>
+      <p:sp>
+        <p:nvSpPr>
+          <p:cNvPr id="67" name="TextBox 66">
+            <a:extLst>
+              <a:ext uri="{FF2B5EF4-FFF2-40B4-BE49-F238E27FC236}">
+                <a16:creationId xmlns:a16="http://schemas.microsoft.com/office/drawing/2014/main" id="{589ABFA2-7EBB-4EB0-AA6D-EF1322D81885}"/>
+              </a:ext>
+            </a:extLst>
+          </p:cNvPr>
+          <p:cNvSpPr txBox="1"/>
+          <p:nvPr/>
+        </p:nvSpPr>
         <p:spPr>
           <a:xfrm>
-            <a:off x="3139700" y="361040"/>
-            <a:ext cx="2880000" cy="2397531"/>
-          </a:xfrm>
-          <a:prstGeom prst="rect">
-            <a:avLst/>
-          </a:prstGeom>
-        </p:spPr>
-      </p:pic>
-      <p:pic>
-        <p:nvPicPr>
-          <p:cNvPr id="63" name="Picture 62" descr="Chart&#10;&#10;Description automatically generated">
-            <a:extLst>
-              <a:ext uri="{FF2B5EF4-FFF2-40B4-BE49-F238E27FC236}">
-                <a16:creationId xmlns:a16="http://schemas.microsoft.com/office/drawing/2014/main" id="{4DD3E83D-337D-4121-B885-C1D11F89E5B1}"/>
-              </a:ext>
-            </a:extLst>
-          </p:cNvPr>
-          <p:cNvPicPr>
-            <a:picLocks noChangeAspect="1"/>
-          </p:cNvPicPr>
-          <p:nvPr/>
-        </p:nvPicPr>
-        <p:blipFill rotWithShape="1">
-          <a:blip r:embed="rId5">
-            <a:extLst>
-              <a:ext uri="{28A0092B-C50C-407E-A947-70E740481C1C}">
-                <a14:useLocalDpi xmlns:a14="http://schemas.microsoft.com/office/drawing/2010/main" val="0"/>
-              </a:ext>
-            </a:extLst>
-          </a:blip>
-          <a:srcRect l="6006" t="4645" r="8118" b="-1"/>
-          <a:stretch/>
-        </p:blipFill>
-        <p:spPr>
-          <a:xfrm>
-            <a:off x="188405" y="361040"/>
-            <a:ext cx="2880000" cy="2397531"/>
-          </a:xfrm>
-          <a:prstGeom prst="rect">
-            <a:avLst/>
-          </a:prstGeom>
-        </p:spPr>
-      </p:pic>
-      <p:sp>
-        <p:nvSpPr>
-          <p:cNvPr id="65" name="TextBox 64">
-            <a:extLst>
-              <a:ext uri="{FF2B5EF4-FFF2-40B4-BE49-F238E27FC236}">
-                <a16:creationId xmlns:a16="http://schemas.microsoft.com/office/drawing/2014/main" id="{F18080BF-6CBD-40CC-BE8F-E0BB18CBE701}"/>
-              </a:ext>
-            </a:extLst>
-          </p:cNvPr>
-          <p:cNvSpPr txBox="1"/>
-          <p:nvPr/>
-        </p:nvSpPr>
-        <p:spPr>
-          <a:xfrm rot="16200000">
-            <a:off x="-13110" y="437085"/>
-            <a:ext cx="2099402" cy="2016000"/>
+            <a:off x="401383" y="204358"/>
+            <a:ext cx="2667021" cy="246221"/>
           </a:xfrm>
           <a:prstGeom prst="rect">
             <a:avLst/>
@@ -3917,18 +3833,18 @@
           <a:p>
             <a:pPr algn="ctr"/>
             <a:r>
-              <a:rPr lang="en-GB" sz="800" dirty="0"/>
-              <a:t>Area under the ROC</a:t>
-            </a:r>
-          </a:p>
-        </p:txBody>
-      </p:sp>
-      <p:sp>
-        <p:nvSpPr>
-          <p:cNvPr id="67" name="TextBox 66">
-            <a:extLst>
-              <a:ext uri="{FF2B5EF4-FFF2-40B4-BE49-F238E27FC236}">
-                <a16:creationId xmlns:a16="http://schemas.microsoft.com/office/drawing/2014/main" id="{589ABFA2-7EBB-4EB0-AA6D-EF1322D81885}"/>
+              <a:rPr lang="en-GB" sz="1000" dirty="0"/>
+              <a:t>“La Costa”</a:t>
+            </a:r>
+          </a:p>
+        </p:txBody>
+      </p:sp>
+      <p:sp>
+        <p:nvSpPr>
+          <p:cNvPr id="69" name="TextBox 68">
+            <a:extLst>
+              <a:ext uri="{FF2B5EF4-FFF2-40B4-BE49-F238E27FC236}">
+                <a16:creationId xmlns:a16="http://schemas.microsoft.com/office/drawing/2014/main" id="{B2688E76-5FD0-4F52-A97A-E43BF1D1D85D}"/>
               </a:ext>
             </a:extLst>
           </p:cNvPr>
@@ -3937,8 +3853,8 @@
         </p:nvSpPr>
         <p:spPr>
           <a:xfrm>
-            <a:off x="401383" y="204358"/>
-            <a:ext cx="2667021" cy="246221"/>
+            <a:off x="3369216" y="204358"/>
+            <a:ext cx="2650484" cy="246221"/>
           </a:xfrm>
           <a:prstGeom prst="rect">
             <a:avLst/>
@@ -3954,101 +3870,7 @@
             <a:pPr algn="ctr"/>
             <a:r>
               <a:rPr lang="en-GB" sz="1000" dirty="0"/>
-              <a:t>“La Costa”</a:t>
-            </a:r>
-          </a:p>
-        </p:txBody>
-      </p:sp>
-      <p:sp>
-        <p:nvSpPr>
-          <p:cNvPr id="69" name="TextBox 68">
-            <a:extLst>
-              <a:ext uri="{FF2B5EF4-FFF2-40B4-BE49-F238E27FC236}">
-                <a16:creationId xmlns:a16="http://schemas.microsoft.com/office/drawing/2014/main" id="{B2688E76-5FD0-4F52-A97A-E43BF1D1D85D}"/>
-              </a:ext>
-            </a:extLst>
-          </p:cNvPr>
-          <p:cNvSpPr txBox="1"/>
-          <p:nvPr/>
-        </p:nvSpPr>
-        <p:spPr>
-          <a:xfrm>
-            <a:off x="3369216" y="204358"/>
-            <a:ext cx="2650484" cy="246221"/>
-          </a:xfrm>
-          <a:prstGeom prst="rect">
-            <a:avLst/>
-          </a:prstGeom>
-          <a:noFill/>
-        </p:spPr>
-        <p:txBody>
-          <a:bodyPr wrap="square" rtlCol="0">
-            <a:spAutoFit/>
-          </a:bodyPr>
-          <a:lstStyle/>
-          <a:p>
-            <a:pPr algn="ctr"/>
-            <a:r>
-              <a:rPr lang="en-GB" sz="1000" dirty="0"/>
               <a:t>“La Sierra”</a:t>
-            </a:r>
-          </a:p>
-        </p:txBody>
-      </p:sp>
-      <p:sp>
-        <p:nvSpPr>
-          <p:cNvPr id="80" name="TextBox 79">
-            <a:extLst>
-              <a:ext uri="{FF2B5EF4-FFF2-40B4-BE49-F238E27FC236}">
-                <a16:creationId xmlns:a16="http://schemas.microsoft.com/office/drawing/2014/main" id="{F2BAF33B-DE08-4DD0-B840-EEA28E79E85B}"/>
-              </a:ext>
-            </a:extLst>
-          </p:cNvPr>
-          <p:cNvSpPr txBox="1"/>
-          <p:nvPr/>
-        </p:nvSpPr>
-        <p:spPr>
-          <a:xfrm>
-            <a:off x="4750894" y="490985"/>
-            <a:ext cx="1152000" cy="338554"/>
-          </a:xfrm>
-          <a:prstGeom prst="rect">
-            <a:avLst/>
-          </a:prstGeom>
-          <a:solidFill>
-            <a:schemeClr val="bg1"/>
-          </a:solidFill>
-          <a:ln>
-            <a:solidFill>
-              <a:schemeClr val="tx1"/>
-            </a:solidFill>
-          </a:ln>
-        </p:spPr>
-        <p:txBody>
-          <a:bodyPr wrap="square" rtlCol="0">
-            <a:spAutoFit/>
-          </a:bodyPr>
-          <a:lstStyle/>
-          <a:p>
-            <a:pPr algn="ctr"/>
-            <a:r>
-              <a:rPr lang="en-GB" sz="800" dirty="0"/>
-              <a:t>85</a:t>
-            </a:r>
-            <a:r>
-              <a:rPr lang="en-GB" sz="800" baseline="30000" dirty="0"/>
-              <a:t>th</a:t>
-            </a:r>
-            <a:r>
-              <a:rPr lang="en-GB" sz="800" dirty="0"/>
-              <a:t> percentile</a:t>
-            </a:r>
-          </a:p>
-          <a:p>
-            <a:pPr algn="ctr"/>
-            <a:r>
-              <a:rPr lang="en-GB" sz="800" dirty="0"/>
-              <a:t>(tp &gt;= 6.112 mm/12h)</a:t>
             </a:r>
           </a:p>
         </p:txBody>
@@ -4213,6 +4035,784 @@
       </p:sp>
       <p:sp>
         <p:nvSpPr>
+          <p:cNvPr id="89" name="TextBox 88">
+            <a:extLst>
+              <a:ext uri="{FF2B5EF4-FFF2-40B4-BE49-F238E27FC236}">
+                <a16:creationId xmlns:a16="http://schemas.microsoft.com/office/drawing/2014/main" id="{B39140BE-A13C-4AE0-A6FD-6EE6FEB5AC74}"/>
+              </a:ext>
+            </a:extLst>
+          </p:cNvPr>
+          <p:cNvSpPr txBox="1"/>
+          <p:nvPr/>
+        </p:nvSpPr>
+        <p:spPr>
+          <a:xfrm>
+            <a:off x="450121" y="5033057"/>
+            <a:ext cx="2650484" cy="215444"/>
+          </a:xfrm>
+          <a:prstGeom prst="rect">
+            <a:avLst/>
+          </a:prstGeom>
+          <a:noFill/>
+        </p:spPr>
+        <p:txBody>
+          <a:bodyPr wrap="square" rtlCol="0">
+            <a:spAutoFit/>
+          </a:bodyPr>
+          <a:lstStyle/>
+          <a:p>
+            <a:pPr algn="ctr"/>
+            <a:r>
+              <a:rPr lang="en-GB" sz="800" dirty="0"/>
+              <a:t>Steps at the end of 12-h accumulation periods</a:t>
+            </a:r>
+          </a:p>
+        </p:txBody>
+      </p:sp>
+      <p:pic>
+        <p:nvPicPr>
+          <p:cNvPr id="3" name="Picture 2" descr="Chart, histogram&#10;&#10;Description automatically generated">
+            <a:extLst>
+              <a:ext uri="{FF2B5EF4-FFF2-40B4-BE49-F238E27FC236}">
+                <a16:creationId xmlns:a16="http://schemas.microsoft.com/office/drawing/2014/main" id="{AA2AE781-3369-4FEB-9AFD-D06BB5047BFC}"/>
+              </a:ext>
+            </a:extLst>
+          </p:cNvPr>
+          <p:cNvPicPr>
+            <a:picLocks noChangeAspect="1"/>
+          </p:cNvPicPr>
+          <p:nvPr/>
+        </p:nvPicPr>
+        <p:blipFill rotWithShape="1">
+          <a:blip r:embed="rId2">
+            <a:extLst>
+              <a:ext uri="{28A0092B-C50C-407E-A947-70E740481C1C}">
+                <a14:useLocalDpi xmlns:a14="http://schemas.microsoft.com/office/drawing/2010/main" val="0"/>
+              </a:ext>
+            </a:extLst>
+          </a:blip>
+          <a:srcRect l="6047" t="5317" r="8681"/>
+          <a:stretch/>
+        </p:blipFill>
+        <p:spPr>
+          <a:xfrm>
+            <a:off x="337811" y="400412"/>
+            <a:ext cx="2762794" cy="2299925"/>
+          </a:xfrm>
+          <a:prstGeom prst="rect">
+            <a:avLst/>
+          </a:prstGeom>
+        </p:spPr>
+      </p:pic>
+      <p:pic>
+        <p:nvPicPr>
+          <p:cNvPr id="5" name="Picture 4" descr="Chart&#10;&#10;Description automatically generated">
+            <a:extLst>
+              <a:ext uri="{FF2B5EF4-FFF2-40B4-BE49-F238E27FC236}">
+                <a16:creationId xmlns:a16="http://schemas.microsoft.com/office/drawing/2014/main" id="{647CB8AE-FCBA-4B1B-8002-42FD30E3A189}"/>
+              </a:ext>
+            </a:extLst>
+          </p:cNvPr>
+          <p:cNvPicPr>
+            <a:picLocks noChangeAspect="1"/>
+          </p:cNvPicPr>
+          <p:nvPr/>
+        </p:nvPicPr>
+        <p:blipFill rotWithShape="1">
+          <a:blip r:embed="rId3">
+            <a:extLst>
+              <a:ext uri="{28A0092B-C50C-407E-A947-70E740481C1C}">
+                <a14:useLocalDpi xmlns:a14="http://schemas.microsoft.com/office/drawing/2010/main" val="0"/>
+              </a:ext>
+            </a:extLst>
+          </a:blip>
+          <a:srcRect l="6047" t="5323" r="8681"/>
+          <a:stretch/>
+        </p:blipFill>
+        <p:spPr>
+          <a:xfrm>
+            <a:off x="3217811" y="399753"/>
+            <a:ext cx="2762794" cy="2299780"/>
+          </a:xfrm>
+          <a:prstGeom prst="rect">
+            <a:avLst/>
+          </a:prstGeom>
+        </p:spPr>
+      </p:pic>
+      <p:pic>
+        <p:nvPicPr>
+          <p:cNvPr id="7" name="Picture 6" descr="Chart&#10;&#10;Description automatically generated">
+            <a:extLst>
+              <a:ext uri="{FF2B5EF4-FFF2-40B4-BE49-F238E27FC236}">
+                <a16:creationId xmlns:a16="http://schemas.microsoft.com/office/drawing/2014/main" id="{C5D75D13-E7EE-4CAA-8EE6-75C55E3EABCC}"/>
+              </a:ext>
+            </a:extLst>
+          </p:cNvPr>
+          <p:cNvPicPr>
+            <a:picLocks noChangeAspect="1"/>
+          </p:cNvPicPr>
+          <p:nvPr/>
+        </p:nvPicPr>
+        <p:blipFill rotWithShape="1">
+          <a:blip r:embed="rId4">
+            <a:extLst>
+              <a:ext uri="{28A0092B-C50C-407E-A947-70E740481C1C}">
+                <a14:useLocalDpi xmlns:a14="http://schemas.microsoft.com/office/drawing/2010/main" val="0"/>
+              </a:ext>
+            </a:extLst>
+          </a:blip>
+          <a:srcRect l="6047" t="5323" r="8681"/>
+          <a:stretch/>
+        </p:blipFill>
+        <p:spPr>
+          <a:xfrm>
+            <a:off x="337811" y="2733278"/>
+            <a:ext cx="2762794" cy="2299780"/>
+          </a:xfrm>
+          <a:prstGeom prst="rect">
+            <a:avLst/>
+          </a:prstGeom>
+        </p:spPr>
+      </p:pic>
+      <p:pic>
+        <p:nvPicPr>
+          <p:cNvPr id="9" name="Picture 8" descr="Chart, histogram&#10;&#10;Description automatically generated">
+            <a:extLst>
+              <a:ext uri="{FF2B5EF4-FFF2-40B4-BE49-F238E27FC236}">
+                <a16:creationId xmlns:a16="http://schemas.microsoft.com/office/drawing/2014/main" id="{9D6BA245-8585-4D56-B1A9-2CA927A6C293}"/>
+              </a:ext>
+            </a:extLst>
+          </p:cNvPr>
+          <p:cNvPicPr>
+            <a:picLocks noChangeAspect="1"/>
+          </p:cNvPicPr>
+          <p:nvPr/>
+        </p:nvPicPr>
+        <p:blipFill rotWithShape="1">
+          <a:blip r:embed="rId5">
+            <a:extLst>
+              <a:ext uri="{28A0092B-C50C-407E-A947-70E740481C1C}">
+                <a14:useLocalDpi xmlns:a14="http://schemas.microsoft.com/office/drawing/2010/main" val="0"/>
+              </a:ext>
+            </a:extLst>
+          </a:blip>
+          <a:srcRect l="6047" t="5323" r="8681"/>
+          <a:stretch/>
+        </p:blipFill>
+        <p:spPr>
+          <a:xfrm>
+            <a:off x="3217811" y="2733278"/>
+            <a:ext cx="2762794" cy="2299779"/>
+          </a:xfrm>
+          <a:prstGeom prst="rect">
+            <a:avLst/>
+          </a:prstGeom>
+        </p:spPr>
+      </p:pic>
+      <p:sp>
+        <p:nvSpPr>
+          <p:cNvPr id="73" name="TextBox 72">
+            <a:extLst>
+              <a:ext uri="{FF2B5EF4-FFF2-40B4-BE49-F238E27FC236}">
+                <a16:creationId xmlns:a16="http://schemas.microsoft.com/office/drawing/2014/main" id="{C1D12DF9-87B0-4222-A6B9-241033479852}"/>
+              </a:ext>
+            </a:extLst>
+          </p:cNvPr>
+          <p:cNvSpPr txBox="1"/>
+          <p:nvPr/>
+        </p:nvSpPr>
+        <p:spPr>
+          <a:xfrm rot="16200000">
+            <a:off x="-794311" y="3621646"/>
+            <a:ext cx="1992179" cy="215444"/>
+          </a:xfrm>
+          <a:prstGeom prst="rect">
+            <a:avLst/>
+          </a:prstGeom>
+          <a:noFill/>
+        </p:spPr>
+        <p:txBody>
+          <a:bodyPr wrap="square" rtlCol="0">
+            <a:spAutoFit/>
+          </a:bodyPr>
+          <a:lstStyle/>
+          <a:p>
+            <a:pPr algn="ctr"/>
+            <a:r>
+              <a:rPr lang="en-GB" sz="800" dirty="0"/>
+              <a:t>Area under the ROC</a:t>
+            </a:r>
+          </a:p>
+        </p:txBody>
+      </p:sp>
+      <p:sp>
+        <p:nvSpPr>
+          <p:cNvPr id="74" name="TextBox 73">
+            <a:extLst>
+              <a:ext uri="{FF2B5EF4-FFF2-40B4-BE49-F238E27FC236}">
+                <a16:creationId xmlns:a16="http://schemas.microsoft.com/office/drawing/2014/main" id="{731D2FA9-E557-41FD-8400-9864995A64F0}"/>
+              </a:ext>
+            </a:extLst>
+          </p:cNvPr>
+          <p:cNvSpPr txBox="1"/>
+          <p:nvPr/>
+        </p:nvSpPr>
+        <p:spPr>
+          <a:xfrm rot="16200000">
+            <a:off x="-794311" y="1338946"/>
+            <a:ext cx="1992177" cy="215444"/>
+          </a:xfrm>
+          <a:prstGeom prst="rect">
+            <a:avLst/>
+          </a:prstGeom>
+          <a:noFill/>
+        </p:spPr>
+        <p:txBody>
+          <a:bodyPr wrap="square" rtlCol="0">
+            <a:spAutoFit/>
+          </a:bodyPr>
+          <a:lstStyle/>
+          <a:p>
+            <a:pPr algn="ctr"/>
+            <a:r>
+              <a:rPr lang="en-GB" sz="800" dirty="0"/>
+              <a:t>Area under the ROC</a:t>
+            </a:r>
+          </a:p>
+        </p:txBody>
+      </p:sp>
+    </p:spTree>
+    <p:extLst>
+      <p:ext uri="{BB962C8B-B14F-4D97-AF65-F5344CB8AC3E}">
+        <p14:creationId xmlns:p14="http://schemas.microsoft.com/office/powerpoint/2010/main" val="1489261767"/>
+      </p:ext>
+    </p:extLst>
+  </p:cSld>
+  <p:clrMapOvr>
+    <a:masterClrMapping/>
+  </p:clrMapOvr>
+</p:sld>
+</file>
+
+<file path=ppt/slides/slide2.xml><?xml version="1.0" encoding="utf-8"?>
+<p:sld xmlns:a="http://schemas.openxmlformats.org/drawingml/2006/main" xmlns:r="http://schemas.openxmlformats.org/officeDocument/2006/relationships" xmlns:p="http://schemas.openxmlformats.org/presentationml/2006/main">
+  <p:cSld>
+    <p:spTree>
+      <p:nvGrpSpPr>
+        <p:cNvPr id="1" name=""/>
+        <p:cNvGrpSpPr/>
+        <p:nvPr/>
+      </p:nvGrpSpPr>
+      <p:grpSpPr>
+        <a:xfrm>
+          <a:off x="0" y="0"/>
+          <a:ext cx="0" cy="0"/>
+          <a:chOff x="0" y="0"/>
+          <a:chExt cx="0" cy="0"/>
+        </a:xfrm>
+      </p:grpSpPr>
+      <p:pic>
+        <p:nvPicPr>
+          <p:cNvPr id="55" name="Picture 54" descr="Chart&#10;&#10;Description automatically generated">
+            <a:extLst>
+              <a:ext uri="{FF2B5EF4-FFF2-40B4-BE49-F238E27FC236}">
+                <a16:creationId xmlns:a16="http://schemas.microsoft.com/office/drawing/2014/main" id="{249B8000-1A10-4146-8DE7-F408D67A99D2}"/>
+              </a:ext>
+            </a:extLst>
+          </p:cNvPr>
+          <p:cNvPicPr>
+            <a:picLocks noChangeAspect="1"/>
+          </p:cNvPicPr>
+          <p:nvPr/>
+        </p:nvPicPr>
+        <p:blipFill rotWithShape="1">
+          <a:blip r:embed="rId2">
+            <a:extLst>
+              <a:ext uri="{28A0092B-C50C-407E-A947-70E740481C1C}">
+                <a14:useLocalDpi xmlns:a14="http://schemas.microsoft.com/office/drawing/2010/main" val="0"/>
+              </a:ext>
+            </a:extLst>
+          </a:blip>
+          <a:srcRect l="6006" t="4644" r="8119"/>
+          <a:stretch/>
+        </p:blipFill>
+        <p:spPr>
+          <a:xfrm>
+            <a:off x="3139700" y="2798797"/>
+            <a:ext cx="2880000" cy="2397531"/>
+          </a:xfrm>
+          <a:prstGeom prst="rect">
+            <a:avLst/>
+          </a:prstGeom>
+        </p:spPr>
+      </p:pic>
+      <p:pic>
+        <p:nvPicPr>
+          <p:cNvPr id="58" name="Picture 57" descr="Chart&#10;&#10;Description automatically generated">
+            <a:extLst>
+              <a:ext uri="{FF2B5EF4-FFF2-40B4-BE49-F238E27FC236}">
+                <a16:creationId xmlns:a16="http://schemas.microsoft.com/office/drawing/2014/main" id="{6BDD4B2C-0287-4AB0-9F5C-4E24A08845F8}"/>
+              </a:ext>
+            </a:extLst>
+          </p:cNvPr>
+          <p:cNvPicPr>
+            <a:picLocks noChangeAspect="1"/>
+          </p:cNvPicPr>
+          <p:nvPr/>
+        </p:nvPicPr>
+        <p:blipFill rotWithShape="1">
+          <a:blip r:embed="rId3">
+            <a:extLst>
+              <a:ext uri="{28A0092B-C50C-407E-A947-70E740481C1C}">
+                <a14:useLocalDpi xmlns:a14="http://schemas.microsoft.com/office/drawing/2010/main" val="0"/>
+              </a:ext>
+            </a:extLst>
+          </a:blip>
+          <a:srcRect l="6006" t="4644" r="8119"/>
+          <a:stretch/>
+        </p:blipFill>
+        <p:spPr>
+          <a:xfrm>
+            <a:off x="188405" y="2798797"/>
+            <a:ext cx="2880000" cy="2397531"/>
+          </a:xfrm>
+          <a:prstGeom prst="rect">
+            <a:avLst/>
+          </a:prstGeom>
+        </p:spPr>
+      </p:pic>
+      <p:sp>
+        <p:nvSpPr>
+          <p:cNvPr id="59" name="TextBox 58">
+            <a:extLst>
+              <a:ext uri="{FF2B5EF4-FFF2-40B4-BE49-F238E27FC236}">
+                <a16:creationId xmlns:a16="http://schemas.microsoft.com/office/drawing/2014/main" id="{EDB8C1D3-804C-4636-B781-F3F8431A369B}"/>
+              </a:ext>
+            </a:extLst>
+          </p:cNvPr>
+          <p:cNvSpPr txBox="1"/>
+          <p:nvPr/>
+        </p:nvSpPr>
+        <p:spPr>
+          <a:xfrm>
+            <a:off x="3369216" y="5175973"/>
+            <a:ext cx="2650484" cy="215444"/>
+          </a:xfrm>
+          <a:prstGeom prst="rect">
+            <a:avLst/>
+          </a:prstGeom>
+          <a:noFill/>
+        </p:spPr>
+        <p:txBody>
+          <a:bodyPr wrap="square" rtlCol="0">
+            <a:spAutoFit/>
+          </a:bodyPr>
+          <a:lstStyle/>
+          <a:p>
+            <a:pPr algn="ctr"/>
+            <a:r>
+              <a:rPr lang="en-GB" sz="800" dirty="0"/>
+              <a:t>Steps at the end of 12-h accumulation periods</a:t>
+            </a:r>
+          </a:p>
+        </p:txBody>
+      </p:sp>
+      <p:pic>
+        <p:nvPicPr>
+          <p:cNvPr id="61" name="Picture 60" descr="Chart&#10;&#10;Description automatically generated">
+            <a:extLst>
+              <a:ext uri="{FF2B5EF4-FFF2-40B4-BE49-F238E27FC236}">
+                <a16:creationId xmlns:a16="http://schemas.microsoft.com/office/drawing/2014/main" id="{15681698-39BD-4815-B989-535604F83C98}"/>
+              </a:ext>
+            </a:extLst>
+          </p:cNvPr>
+          <p:cNvPicPr>
+            <a:picLocks noChangeAspect="1"/>
+          </p:cNvPicPr>
+          <p:nvPr/>
+        </p:nvPicPr>
+        <p:blipFill rotWithShape="1">
+          <a:blip r:embed="rId4">
+            <a:extLst>
+              <a:ext uri="{28A0092B-C50C-407E-A947-70E740481C1C}">
+                <a14:useLocalDpi xmlns:a14="http://schemas.microsoft.com/office/drawing/2010/main" val="0"/>
+              </a:ext>
+            </a:extLst>
+          </a:blip>
+          <a:srcRect l="6006" t="4644" r="8119"/>
+          <a:stretch/>
+        </p:blipFill>
+        <p:spPr>
+          <a:xfrm>
+            <a:off x="3139700" y="361040"/>
+            <a:ext cx="2880000" cy="2397531"/>
+          </a:xfrm>
+          <a:prstGeom prst="rect">
+            <a:avLst/>
+          </a:prstGeom>
+        </p:spPr>
+      </p:pic>
+      <p:pic>
+        <p:nvPicPr>
+          <p:cNvPr id="63" name="Picture 62" descr="Chart&#10;&#10;Description automatically generated">
+            <a:extLst>
+              <a:ext uri="{FF2B5EF4-FFF2-40B4-BE49-F238E27FC236}">
+                <a16:creationId xmlns:a16="http://schemas.microsoft.com/office/drawing/2014/main" id="{4DD3E83D-337D-4121-B885-C1D11F89E5B1}"/>
+              </a:ext>
+            </a:extLst>
+          </p:cNvPr>
+          <p:cNvPicPr>
+            <a:picLocks noChangeAspect="1"/>
+          </p:cNvPicPr>
+          <p:nvPr/>
+        </p:nvPicPr>
+        <p:blipFill rotWithShape="1">
+          <a:blip r:embed="rId5">
+            <a:extLst>
+              <a:ext uri="{28A0092B-C50C-407E-A947-70E740481C1C}">
+                <a14:useLocalDpi xmlns:a14="http://schemas.microsoft.com/office/drawing/2010/main" val="0"/>
+              </a:ext>
+            </a:extLst>
+          </a:blip>
+          <a:srcRect l="6006" t="4645" r="8118" b="-1"/>
+          <a:stretch/>
+        </p:blipFill>
+        <p:spPr>
+          <a:xfrm>
+            <a:off x="188405" y="361040"/>
+            <a:ext cx="2880000" cy="2397531"/>
+          </a:xfrm>
+          <a:prstGeom prst="rect">
+            <a:avLst/>
+          </a:prstGeom>
+        </p:spPr>
+      </p:pic>
+      <p:sp>
+        <p:nvSpPr>
+          <p:cNvPr id="65" name="TextBox 64">
+            <a:extLst>
+              <a:ext uri="{FF2B5EF4-FFF2-40B4-BE49-F238E27FC236}">
+                <a16:creationId xmlns:a16="http://schemas.microsoft.com/office/drawing/2014/main" id="{F18080BF-6CBD-40CC-BE8F-E0BB18CBE701}"/>
+              </a:ext>
+            </a:extLst>
+          </p:cNvPr>
+          <p:cNvSpPr txBox="1"/>
+          <p:nvPr/>
+        </p:nvSpPr>
+        <p:spPr>
+          <a:xfrm rot="16200000">
+            <a:off x="-13110" y="437085"/>
+            <a:ext cx="2099402" cy="2016000"/>
+          </a:xfrm>
+          <a:prstGeom prst="rect">
+            <a:avLst/>
+          </a:prstGeom>
+          <a:noFill/>
+        </p:spPr>
+        <p:txBody>
+          <a:bodyPr wrap="square" rtlCol="0">
+            <a:spAutoFit/>
+          </a:bodyPr>
+          <a:lstStyle/>
+          <a:p>
+            <a:pPr algn="ctr"/>
+            <a:r>
+              <a:rPr lang="en-GB" sz="800" dirty="0"/>
+              <a:t>Area under the ROC</a:t>
+            </a:r>
+          </a:p>
+        </p:txBody>
+      </p:sp>
+      <p:sp>
+        <p:nvSpPr>
+          <p:cNvPr id="67" name="TextBox 66">
+            <a:extLst>
+              <a:ext uri="{FF2B5EF4-FFF2-40B4-BE49-F238E27FC236}">
+                <a16:creationId xmlns:a16="http://schemas.microsoft.com/office/drawing/2014/main" id="{589ABFA2-7EBB-4EB0-AA6D-EF1322D81885}"/>
+              </a:ext>
+            </a:extLst>
+          </p:cNvPr>
+          <p:cNvSpPr txBox="1"/>
+          <p:nvPr/>
+        </p:nvSpPr>
+        <p:spPr>
+          <a:xfrm>
+            <a:off x="401383" y="204358"/>
+            <a:ext cx="2667021" cy="246221"/>
+          </a:xfrm>
+          <a:prstGeom prst="rect">
+            <a:avLst/>
+          </a:prstGeom>
+          <a:noFill/>
+        </p:spPr>
+        <p:txBody>
+          <a:bodyPr wrap="square" rtlCol="0">
+            <a:spAutoFit/>
+          </a:bodyPr>
+          <a:lstStyle/>
+          <a:p>
+            <a:pPr algn="ctr"/>
+            <a:r>
+              <a:rPr lang="en-GB" sz="1000" dirty="0"/>
+              <a:t>“La Costa”</a:t>
+            </a:r>
+          </a:p>
+        </p:txBody>
+      </p:sp>
+      <p:sp>
+        <p:nvSpPr>
+          <p:cNvPr id="69" name="TextBox 68">
+            <a:extLst>
+              <a:ext uri="{FF2B5EF4-FFF2-40B4-BE49-F238E27FC236}">
+                <a16:creationId xmlns:a16="http://schemas.microsoft.com/office/drawing/2014/main" id="{B2688E76-5FD0-4F52-A97A-E43BF1D1D85D}"/>
+              </a:ext>
+            </a:extLst>
+          </p:cNvPr>
+          <p:cNvSpPr txBox="1"/>
+          <p:nvPr/>
+        </p:nvSpPr>
+        <p:spPr>
+          <a:xfrm>
+            <a:off x="3369216" y="204358"/>
+            <a:ext cx="2650484" cy="246221"/>
+          </a:xfrm>
+          <a:prstGeom prst="rect">
+            <a:avLst/>
+          </a:prstGeom>
+          <a:noFill/>
+        </p:spPr>
+        <p:txBody>
+          <a:bodyPr wrap="square" rtlCol="0">
+            <a:spAutoFit/>
+          </a:bodyPr>
+          <a:lstStyle/>
+          <a:p>
+            <a:pPr algn="ctr"/>
+            <a:r>
+              <a:rPr lang="en-GB" sz="1000" dirty="0"/>
+              <a:t>“La Sierra”</a:t>
+            </a:r>
+          </a:p>
+        </p:txBody>
+      </p:sp>
+      <p:sp>
+        <p:nvSpPr>
+          <p:cNvPr id="80" name="TextBox 79">
+            <a:extLst>
+              <a:ext uri="{FF2B5EF4-FFF2-40B4-BE49-F238E27FC236}">
+                <a16:creationId xmlns:a16="http://schemas.microsoft.com/office/drawing/2014/main" id="{F2BAF33B-DE08-4DD0-B840-EEA28E79E85B}"/>
+              </a:ext>
+            </a:extLst>
+          </p:cNvPr>
+          <p:cNvSpPr txBox="1"/>
+          <p:nvPr/>
+        </p:nvSpPr>
+        <p:spPr>
+          <a:xfrm>
+            <a:off x="4750894" y="490985"/>
+            <a:ext cx="1152000" cy="338554"/>
+          </a:xfrm>
+          <a:prstGeom prst="rect">
+            <a:avLst/>
+          </a:prstGeom>
+          <a:solidFill>
+            <a:schemeClr val="bg1"/>
+          </a:solidFill>
+          <a:ln>
+            <a:solidFill>
+              <a:schemeClr val="tx1"/>
+            </a:solidFill>
+          </a:ln>
+        </p:spPr>
+        <p:txBody>
+          <a:bodyPr wrap="square" rtlCol="0">
+            <a:spAutoFit/>
+          </a:bodyPr>
+          <a:lstStyle/>
+          <a:p>
+            <a:pPr algn="ctr"/>
+            <a:r>
+              <a:rPr lang="en-GB" sz="800" dirty="0"/>
+              <a:t>85</a:t>
+            </a:r>
+            <a:r>
+              <a:rPr lang="en-GB" sz="800" baseline="30000" dirty="0"/>
+              <a:t>th</a:t>
+            </a:r>
+            <a:r>
+              <a:rPr lang="en-GB" sz="800" dirty="0"/>
+              <a:t> percentile</a:t>
+            </a:r>
+          </a:p>
+          <a:p>
+            <a:pPr algn="ctr"/>
+            <a:r>
+              <a:rPr lang="en-GB" sz="800" dirty="0"/>
+              <a:t>(tp &gt;= 6.112 mm/12h)</a:t>
+            </a:r>
+          </a:p>
+        </p:txBody>
+      </p:sp>
+      <p:cxnSp>
+        <p:nvCxnSpPr>
+          <p:cNvPr id="81" name="Straight Connector 80">
+            <a:extLst>
+              <a:ext uri="{FF2B5EF4-FFF2-40B4-BE49-F238E27FC236}">
+                <a16:creationId xmlns:a16="http://schemas.microsoft.com/office/drawing/2014/main" id="{377C66FD-529A-4A29-AA0C-66E0F4A85000}"/>
+              </a:ext>
+            </a:extLst>
+          </p:cNvPr>
+          <p:cNvCxnSpPr>
+            <a:cxnSpLocks/>
+          </p:cNvCxnSpPr>
+          <p:nvPr/>
+        </p:nvCxnSpPr>
+        <p:spPr>
+          <a:xfrm>
+            <a:off x="3291920" y="228596"/>
+            <a:ext cx="540000" cy="0"/>
+          </a:xfrm>
+          <a:prstGeom prst="line">
+            <a:avLst/>
+          </a:prstGeom>
+          <a:ln w="38100">
+            <a:solidFill>
+              <a:srgbClr val="0000FF"/>
+            </a:solidFill>
+          </a:ln>
+        </p:spPr>
+        <p:style>
+          <a:lnRef idx="1">
+            <a:schemeClr val="accent1"/>
+          </a:lnRef>
+          <a:fillRef idx="0">
+            <a:schemeClr val="accent1"/>
+          </a:fillRef>
+          <a:effectRef idx="0">
+            <a:schemeClr val="accent1"/>
+          </a:effectRef>
+          <a:fontRef idx="minor">
+            <a:schemeClr val="tx1"/>
+          </a:fontRef>
+        </p:style>
+      </p:cxnSp>
+      <p:cxnSp>
+        <p:nvCxnSpPr>
+          <p:cNvPr id="82" name="Straight Connector 81">
+            <a:extLst>
+              <a:ext uri="{FF2B5EF4-FFF2-40B4-BE49-F238E27FC236}">
+                <a16:creationId xmlns:a16="http://schemas.microsoft.com/office/drawing/2014/main" id="{090D61E3-A960-46E0-A7D3-BA34DFF9F090}"/>
+              </a:ext>
+            </a:extLst>
+          </p:cNvPr>
+          <p:cNvCxnSpPr>
+            <a:cxnSpLocks/>
+          </p:cNvCxnSpPr>
+          <p:nvPr/>
+        </p:nvCxnSpPr>
+        <p:spPr>
+          <a:xfrm>
+            <a:off x="2546673" y="228596"/>
+            <a:ext cx="540000" cy="0"/>
+          </a:xfrm>
+          <a:prstGeom prst="line">
+            <a:avLst/>
+          </a:prstGeom>
+          <a:ln w="38100">
+            <a:solidFill>
+              <a:srgbClr val="FF0000"/>
+            </a:solidFill>
+          </a:ln>
+        </p:spPr>
+        <p:style>
+          <a:lnRef idx="1">
+            <a:schemeClr val="accent1"/>
+          </a:lnRef>
+          <a:fillRef idx="0">
+            <a:schemeClr val="accent1"/>
+          </a:fillRef>
+          <a:effectRef idx="0">
+            <a:schemeClr val="accent1"/>
+          </a:effectRef>
+          <a:fontRef idx="minor">
+            <a:schemeClr val="tx1"/>
+          </a:fontRef>
+        </p:style>
+      </p:cxnSp>
+      <p:sp>
+        <p:nvSpPr>
+          <p:cNvPr id="83" name="TextBox 82">
+            <a:extLst>
+              <a:ext uri="{FF2B5EF4-FFF2-40B4-BE49-F238E27FC236}">
+                <a16:creationId xmlns:a16="http://schemas.microsoft.com/office/drawing/2014/main" id="{E87050D7-461D-4FA8-AAAA-B2927D17BF36}"/>
+              </a:ext>
+            </a:extLst>
+          </p:cNvPr>
+          <p:cNvSpPr txBox="1"/>
+          <p:nvPr/>
+        </p:nvSpPr>
+        <p:spPr>
+          <a:xfrm>
+            <a:off x="2578125" y="-17770"/>
+            <a:ext cx="477097" cy="246366"/>
+          </a:xfrm>
+          <a:prstGeom prst="rect">
+            <a:avLst/>
+          </a:prstGeom>
+          <a:noFill/>
+        </p:spPr>
+        <p:txBody>
+          <a:bodyPr wrap="square" rtlCol="0">
+            <a:spAutoFit/>
+          </a:bodyPr>
+          <a:lstStyle/>
+          <a:p>
+            <a:pPr algn="ctr"/>
+            <a:r>
+              <a:rPr lang="en-GB" sz="1000" dirty="0"/>
+              <a:t>ENS</a:t>
+            </a:r>
+          </a:p>
+        </p:txBody>
+      </p:sp>
+      <p:sp>
+        <p:nvSpPr>
+          <p:cNvPr id="84" name="TextBox 83">
+            <a:extLst>
+              <a:ext uri="{FF2B5EF4-FFF2-40B4-BE49-F238E27FC236}">
+                <a16:creationId xmlns:a16="http://schemas.microsoft.com/office/drawing/2014/main" id="{DCA229DB-8991-4C74-A0F1-F0C1F1931148}"/>
+              </a:ext>
+            </a:extLst>
+          </p:cNvPr>
+          <p:cNvSpPr txBox="1"/>
+          <p:nvPr/>
+        </p:nvSpPr>
+        <p:spPr>
+          <a:xfrm>
+            <a:off x="3233380" y="-17770"/>
+            <a:ext cx="657080" cy="246221"/>
+          </a:xfrm>
+          <a:prstGeom prst="rect">
+            <a:avLst/>
+          </a:prstGeom>
+          <a:noFill/>
+        </p:spPr>
+        <p:txBody>
+          <a:bodyPr wrap="square" rtlCol="0">
+            <a:spAutoFit/>
+          </a:bodyPr>
+          <a:lstStyle/>
+          <a:p>
+            <a:pPr algn="ctr"/>
+            <a:r>
+              <a:rPr lang="en-GB" sz="1000" dirty="0"/>
+              <a:t>ecPoint</a:t>
+            </a:r>
+          </a:p>
+        </p:txBody>
+      </p:sp>
+      <p:sp>
+        <p:nvSpPr>
           <p:cNvPr id="85" name="TextBox 84">
             <a:extLst>
               <a:ext uri="{FF2B5EF4-FFF2-40B4-BE49-F238E27FC236}">
@@ -6490,7 +7090,7 @@
     </p:spTree>
     <p:extLst>
       <p:ext uri="{BB962C8B-B14F-4D97-AF65-F5344CB8AC3E}">
-        <p14:creationId xmlns:p14="http://schemas.microsoft.com/office/powerpoint/2010/main" val="1489261767"/>
+        <p14:creationId xmlns:p14="http://schemas.microsoft.com/office/powerpoint/2010/main" val="4285056876"/>
       </p:ext>
     </p:extLst>
   </p:cSld>

</xml_diff>

<commit_message>
Modified manuscript with new AURC plots
</commit_message>
<xml_diff>
--- a/Manuscript/Figures/AURC_EFFCI06.pptx
+++ b/Manuscript/Figures/AURC_EFFCI06.pptx
@@ -6,7 +6,6 @@
   </p:sldMasterIdLst>
   <p:sldIdLst>
     <p:sldId id="259" r:id="rId2"/>
-    <p:sldId id="260" r:id="rId3"/>
   </p:sldIdLst>
   <p:sldSz cx="6119813" cy="5400675"/>
   <p:notesSz cx="6858000" cy="9144000"/>
@@ -116,7 +115,7 @@
 <file path=ppt/revisionInfo.xml><?xml version="1.0" encoding="utf-8"?>
 <p1510:revInfo xmlns:a="http://schemas.openxmlformats.org/drawingml/2006/main" xmlns:r="http://schemas.openxmlformats.org/officeDocument/2006/relationships" xmlns:p1510="http://schemas.microsoft.com/office/powerpoint/2015/10/main">
   <p1510:revLst>
-    <p1510:client id="{AEACF5B8-E1B8-484D-AA65-19A39BABB57B}" v="32" dt="2022-01-18T17:12:02.653"/>
+    <p1510:client id="{AEACF5B8-E1B8-484D-AA65-19A39BABB57B}" v="36" dt="2022-01-19T05:12:37.086"/>
   </p1510:revLst>
 </p1510:revInfo>
 </file>
@@ -126,12 +125,12 @@
   <pc:docChgLst>
     <pc:chgData name="Fatima Pillosu" userId="a6295d4dc9e22643" providerId="LiveId" clId="{AEACF5B8-E1B8-484D-AA65-19A39BABB57B}"/>
     <pc:docChg chg="undo redo custSel addSld delSld modSld">
-      <pc:chgData name="Fatima Pillosu" userId="a6295d4dc9e22643" providerId="LiveId" clId="{AEACF5B8-E1B8-484D-AA65-19A39BABB57B}" dt="2022-01-18T17:12:56.461" v="625" actId="1076"/>
+      <pc:chgData name="Fatima Pillosu" userId="a6295d4dc9e22643" providerId="LiveId" clId="{AEACF5B8-E1B8-484D-AA65-19A39BABB57B}" dt="2022-01-19T05:15:05.951" v="812" actId="20577"/>
       <pc:docMkLst>
         <pc:docMk/>
       </pc:docMkLst>
       <pc:sldChg chg="addSp delSp modSp mod">
-        <pc:chgData name="Fatima Pillosu" userId="a6295d4dc9e22643" providerId="LiveId" clId="{AEACF5B8-E1B8-484D-AA65-19A39BABB57B}" dt="2022-01-18T17:12:56.461" v="625" actId="1076"/>
+        <pc:chgData name="Fatima Pillosu" userId="a6295d4dc9e22643" providerId="LiveId" clId="{AEACF5B8-E1B8-484D-AA65-19A39BABB57B}" dt="2022-01-19T05:15:05.951" v="812" actId="20577"/>
         <pc:sldMkLst>
           <pc:docMk/>
           <pc:sldMk cId="1489261767" sldId="259"/>
@@ -168,6 +167,62 @@
             <ac:spMk id="10" creationId="{2D225424-BB11-4468-B2E7-0EC0AA14DDE6}"/>
           </ac:spMkLst>
         </pc:spChg>
+        <pc:spChg chg="add mod">
+          <ac:chgData name="Fatima Pillosu" userId="a6295d4dc9e22643" providerId="LiveId" clId="{AEACF5B8-E1B8-484D-AA65-19A39BABB57B}" dt="2022-01-19T05:15:00.113" v="803" actId="1037"/>
+          <ac:spMkLst>
+            <pc:docMk/>
+            <pc:sldMk cId="1489261767" sldId="259"/>
+            <ac:spMk id="24" creationId="{8EED52F0-3C91-4E2A-9B21-9611DD4ADB49}"/>
+          </ac:spMkLst>
+        </pc:spChg>
+        <pc:spChg chg="add mod">
+          <ac:chgData name="Fatima Pillosu" userId="a6295d4dc9e22643" providerId="LiveId" clId="{AEACF5B8-E1B8-484D-AA65-19A39BABB57B}" dt="2022-01-19T05:15:00.113" v="803" actId="1037"/>
+          <ac:spMkLst>
+            <pc:docMk/>
+            <pc:sldMk cId="1489261767" sldId="259"/>
+            <ac:spMk id="25" creationId="{989CC310-3A85-4936-8D93-1EDBE70B42CA}"/>
+          </ac:spMkLst>
+        </pc:spChg>
+        <pc:spChg chg="add mod">
+          <ac:chgData name="Fatima Pillosu" userId="a6295d4dc9e22643" providerId="LiveId" clId="{AEACF5B8-E1B8-484D-AA65-19A39BABB57B}" dt="2022-01-19T05:15:00.113" v="803" actId="1037"/>
+          <ac:spMkLst>
+            <pc:docMk/>
+            <pc:sldMk cId="1489261767" sldId="259"/>
+            <ac:spMk id="26" creationId="{3A5A59EC-905F-4773-9E33-4910A6BDE60B}"/>
+          </ac:spMkLst>
+        </pc:spChg>
+        <pc:spChg chg="add mod">
+          <ac:chgData name="Fatima Pillosu" userId="a6295d4dc9e22643" providerId="LiveId" clId="{AEACF5B8-E1B8-484D-AA65-19A39BABB57B}" dt="2022-01-19T05:15:00.113" v="803" actId="1037"/>
+          <ac:spMkLst>
+            <pc:docMk/>
+            <pc:sldMk cId="1489261767" sldId="259"/>
+            <ac:spMk id="27" creationId="{A26337D8-0FE5-4D9B-99EE-E080A3C756BA}"/>
+          </ac:spMkLst>
+        </pc:spChg>
+        <pc:spChg chg="add mod">
+          <ac:chgData name="Fatima Pillosu" userId="a6295d4dc9e22643" providerId="LiveId" clId="{AEACF5B8-E1B8-484D-AA65-19A39BABB57B}" dt="2022-01-19T05:15:00.113" v="803" actId="1037"/>
+          <ac:spMkLst>
+            <pc:docMk/>
+            <pc:sldMk cId="1489261767" sldId="259"/>
+            <ac:spMk id="28" creationId="{1B6DC95C-2A65-4E12-B9B5-6FA072B768AD}"/>
+          </ac:spMkLst>
+        </pc:spChg>
+        <pc:spChg chg="add mod">
+          <ac:chgData name="Fatima Pillosu" userId="a6295d4dc9e22643" providerId="LiveId" clId="{AEACF5B8-E1B8-484D-AA65-19A39BABB57B}" dt="2022-01-19T05:15:00.113" v="803" actId="1037"/>
+          <ac:spMkLst>
+            <pc:docMk/>
+            <pc:sldMk cId="1489261767" sldId="259"/>
+            <ac:spMk id="29" creationId="{7E9D24DC-2D99-4FC8-9293-BBA859DAD20B}"/>
+          </ac:spMkLst>
+        </pc:spChg>
+        <pc:spChg chg="add mod">
+          <ac:chgData name="Fatima Pillosu" userId="a6295d4dc9e22643" providerId="LiveId" clId="{AEACF5B8-E1B8-484D-AA65-19A39BABB57B}" dt="2022-01-19T05:15:00.113" v="803" actId="1037"/>
+          <ac:spMkLst>
+            <pc:docMk/>
+            <pc:sldMk cId="1489261767" sldId="259"/>
+            <ac:spMk id="30" creationId="{98873132-B7AF-401D-96F8-984F7D17D771}"/>
+          </ac:spMkLst>
+        </pc:spChg>
         <pc:spChg chg="del mod">
           <ac:chgData name="Fatima Pillosu" userId="a6295d4dc9e22643" providerId="LiveId" clId="{AEACF5B8-E1B8-484D-AA65-19A39BABB57B}" dt="2022-01-18T15:49:48.420" v="351" actId="21"/>
           <ac:spMkLst>
@@ -241,7 +296,7 @@
           </ac:spMkLst>
         </pc:spChg>
         <pc:spChg chg="add mod">
-          <ac:chgData name="Fatima Pillosu" userId="a6295d4dc9e22643" providerId="LiveId" clId="{AEACF5B8-E1B8-484D-AA65-19A39BABB57B}" dt="2022-01-18T17:12:56.461" v="625" actId="1076"/>
+          <ac:chgData name="Fatima Pillosu" userId="a6295d4dc9e22643" providerId="LiveId" clId="{AEACF5B8-E1B8-484D-AA65-19A39BABB57B}" dt="2022-01-19T05:15:05.951" v="812" actId="20577"/>
           <ac:spMkLst>
             <pc:docMk/>
             <pc:sldMk cId="1489261767" sldId="259"/>
@@ -257,7 +312,7 @@
           </ac:spMkLst>
         </pc:spChg>
         <pc:spChg chg="add mod">
-          <ac:chgData name="Fatima Pillosu" userId="a6295d4dc9e22643" providerId="LiveId" clId="{AEACF5B8-E1B8-484D-AA65-19A39BABB57B}" dt="2022-01-18T15:50:12.137" v="356" actId="1036"/>
+          <ac:chgData name="Fatima Pillosu" userId="a6295d4dc9e22643" providerId="LiveId" clId="{AEACF5B8-E1B8-484D-AA65-19A39BABB57B}" dt="2022-01-19T05:15:00.113" v="803" actId="1037"/>
           <ac:spMkLst>
             <pc:docMk/>
             <pc:sldMk cId="1489261767" sldId="259"/>
@@ -273,15 +328,15 @@
           </ac:spMkLst>
         </pc:spChg>
         <pc:spChg chg="add mod">
-          <ac:chgData name="Fatima Pillosu" userId="a6295d4dc9e22643" providerId="LiveId" clId="{AEACF5B8-E1B8-484D-AA65-19A39BABB57B}" dt="2022-01-18T15:50:12.137" v="356" actId="1036"/>
+          <ac:chgData name="Fatima Pillosu" userId="a6295d4dc9e22643" providerId="LiveId" clId="{AEACF5B8-E1B8-484D-AA65-19A39BABB57B}" dt="2022-01-19T05:15:00.113" v="803" actId="1037"/>
           <ac:spMkLst>
             <pc:docMk/>
             <pc:sldMk cId="1489261767" sldId="259"/>
             <ac:spMk id="69" creationId="{B2688E76-5FD0-4F52-A97A-E43BF1D1D85D}"/>
           </ac:spMkLst>
         </pc:spChg>
-        <pc:spChg chg="add mod">
-          <ac:chgData name="Fatima Pillosu" userId="a6295d4dc9e22643" providerId="LiveId" clId="{AEACF5B8-E1B8-484D-AA65-19A39BABB57B}" dt="2022-01-18T17:12:45.474" v="623" actId="1076"/>
+        <pc:spChg chg="add del mod">
+          <ac:chgData name="Fatima Pillosu" userId="a6295d4dc9e22643" providerId="LiveId" clId="{AEACF5B8-E1B8-484D-AA65-19A39BABB57B}" dt="2022-01-19T05:08:22.097" v="682" actId="478"/>
           <ac:spMkLst>
             <pc:docMk/>
             <pc:sldMk cId="1489261767" sldId="259"/>
@@ -289,7 +344,7 @@
           </ac:spMkLst>
         </pc:spChg>
         <pc:spChg chg="add mod">
-          <ac:chgData name="Fatima Pillosu" userId="a6295d4dc9e22643" providerId="LiveId" clId="{AEACF5B8-E1B8-484D-AA65-19A39BABB57B}" dt="2022-01-18T17:12:12.929" v="609" actId="14100"/>
+          <ac:chgData name="Fatima Pillosu" userId="a6295d4dc9e22643" providerId="LiveId" clId="{AEACF5B8-E1B8-484D-AA65-19A39BABB57B}" dt="2022-01-19T05:15:00.113" v="803" actId="1037"/>
           <ac:spMkLst>
             <pc:docMk/>
             <pc:sldMk cId="1489261767" sldId="259"/>
@@ -305,7 +360,7 @@
           </ac:spMkLst>
         </pc:spChg>
         <pc:spChg chg="add mod">
-          <ac:chgData name="Fatima Pillosu" userId="a6295d4dc9e22643" providerId="LiveId" clId="{AEACF5B8-E1B8-484D-AA65-19A39BABB57B}" dt="2022-01-18T15:50:12.137" v="356" actId="1036"/>
+          <ac:chgData name="Fatima Pillosu" userId="a6295d4dc9e22643" providerId="LiveId" clId="{AEACF5B8-E1B8-484D-AA65-19A39BABB57B}" dt="2022-01-19T05:15:00.113" v="803" actId="1037"/>
           <ac:spMkLst>
             <pc:docMk/>
             <pc:sldMk cId="1489261767" sldId="259"/>
@@ -313,7 +368,7 @@
           </ac:spMkLst>
         </pc:spChg>
         <pc:spChg chg="add mod">
-          <ac:chgData name="Fatima Pillosu" userId="a6295d4dc9e22643" providerId="LiveId" clId="{AEACF5B8-E1B8-484D-AA65-19A39BABB57B}" dt="2022-01-18T15:50:12.137" v="356" actId="1036"/>
+          <ac:chgData name="Fatima Pillosu" userId="a6295d4dc9e22643" providerId="LiveId" clId="{AEACF5B8-E1B8-484D-AA65-19A39BABB57B}" dt="2022-01-19T05:15:00.113" v="803" actId="1037"/>
           <ac:spMkLst>
             <pc:docMk/>
             <pc:sldMk cId="1489261767" sldId="259"/>
@@ -353,7 +408,7 @@
           </ac:spMkLst>
         </pc:spChg>
         <pc:spChg chg="add mod">
-          <ac:chgData name="Fatima Pillosu" userId="a6295d4dc9e22643" providerId="LiveId" clId="{AEACF5B8-E1B8-484D-AA65-19A39BABB57B}" dt="2022-01-18T17:12:51.615" v="624" actId="1076"/>
+          <ac:chgData name="Fatima Pillosu" userId="a6295d4dc9e22643" providerId="LiveId" clId="{AEACF5B8-E1B8-484D-AA65-19A39BABB57B}" dt="2022-01-19T05:15:00.113" v="803" actId="1037"/>
           <ac:spMkLst>
             <pc:docMk/>
             <pc:sldMk cId="1489261767" sldId="259"/>
@@ -408,8 +463,8 @@
             <ac:spMk id="161" creationId="{91D08E8B-4E44-4400-9BC5-3BD9EF49592E}"/>
           </ac:spMkLst>
         </pc:spChg>
-        <pc:picChg chg="add mod modCrop">
-          <ac:chgData name="Fatima Pillosu" userId="a6295d4dc9e22643" providerId="LiveId" clId="{AEACF5B8-E1B8-484D-AA65-19A39BABB57B}" dt="2022-01-18T17:12:39.514" v="622" actId="1038"/>
+        <pc:picChg chg="add del mod modCrop">
+          <ac:chgData name="Fatima Pillosu" userId="a6295d4dc9e22643" providerId="LiveId" clId="{AEACF5B8-E1B8-484D-AA65-19A39BABB57B}" dt="2022-01-19T05:03:16.088" v="637" actId="478"/>
           <ac:picMkLst>
             <pc:docMk/>
             <pc:sldMk cId="1489261767" sldId="259"/>
@@ -417,15 +472,23 @@
           </ac:picMkLst>
         </pc:picChg>
         <pc:picChg chg="add mod modCrop">
-          <ac:chgData name="Fatima Pillosu" userId="a6295d4dc9e22643" providerId="LiveId" clId="{AEACF5B8-E1B8-484D-AA65-19A39BABB57B}" dt="2022-01-18T17:12:39.514" v="622" actId="1038"/>
+          <ac:chgData name="Fatima Pillosu" userId="a6295d4dc9e22643" providerId="LiveId" clId="{AEACF5B8-E1B8-484D-AA65-19A39BABB57B}" dt="2022-01-19T05:15:00.113" v="803" actId="1037"/>
+          <ac:picMkLst>
+            <pc:docMk/>
+            <pc:sldMk cId="1489261767" sldId="259"/>
+            <ac:picMk id="4" creationId="{4BCD30A1-3FB5-4957-BE30-1698BC9925AE}"/>
+          </ac:picMkLst>
+        </pc:picChg>
+        <pc:picChg chg="add del mod modCrop">
+          <ac:chgData name="Fatima Pillosu" userId="a6295d4dc9e22643" providerId="LiveId" clId="{AEACF5B8-E1B8-484D-AA65-19A39BABB57B}" dt="2022-01-19T05:03:16.814" v="638" actId="478"/>
           <ac:picMkLst>
             <pc:docMk/>
             <pc:sldMk cId="1489261767" sldId="259"/>
             <ac:picMk id="5" creationId="{647CB8AE-FCBA-4B1B-8002-42FD30E3A189}"/>
           </ac:picMkLst>
         </pc:picChg>
-        <pc:picChg chg="add mod modCrop">
-          <ac:chgData name="Fatima Pillosu" userId="a6295d4dc9e22643" providerId="LiveId" clId="{AEACF5B8-E1B8-484D-AA65-19A39BABB57B}" dt="2022-01-18T17:12:39.514" v="622" actId="1038"/>
+        <pc:picChg chg="add del mod modCrop">
+          <ac:chgData name="Fatima Pillosu" userId="a6295d4dc9e22643" providerId="LiveId" clId="{AEACF5B8-E1B8-484D-AA65-19A39BABB57B}" dt="2022-01-19T05:03:17.835" v="640" actId="478"/>
           <ac:picMkLst>
             <pc:docMk/>
             <pc:sldMk cId="1489261767" sldId="259"/>
@@ -433,11 +496,35 @@
           </ac:picMkLst>
         </pc:picChg>
         <pc:picChg chg="add mod modCrop">
-          <ac:chgData name="Fatima Pillosu" userId="a6295d4dc9e22643" providerId="LiveId" clId="{AEACF5B8-E1B8-484D-AA65-19A39BABB57B}" dt="2022-01-18T17:12:39.514" v="622" actId="1038"/>
+          <ac:chgData name="Fatima Pillosu" userId="a6295d4dc9e22643" providerId="LiveId" clId="{AEACF5B8-E1B8-484D-AA65-19A39BABB57B}" dt="2022-01-19T05:15:00.113" v="803" actId="1037"/>
           <ac:picMkLst>
             <pc:docMk/>
             <pc:sldMk cId="1489261767" sldId="259"/>
+            <ac:picMk id="8" creationId="{F5FE749A-6756-492A-BFBF-75B353B54313}"/>
+          </ac:picMkLst>
+        </pc:picChg>
+        <pc:picChg chg="add del mod modCrop">
+          <ac:chgData name="Fatima Pillosu" userId="a6295d4dc9e22643" providerId="LiveId" clId="{AEACF5B8-E1B8-484D-AA65-19A39BABB57B}" dt="2022-01-19T05:03:17.341" v="639" actId="478"/>
+          <ac:picMkLst>
+            <pc:docMk/>
+            <pc:sldMk cId="1489261767" sldId="259"/>
             <ac:picMk id="9" creationId="{9D6BA245-8585-4D56-B1A9-2CA927A6C293}"/>
+          </ac:picMkLst>
+        </pc:picChg>
+        <pc:picChg chg="add mod modCrop">
+          <ac:chgData name="Fatima Pillosu" userId="a6295d4dc9e22643" providerId="LiveId" clId="{AEACF5B8-E1B8-484D-AA65-19A39BABB57B}" dt="2022-01-19T05:15:00.113" v="803" actId="1037"/>
+          <ac:picMkLst>
+            <pc:docMk/>
+            <pc:sldMk cId="1489261767" sldId="259"/>
+            <ac:picMk id="11" creationId="{5934FE13-38F4-4272-A4FB-455012046D64}"/>
+          </ac:picMkLst>
+        </pc:picChg>
+        <pc:picChg chg="add mod modCrop">
+          <ac:chgData name="Fatima Pillosu" userId="a6295d4dc9e22643" providerId="LiveId" clId="{AEACF5B8-E1B8-484D-AA65-19A39BABB57B}" dt="2022-01-19T05:15:00.113" v="803" actId="1037"/>
+          <ac:picMkLst>
+            <pc:docMk/>
+            <pc:sldMk cId="1489261767" sldId="259"/>
+            <ac:picMk id="13" creationId="{A27832E1-8976-4EFD-A115-0B8D4D45B3B9}"/>
           </ac:picMkLst>
         </pc:picChg>
         <pc:picChg chg="del mod">
@@ -529,7 +616,7 @@
           </ac:cxnSpMkLst>
         </pc:cxnChg>
         <pc:cxnChg chg="add mod">
-          <ac:chgData name="Fatima Pillosu" userId="a6295d4dc9e22643" providerId="LiveId" clId="{AEACF5B8-E1B8-484D-AA65-19A39BABB57B}" dt="2022-01-18T15:50:12.137" v="356" actId="1036"/>
+          <ac:chgData name="Fatima Pillosu" userId="a6295d4dc9e22643" providerId="LiveId" clId="{AEACF5B8-E1B8-484D-AA65-19A39BABB57B}" dt="2022-01-19T05:15:00.113" v="803" actId="1037"/>
           <ac:cxnSpMkLst>
             <pc:docMk/>
             <pc:sldMk cId="1489261767" sldId="259"/>
@@ -537,7 +624,7 @@
           </ac:cxnSpMkLst>
         </pc:cxnChg>
         <pc:cxnChg chg="add mod">
-          <ac:chgData name="Fatima Pillosu" userId="a6295d4dc9e22643" providerId="LiveId" clId="{AEACF5B8-E1B8-484D-AA65-19A39BABB57B}" dt="2022-01-18T15:50:12.137" v="356" actId="1036"/>
+          <ac:chgData name="Fatima Pillosu" userId="a6295d4dc9e22643" providerId="LiveId" clId="{AEACF5B8-E1B8-484D-AA65-19A39BABB57B}" dt="2022-01-19T05:15:00.113" v="803" actId="1037"/>
           <ac:cxnSpMkLst>
             <pc:docMk/>
             <pc:sldMk cId="1489261767" sldId="259"/>
@@ -896,8 +983,8 @@
           <pc:sldMk cId="3036955875" sldId="260"/>
         </pc:sldMkLst>
       </pc:sldChg>
-      <pc:sldChg chg="add">
-        <pc:chgData name="Fatima Pillosu" userId="a6295d4dc9e22643" providerId="LiveId" clId="{AEACF5B8-E1B8-484D-AA65-19A39BABB57B}" dt="2022-01-18T17:09:47.785" v="561" actId="2890"/>
+      <pc:sldChg chg="add del">
+        <pc:chgData name="Fatima Pillosu" userId="a6295d4dc9e22643" providerId="LiveId" clId="{AEACF5B8-E1B8-484D-AA65-19A39BABB57B}" dt="2022-01-19T05:05:58.823" v="662" actId="2696"/>
         <pc:sldMkLst>
           <pc:docMk/>
           <pc:sldMk cId="4285056876" sldId="260"/>
@@ -1039,7 +1126,7 @@
           <a:p>
             <a:fld id="{30CAAFB8-EE70-486E-B3AB-0D048359C07E}" type="datetimeFigureOut">
               <a:rPr lang="en-GB" smtClean="0"/>
-              <a:t>18/01/2022</a:t>
+              <a:t>19/01/2022</a:t>
             </a:fld>
             <a:endParaRPr lang="en-GB"/>
           </a:p>
@@ -1209,7 +1296,7 @@
           <a:p>
             <a:fld id="{30CAAFB8-EE70-486E-B3AB-0D048359C07E}" type="datetimeFigureOut">
               <a:rPr lang="en-GB" smtClean="0"/>
-              <a:t>18/01/2022</a:t>
+              <a:t>19/01/2022</a:t>
             </a:fld>
             <a:endParaRPr lang="en-GB"/>
           </a:p>
@@ -1389,7 +1476,7 @@
           <a:p>
             <a:fld id="{30CAAFB8-EE70-486E-B3AB-0D048359C07E}" type="datetimeFigureOut">
               <a:rPr lang="en-GB" smtClean="0"/>
-              <a:t>18/01/2022</a:t>
+              <a:t>19/01/2022</a:t>
             </a:fld>
             <a:endParaRPr lang="en-GB"/>
           </a:p>
@@ -1559,7 +1646,7 @@
           <a:p>
             <a:fld id="{30CAAFB8-EE70-486E-B3AB-0D048359C07E}" type="datetimeFigureOut">
               <a:rPr lang="en-GB" smtClean="0"/>
-              <a:t>18/01/2022</a:t>
+              <a:t>19/01/2022</a:t>
             </a:fld>
             <a:endParaRPr lang="en-GB"/>
           </a:p>
@@ -1803,7 +1890,7 @@
           <a:p>
             <a:fld id="{30CAAFB8-EE70-486E-B3AB-0D048359C07E}" type="datetimeFigureOut">
               <a:rPr lang="en-GB" smtClean="0"/>
-              <a:t>18/01/2022</a:t>
+              <a:t>19/01/2022</a:t>
             </a:fld>
             <a:endParaRPr lang="en-GB"/>
           </a:p>
@@ -2035,7 +2122,7 @@
           <a:p>
             <a:fld id="{30CAAFB8-EE70-486E-B3AB-0D048359C07E}" type="datetimeFigureOut">
               <a:rPr lang="en-GB" smtClean="0"/>
-              <a:t>18/01/2022</a:t>
+              <a:t>19/01/2022</a:t>
             </a:fld>
             <a:endParaRPr lang="en-GB"/>
           </a:p>
@@ -2402,7 +2489,7 @@
           <a:p>
             <a:fld id="{30CAAFB8-EE70-486E-B3AB-0D048359C07E}" type="datetimeFigureOut">
               <a:rPr lang="en-GB" smtClean="0"/>
-              <a:t>18/01/2022</a:t>
+              <a:t>19/01/2022</a:t>
             </a:fld>
             <a:endParaRPr lang="en-GB"/>
           </a:p>
@@ -2520,7 +2607,7 @@
           <a:p>
             <a:fld id="{30CAAFB8-EE70-486E-B3AB-0D048359C07E}" type="datetimeFigureOut">
               <a:rPr lang="en-GB" smtClean="0"/>
-              <a:t>18/01/2022</a:t>
+              <a:t>19/01/2022</a:t>
             </a:fld>
             <a:endParaRPr lang="en-GB"/>
           </a:p>
@@ -2615,7 +2702,7 @@
           <a:p>
             <a:fld id="{30CAAFB8-EE70-486E-B3AB-0D048359C07E}" type="datetimeFigureOut">
               <a:rPr lang="en-GB" smtClean="0"/>
-              <a:t>18/01/2022</a:t>
+              <a:t>19/01/2022</a:t>
             </a:fld>
             <a:endParaRPr lang="en-GB"/>
           </a:p>
@@ -2892,7 +2979,7 @@
           <a:p>
             <a:fld id="{30CAAFB8-EE70-486E-B3AB-0D048359C07E}" type="datetimeFigureOut">
               <a:rPr lang="en-GB" smtClean="0"/>
-              <a:t>18/01/2022</a:t>
+              <a:t>19/01/2022</a:t>
             </a:fld>
             <a:endParaRPr lang="en-GB"/>
           </a:p>
@@ -3149,7 +3236,7 @@
           <a:p>
             <a:fld id="{30CAAFB8-EE70-486E-B3AB-0D048359C07E}" type="datetimeFigureOut">
               <a:rPr lang="en-GB" smtClean="0"/>
-              <a:t>18/01/2022</a:t>
+              <a:t>19/01/2022</a:t>
             </a:fld>
             <a:endParaRPr lang="en-GB"/>
           </a:p>
@@ -3362,7 +3449,7 @@
           <a:p>
             <a:fld id="{30CAAFB8-EE70-486E-B3AB-0D048359C07E}" type="datetimeFigureOut">
               <a:rPr lang="en-GB" smtClean="0"/>
-              <a:t>18/01/2022</a:t>
+              <a:t>19/01/2022</a:t>
             </a:fld>
             <a:endParaRPr lang="en-GB"/>
           </a:p>
@@ -3781,8 +3868,8 @@
         </p:nvSpPr>
         <p:spPr>
           <a:xfrm>
-            <a:off x="3330121" y="5029497"/>
-            <a:ext cx="2650484" cy="215444"/>
+            <a:off x="3505199" y="5029497"/>
+            <a:ext cx="2520583" cy="215444"/>
           </a:xfrm>
           <a:prstGeom prst="rect">
             <a:avLst/>
@@ -3798,7 +3885,7 @@
             <a:pPr algn="ctr"/>
             <a:r>
               <a:rPr lang="en-GB" sz="800" dirty="0"/>
-              <a:t>Steps at the end of 12-h accumulation periods</a:t>
+              <a:t>Steps at the end of 12 hourly accumulation periods</a:t>
             </a:r>
           </a:p>
         </p:txBody>
@@ -3817,8 +3904,8 @@
         </p:nvSpPr>
         <p:spPr>
           <a:xfrm>
-            <a:off x="401383" y="204358"/>
-            <a:ext cx="2667021" cy="246221"/>
+            <a:off x="628650" y="271033"/>
+            <a:ext cx="2539436" cy="246221"/>
           </a:xfrm>
           <a:prstGeom prst="rect">
             <a:avLst/>
@@ -3833,7 +3920,7 @@
           <a:p>
             <a:pPr algn="ctr"/>
             <a:r>
-              <a:rPr lang="en-GB" sz="1000" dirty="0"/>
+              <a:rPr lang="en-GB" sz="1000" b="1" dirty="0"/>
               <a:t>“La Costa”</a:t>
             </a:r>
           </a:p>
@@ -3853,8 +3940,8 @@
         </p:nvSpPr>
         <p:spPr>
           <a:xfrm>
-            <a:off x="3369216" y="204358"/>
-            <a:ext cx="2650484" cy="246221"/>
+            <a:off x="3505200" y="271033"/>
+            <a:ext cx="2524034" cy="246221"/>
           </a:xfrm>
           <a:prstGeom prst="rect">
             <a:avLst/>
@@ -3869,7 +3956,7 @@
           <a:p>
             <a:pPr algn="ctr"/>
             <a:r>
-              <a:rPr lang="en-GB" sz="1000" dirty="0"/>
+              <a:rPr lang="en-GB" sz="1000" b="1" dirty="0"/>
               <a:t>“La Sierra”</a:t>
             </a:r>
           </a:p>
@@ -3891,7 +3978,7 @@
         </p:nvCxnSpPr>
         <p:spPr>
           <a:xfrm>
-            <a:off x="3291920" y="228596"/>
+            <a:off x="3234770" y="228596"/>
             <a:ext cx="540000" cy="0"/>
           </a:xfrm>
           <a:prstGeom prst="line">
@@ -3934,7 +4021,7 @@
         </p:nvCxnSpPr>
         <p:spPr>
           <a:xfrm>
-            <a:off x="2546673" y="228596"/>
+            <a:off x="2489523" y="228596"/>
             <a:ext cx="540000" cy="0"/>
           </a:xfrm>
           <a:prstGeom prst="line">
@@ -3975,7 +4062,7 @@
         </p:nvSpPr>
         <p:spPr>
           <a:xfrm>
-            <a:off x="2578125" y="-17770"/>
+            <a:off x="2520975" y="-17770"/>
             <a:ext cx="477097" cy="246366"/>
           </a:xfrm>
           <a:prstGeom prst="rect">
@@ -4011,7 +4098,7 @@
         </p:nvSpPr>
         <p:spPr>
           <a:xfrm>
-            <a:off x="3233380" y="-17770"/>
+            <a:off x="3176230" y="-17770"/>
             <a:ext cx="657080" cy="246221"/>
           </a:xfrm>
           <a:prstGeom prst="rect">
@@ -4047,8 +4134,8 @@
         </p:nvSpPr>
         <p:spPr>
           <a:xfrm>
-            <a:off x="450121" y="5033057"/>
-            <a:ext cx="2650484" cy="215444"/>
+            <a:off x="628650" y="5033057"/>
+            <a:ext cx="2520583" cy="215444"/>
           </a:xfrm>
           <a:prstGeom prst="rect">
             <a:avLst/>
@@ -4064,17 +4151,53 @@
             <a:pPr algn="ctr"/>
             <a:r>
               <a:rPr lang="en-GB" sz="800" dirty="0"/>
-              <a:t>Steps at the end of 12-h accumulation periods</a:t>
+              <a:t>Steps at the end of 12 hourly accumulation periods</a:t>
+            </a:r>
+          </a:p>
+        </p:txBody>
+      </p:sp>
+      <p:sp>
+        <p:nvSpPr>
+          <p:cNvPr id="74" name="TextBox 73">
+            <a:extLst>
+              <a:ext uri="{FF2B5EF4-FFF2-40B4-BE49-F238E27FC236}">
+                <a16:creationId xmlns:a16="http://schemas.microsoft.com/office/drawing/2014/main" id="{731D2FA9-E557-41FD-8400-9864995A64F0}"/>
+              </a:ext>
+            </a:extLst>
+          </p:cNvPr>
+          <p:cNvSpPr txBox="1"/>
+          <p:nvPr/>
+        </p:nvSpPr>
+        <p:spPr>
+          <a:xfrm rot="16200000">
+            <a:off x="-636861" y="1366495"/>
+            <a:ext cx="1966466" cy="215444"/>
+          </a:xfrm>
+          <a:prstGeom prst="rect">
+            <a:avLst/>
+          </a:prstGeom>
+          <a:noFill/>
+        </p:spPr>
+        <p:txBody>
+          <a:bodyPr wrap="square" rtlCol="0">
+            <a:spAutoFit/>
+          </a:bodyPr>
+          <a:lstStyle/>
+          <a:p>
+            <a:pPr algn="ctr"/>
+            <a:r>
+              <a:rPr lang="en-GB" sz="800" dirty="0"/>
+              <a:t>Area under the ROC</a:t>
             </a:r>
           </a:p>
         </p:txBody>
       </p:sp>
       <p:pic>
         <p:nvPicPr>
-          <p:cNvPr id="3" name="Picture 2" descr="Chart, histogram&#10;&#10;Description automatically generated">
+          <p:cNvPr id="4" name="Picture 3" descr="Chart, histogram&#10;&#10;Description automatically generated">
             <a:extLst>
               <a:ext uri="{FF2B5EF4-FFF2-40B4-BE49-F238E27FC236}">
-                <a16:creationId xmlns:a16="http://schemas.microsoft.com/office/drawing/2014/main" id="{AA2AE781-3369-4FEB-9AFD-D06BB5047BFC}"/>
+                <a16:creationId xmlns:a16="http://schemas.microsoft.com/office/drawing/2014/main" id="{4BCD30A1-3FB5-4957-BE30-1698BC9925AE}"/>
               </a:ext>
             </a:extLst>
           </p:cNvPr>
@@ -4091,13 +4214,13 @@
               </a:ext>
             </a:extLst>
           </a:blip>
-          <a:srcRect l="6047" t="5317" r="8681"/>
+          <a:srcRect l="6241" t="5381" r="8689"/>
           <a:stretch/>
         </p:blipFill>
         <p:spPr>
           <a:xfrm>
-            <a:off x="337811" y="400412"/>
-            <a:ext cx="2762794" cy="2299925"/>
+            <a:off x="419967" y="433498"/>
+            <a:ext cx="2756263" cy="2298357"/>
           </a:xfrm>
           <a:prstGeom prst="rect">
             <a:avLst/>
@@ -4106,10 +4229,10 @@
       </p:pic>
       <p:pic>
         <p:nvPicPr>
-          <p:cNvPr id="5" name="Picture 4" descr="Chart&#10;&#10;Description automatically generated">
+          <p:cNvPr id="8" name="Picture 7" descr="Chart, bar chart, histogram&#10;&#10;Description automatically generated">
             <a:extLst>
               <a:ext uri="{FF2B5EF4-FFF2-40B4-BE49-F238E27FC236}">
-                <a16:creationId xmlns:a16="http://schemas.microsoft.com/office/drawing/2014/main" id="{647CB8AE-FCBA-4B1B-8002-42FD30E3A189}"/>
+                <a16:creationId xmlns:a16="http://schemas.microsoft.com/office/drawing/2014/main" id="{F5FE749A-6756-492A-BFBF-75B353B54313}"/>
               </a:ext>
             </a:extLst>
           </p:cNvPr>
@@ -4126,13 +4249,13 @@
               </a:ext>
             </a:extLst>
           </a:blip>
-          <a:srcRect l="6047" t="5323" r="8681"/>
+          <a:srcRect l="6241" t="5381" r="8689"/>
           <a:stretch/>
         </p:blipFill>
         <p:spPr>
           <a:xfrm>
-            <a:off x="3217811" y="399753"/>
-            <a:ext cx="2762794" cy="2299780"/>
+            <a:off x="3272971" y="433498"/>
+            <a:ext cx="2756263" cy="2298356"/>
           </a:xfrm>
           <a:prstGeom prst="rect">
             <a:avLst/>
@@ -4141,10 +4264,10 @@
       </p:pic>
       <p:pic>
         <p:nvPicPr>
-          <p:cNvPr id="7" name="Picture 6" descr="Chart&#10;&#10;Description automatically generated">
+          <p:cNvPr id="11" name="Picture 10" descr="Chart, bar chart, histogram&#10;&#10;Description automatically generated">
             <a:extLst>
               <a:ext uri="{FF2B5EF4-FFF2-40B4-BE49-F238E27FC236}">
-                <a16:creationId xmlns:a16="http://schemas.microsoft.com/office/drawing/2014/main" id="{C5D75D13-E7EE-4CAA-8EE6-75C55E3EABCC}"/>
+                <a16:creationId xmlns:a16="http://schemas.microsoft.com/office/drawing/2014/main" id="{5934FE13-38F4-4272-A4FB-455012046D64}"/>
               </a:ext>
             </a:extLst>
           </p:cNvPr>
@@ -4161,13 +4284,13 @@
               </a:ext>
             </a:extLst>
           </a:blip>
-          <a:srcRect l="6047" t="5323" r="8681"/>
+          <a:srcRect l="6241" t="5381" r="8689"/>
           <a:stretch/>
         </p:blipFill>
         <p:spPr>
           <a:xfrm>
-            <a:off x="337811" y="2733278"/>
-            <a:ext cx="2762794" cy="2299780"/>
+            <a:off x="419967" y="2733278"/>
+            <a:ext cx="2756263" cy="2298356"/>
           </a:xfrm>
           <a:prstGeom prst="rect">
             <a:avLst/>
@@ -4176,10 +4299,10 @@
       </p:pic>
       <p:pic>
         <p:nvPicPr>
-          <p:cNvPr id="9" name="Picture 8" descr="Chart, histogram&#10;&#10;Description automatically generated">
+          <p:cNvPr id="13" name="Picture 12" descr="Chart, bar chart, histogram&#10;&#10;Description automatically generated">
             <a:extLst>
               <a:ext uri="{FF2B5EF4-FFF2-40B4-BE49-F238E27FC236}">
-                <a16:creationId xmlns:a16="http://schemas.microsoft.com/office/drawing/2014/main" id="{9D6BA245-8585-4D56-B1A9-2CA927A6C293}"/>
+                <a16:creationId xmlns:a16="http://schemas.microsoft.com/office/drawing/2014/main" id="{A27832E1-8976-4EFD-A115-0B8D4D45B3B9}"/>
               </a:ext>
             </a:extLst>
           </p:cNvPr>
@@ -4196,13 +4319,13 @@
               </a:ext>
             </a:extLst>
           </a:blip>
-          <a:srcRect l="6047" t="5323" r="8681"/>
+          <a:srcRect l="6241" t="5381" r="8689"/>
           <a:stretch/>
         </p:blipFill>
         <p:spPr>
           <a:xfrm>
-            <a:off x="3217811" y="2733278"/>
-            <a:ext cx="2762794" cy="2299779"/>
+            <a:off x="3272971" y="2733278"/>
+            <a:ext cx="2756263" cy="2298356"/>
           </a:xfrm>
           <a:prstGeom prst="rect">
             <a:avLst/>
@@ -4211,10 +4334,10 @@
       </p:pic>
       <p:sp>
         <p:nvSpPr>
-          <p:cNvPr id="73" name="TextBox 72">
+          <p:cNvPr id="24" name="TextBox 23">
             <a:extLst>
               <a:ext uri="{FF2B5EF4-FFF2-40B4-BE49-F238E27FC236}">
-                <a16:creationId xmlns:a16="http://schemas.microsoft.com/office/drawing/2014/main" id="{C1D12DF9-87B0-4222-A6B9-241033479852}"/>
+                <a16:creationId xmlns:a16="http://schemas.microsoft.com/office/drawing/2014/main" id="{8EED52F0-3C91-4E2A-9B21-9611DD4ADB49}"/>
               </a:ext>
             </a:extLst>
           </p:cNvPr>
@@ -4222,395 +4345,9 @@
           <p:nvPr/>
         </p:nvSpPr>
         <p:spPr>
-          <a:xfrm rot="16200000">
-            <a:off x="-794311" y="3621646"/>
-            <a:ext cx="1992179" cy="215444"/>
-          </a:xfrm>
-          <a:prstGeom prst="rect">
-            <a:avLst/>
-          </a:prstGeom>
-          <a:noFill/>
-        </p:spPr>
-        <p:txBody>
-          <a:bodyPr wrap="square" rtlCol="0">
-            <a:spAutoFit/>
-          </a:bodyPr>
-          <a:lstStyle/>
-          <a:p>
-            <a:pPr algn="ctr"/>
-            <a:r>
-              <a:rPr lang="en-GB" sz="800" dirty="0"/>
-              <a:t>Area under the ROC</a:t>
-            </a:r>
-          </a:p>
-        </p:txBody>
-      </p:sp>
-      <p:sp>
-        <p:nvSpPr>
-          <p:cNvPr id="74" name="TextBox 73">
-            <a:extLst>
-              <a:ext uri="{FF2B5EF4-FFF2-40B4-BE49-F238E27FC236}">
-                <a16:creationId xmlns:a16="http://schemas.microsoft.com/office/drawing/2014/main" id="{731D2FA9-E557-41FD-8400-9864995A64F0}"/>
-              </a:ext>
-            </a:extLst>
-          </p:cNvPr>
-          <p:cNvSpPr txBox="1"/>
-          <p:nvPr/>
-        </p:nvSpPr>
-        <p:spPr>
-          <a:xfrm rot="16200000">
-            <a:off x="-794311" y="1338946"/>
-            <a:ext cx="1992177" cy="215444"/>
-          </a:xfrm>
-          <a:prstGeom prst="rect">
-            <a:avLst/>
-          </a:prstGeom>
-          <a:noFill/>
-        </p:spPr>
-        <p:txBody>
-          <a:bodyPr wrap="square" rtlCol="0">
-            <a:spAutoFit/>
-          </a:bodyPr>
-          <a:lstStyle/>
-          <a:p>
-            <a:pPr algn="ctr"/>
-            <a:r>
-              <a:rPr lang="en-GB" sz="800" dirty="0"/>
-              <a:t>Area under the ROC</a:t>
-            </a:r>
-          </a:p>
-        </p:txBody>
-      </p:sp>
-    </p:spTree>
-    <p:extLst>
-      <p:ext uri="{BB962C8B-B14F-4D97-AF65-F5344CB8AC3E}">
-        <p14:creationId xmlns:p14="http://schemas.microsoft.com/office/powerpoint/2010/main" val="1489261767"/>
-      </p:ext>
-    </p:extLst>
-  </p:cSld>
-  <p:clrMapOvr>
-    <a:masterClrMapping/>
-  </p:clrMapOvr>
-</p:sld>
-</file>
-
-<file path=ppt/slides/slide2.xml><?xml version="1.0" encoding="utf-8"?>
-<p:sld xmlns:a="http://schemas.openxmlformats.org/drawingml/2006/main" xmlns:r="http://schemas.openxmlformats.org/officeDocument/2006/relationships" xmlns:p="http://schemas.openxmlformats.org/presentationml/2006/main">
-  <p:cSld>
-    <p:spTree>
-      <p:nvGrpSpPr>
-        <p:cNvPr id="1" name=""/>
-        <p:cNvGrpSpPr/>
-        <p:nvPr/>
-      </p:nvGrpSpPr>
-      <p:grpSpPr>
-        <a:xfrm>
-          <a:off x="0" y="0"/>
-          <a:ext cx="0" cy="0"/>
-          <a:chOff x="0" y="0"/>
-          <a:chExt cx="0" cy="0"/>
-        </a:xfrm>
-      </p:grpSpPr>
-      <p:pic>
-        <p:nvPicPr>
-          <p:cNvPr id="55" name="Picture 54" descr="Chart&#10;&#10;Description automatically generated">
-            <a:extLst>
-              <a:ext uri="{FF2B5EF4-FFF2-40B4-BE49-F238E27FC236}">
-                <a16:creationId xmlns:a16="http://schemas.microsoft.com/office/drawing/2014/main" id="{249B8000-1A10-4146-8DE7-F408D67A99D2}"/>
-              </a:ext>
-            </a:extLst>
-          </p:cNvPr>
-          <p:cNvPicPr>
-            <a:picLocks noChangeAspect="1"/>
-          </p:cNvPicPr>
-          <p:nvPr/>
-        </p:nvPicPr>
-        <p:blipFill rotWithShape="1">
-          <a:blip r:embed="rId2">
-            <a:extLst>
-              <a:ext uri="{28A0092B-C50C-407E-A947-70E740481C1C}">
-                <a14:useLocalDpi xmlns:a14="http://schemas.microsoft.com/office/drawing/2010/main" val="0"/>
-              </a:ext>
-            </a:extLst>
-          </a:blip>
-          <a:srcRect l="6006" t="4644" r="8119"/>
-          <a:stretch/>
-        </p:blipFill>
-        <p:spPr>
           <a:xfrm>
-            <a:off x="3139700" y="2798797"/>
-            <a:ext cx="2880000" cy="2397531"/>
-          </a:xfrm>
-          <a:prstGeom prst="rect">
-            <a:avLst/>
-          </a:prstGeom>
-        </p:spPr>
-      </p:pic>
-      <p:pic>
-        <p:nvPicPr>
-          <p:cNvPr id="58" name="Picture 57" descr="Chart&#10;&#10;Description automatically generated">
-            <a:extLst>
-              <a:ext uri="{FF2B5EF4-FFF2-40B4-BE49-F238E27FC236}">
-                <a16:creationId xmlns:a16="http://schemas.microsoft.com/office/drawing/2014/main" id="{6BDD4B2C-0287-4AB0-9F5C-4E24A08845F8}"/>
-              </a:ext>
-            </a:extLst>
-          </p:cNvPr>
-          <p:cNvPicPr>
-            <a:picLocks noChangeAspect="1"/>
-          </p:cNvPicPr>
-          <p:nvPr/>
-        </p:nvPicPr>
-        <p:blipFill rotWithShape="1">
-          <a:blip r:embed="rId3">
-            <a:extLst>
-              <a:ext uri="{28A0092B-C50C-407E-A947-70E740481C1C}">
-                <a14:useLocalDpi xmlns:a14="http://schemas.microsoft.com/office/drawing/2010/main" val="0"/>
-              </a:ext>
-            </a:extLst>
-          </a:blip>
-          <a:srcRect l="6006" t="4644" r="8119"/>
-          <a:stretch/>
-        </p:blipFill>
-        <p:spPr>
-          <a:xfrm>
-            <a:off x="188405" y="2798797"/>
-            <a:ext cx="2880000" cy="2397531"/>
-          </a:xfrm>
-          <a:prstGeom prst="rect">
-            <a:avLst/>
-          </a:prstGeom>
-        </p:spPr>
-      </p:pic>
-      <p:sp>
-        <p:nvSpPr>
-          <p:cNvPr id="59" name="TextBox 58">
-            <a:extLst>
-              <a:ext uri="{FF2B5EF4-FFF2-40B4-BE49-F238E27FC236}">
-                <a16:creationId xmlns:a16="http://schemas.microsoft.com/office/drawing/2014/main" id="{EDB8C1D3-804C-4636-B781-F3F8431A369B}"/>
-              </a:ext>
-            </a:extLst>
-          </p:cNvPr>
-          <p:cNvSpPr txBox="1"/>
-          <p:nvPr/>
-        </p:nvSpPr>
-        <p:spPr>
-          <a:xfrm>
-            <a:off x="3369216" y="5175973"/>
-            <a:ext cx="2650484" cy="215444"/>
-          </a:xfrm>
-          <a:prstGeom prst="rect">
-            <a:avLst/>
-          </a:prstGeom>
-          <a:noFill/>
-        </p:spPr>
-        <p:txBody>
-          <a:bodyPr wrap="square" rtlCol="0">
-            <a:spAutoFit/>
-          </a:bodyPr>
-          <a:lstStyle/>
-          <a:p>
-            <a:pPr algn="ctr"/>
-            <a:r>
-              <a:rPr lang="en-GB" sz="800" dirty="0"/>
-              <a:t>Steps at the end of 12-h accumulation periods</a:t>
-            </a:r>
-          </a:p>
-        </p:txBody>
-      </p:sp>
-      <p:pic>
-        <p:nvPicPr>
-          <p:cNvPr id="61" name="Picture 60" descr="Chart&#10;&#10;Description automatically generated">
-            <a:extLst>
-              <a:ext uri="{FF2B5EF4-FFF2-40B4-BE49-F238E27FC236}">
-                <a16:creationId xmlns:a16="http://schemas.microsoft.com/office/drawing/2014/main" id="{15681698-39BD-4815-B989-535604F83C98}"/>
-              </a:ext>
-            </a:extLst>
-          </p:cNvPr>
-          <p:cNvPicPr>
-            <a:picLocks noChangeAspect="1"/>
-          </p:cNvPicPr>
-          <p:nvPr/>
-        </p:nvPicPr>
-        <p:blipFill rotWithShape="1">
-          <a:blip r:embed="rId4">
-            <a:extLst>
-              <a:ext uri="{28A0092B-C50C-407E-A947-70E740481C1C}">
-                <a14:useLocalDpi xmlns:a14="http://schemas.microsoft.com/office/drawing/2010/main" val="0"/>
-              </a:ext>
-            </a:extLst>
-          </a:blip>
-          <a:srcRect l="6006" t="4644" r="8119"/>
-          <a:stretch/>
-        </p:blipFill>
-        <p:spPr>
-          <a:xfrm>
-            <a:off x="3139700" y="361040"/>
-            <a:ext cx="2880000" cy="2397531"/>
-          </a:xfrm>
-          <a:prstGeom prst="rect">
-            <a:avLst/>
-          </a:prstGeom>
-        </p:spPr>
-      </p:pic>
-      <p:pic>
-        <p:nvPicPr>
-          <p:cNvPr id="63" name="Picture 62" descr="Chart&#10;&#10;Description automatically generated">
-            <a:extLst>
-              <a:ext uri="{FF2B5EF4-FFF2-40B4-BE49-F238E27FC236}">
-                <a16:creationId xmlns:a16="http://schemas.microsoft.com/office/drawing/2014/main" id="{4DD3E83D-337D-4121-B885-C1D11F89E5B1}"/>
-              </a:ext>
-            </a:extLst>
-          </p:cNvPr>
-          <p:cNvPicPr>
-            <a:picLocks noChangeAspect="1"/>
-          </p:cNvPicPr>
-          <p:nvPr/>
-        </p:nvPicPr>
-        <p:blipFill rotWithShape="1">
-          <a:blip r:embed="rId5">
-            <a:extLst>
-              <a:ext uri="{28A0092B-C50C-407E-A947-70E740481C1C}">
-                <a14:useLocalDpi xmlns:a14="http://schemas.microsoft.com/office/drawing/2010/main" val="0"/>
-              </a:ext>
-            </a:extLst>
-          </a:blip>
-          <a:srcRect l="6006" t="4645" r="8118" b="-1"/>
-          <a:stretch/>
-        </p:blipFill>
-        <p:spPr>
-          <a:xfrm>
-            <a:off x="188405" y="361040"/>
-            <a:ext cx="2880000" cy="2397531"/>
-          </a:xfrm>
-          <a:prstGeom prst="rect">
-            <a:avLst/>
-          </a:prstGeom>
-        </p:spPr>
-      </p:pic>
-      <p:sp>
-        <p:nvSpPr>
-          <p:cNvPr id="65" name="TextBox 64">
-            <a:extLst>
-              <a:ext uri="{FF2B5EF4-FFF2-40B4-BE49-F238E27FC236}">
-                <a16:creationId xmlns:a16="http://schemas.microsoft.com/office/drawing/2014/main" id="{F18080BF-6CBD-40CC-BE8F-E0BB18CBE701}"/>
-              </a:ext>
-            </a:extLst>
-          </p:cNvPr>
-          <p:cNvSpPr txBox="1"/>
-          <p:nvPr/>
-        </p:nvSpPr>
-        <p:spPr>
-          <a:xfrm rot="16200000">
-            <a:off x="-13110" y="437085"/>
-            <a:ext cx="2099402" cy="2016000"/>
-          </a:xfrm>
-          <a:prstGeom prst="rect">
-            <a:avLst/>
-          </a:prstGeom>
-          <a:noFill/>
-        </p:spPr>
-        <p:txBody>
-          <a:bodyPr wrap="square" rtlCol="0">
-            <a:spAutoFit/>
-          </a:bodyPr>
-          <a:lstStyle/>
-          <a:p>
-            <a:pPr algn="ctr"/>
-            <a:r>
-              <a:rPr lang="en-GB" sz="800" dirty="0"/>
-              <a:t>Area under the ROC</a:t>
-            </a:r>
-          </a:p>
-        </p:txBody>
-      </p:sp>
-      <p:sp>
-        <p:nvSpPr>
-          <p:cNvPr id="67" name="TextBox 66">
-            <a:extLst>
-              <a:ext uri="{FF2B5EF4-FFF2-40B4-BE49-F238E27FC236}">
-                <a16:creationId xmlns:a16="http://schemas.microsoft.com/office/drawing/2014/main" id="{589ABFA2-7EBB-4EB0-AA6D-EF1322D81885}"/>
-              </a:ext>
-            </a:extLst>
-          </p:cNvPr>
-          <p:cNvSpPr txBox="1"/>
-          <p:nvPr/>
-        </p:nvSpPr>
-        <p:spPr>
-          <a:xfrm>
-            <a:off x="401383" y="204358"/>
-            <a:ext cx="2667021" cy="246221"/>
-          </a:xfrm>
-          <a:prstGeom prst="rect">
-            <a:avLst/>
-          </a:prstGeom>
-          <a:noFill/>
-        </p:spPr>
-        <p:txBody>
-          <a:bodyPr wrap="square" rtlCol="0">
-            <a:spAutoFit/>
-          </a:bodyPr>
-          <a:lstStyle/>
-          <a:p>
-            <a:pPr algn="ctr"/>
-            <a:r>
-              <a:rPr lang="en-GB" sz="1000" dirty="0"/>
-              <a:t>“La Costa”</a:t>
-            </a:r>
-          </a:p>
-        </p:txBody>
-      </p:sp>
-      <p:sp>
-        <p:nvSpPr>
-          <p:cNvPr id="69" name="TextBox 68">
-            <a:extLst>
-              <a:ext uri="{FF2B5EF4-FFF2-40B4-BE49-F238E27FC236}">
-                <a16:creationId xmlns:a16="http://schemas.microsoft.com/office/drawing/2014/main" id="{B2688E76-5FD0-4F52-A97A-E43BF1D1D85D}"/>
-              </a:ext>
-            </a:extLst>
-          </p:cNvPr>
-          <p:cNvSpPr txBox="1"/>
-          <p:nvPr/>
-        </p:nvSpPr>
-        <p:spPr>
-          <a:xfrm>
-            <a:off x="3369216" y="204358"/>
-            <a:ext cx="2650484" cy="246221"/>
-          </a:xfrm>
-          <a:prstGeom prst="rect">
-            <a:avLst/>
-          </a:prstGeom>
-          <a:noFill/>
-        </p:spPr>
-        <p:txBody>
-          <a:bodyPr wrap="square" rtlCol="0">
-            <a:spAutoFit/>
-          </a:bodyPr>
-          <a:lstStyle/>
-          <a:p>
-            <a:pPr algn="ctr"/>
-            <a:r>
-              <a:rPr lang="en-GB" sz="1000" dirty="0"/>
-              <a:t>“La Sierra”</a:t>
-            </a:r>
-          </a:p>
-        </p:txBody>
-      </p:sp>
-      <p:sp>
-        <p:nvSpPr>
-          <p:cNvPr id="80" name="TextBox 79">
-            <a:extLst>
-              <a:ext uri="{FF2B5EF4-FFF2-40B4-BE49-F238E27FC236}">
-                <a16:creationId xmlns:a16="http://schemas.microsoft.com/office/drawing/2014/main" id="{F2BAF33B-DE08-4DD0-B840-EEA28E79E85B}"/>
-              </a:ext>
-            </a:extLst>
-          </p:cNvPr>
-          <p:cNvSpPr txBox="1"/>
-          <p:nvPr/>
-        </p:nvSpPr>
-        <p:spPr>
-          <a:xfrm>
-            <a:off x="4750894" y="490985"/>
-            <a:ext cx="1152000" cy="338554"/>
+            <a:off x="4809555" y="530677"/>
+            <a:ext cx="1152000" cy="215444"/>
           </a:xfrm>
           <a:prstGeom prst="rect">
             <a:avLst/>
@@ -4633,118 +4370,17 @@
             <a:pPr algn="ctr"/>
             <a:r>
               <a:rPr lang="en-GB" sz="800" dirty="0"/>
-              <a:t>85</a:t>
-            </a:r>
-            <a:r>
-              <a:rPr lang="en-GB" sz="800" baseline="30000" dirty="0"/>
-              <a:t>th</a:t>
-            </a:r>
-            <a:r>
-              <a:rPr lang="en-GB" sz="800" dirty="0"/>
-              <a:t> percentile</a:t>
-            </a:r>
-          </a:p>
-          <a:p>
-            <a:pPr algn="ctr"/>
-            <a:r>
-              <a:rPr lang="en-GB" sz="800" dirty="0"/>
-              <a:t>(tp &gt;= 6.112 mm/12h)</a:t>
-            </a:r>
-          </a:p>
-        </p:txBody>
-      </p:sp>
-      <p:cxnSp>
-        <p:nvCxnSpPr>
-          <p:cNvPr id="81" name="Straight Connector 80">
+              <a:t>tp &gt;= 6.112 mm/12h</a:t>
+            </a:r>
+          </a:p>
+        </p:txBody>
+      </p:sp>
+      <p:sp>
+        <p:nvSpPr>
+          <p:cNvPr id="25" name="TextBox 24">
             <a:extLst>
               <a:ext uri="{FF2B5EF4-FFF2-40B4-BE49-F238E27FC236}">
-                <a16:creationId xmlns:a16="http://schemas.microsoft.com/office/drawing/2014/main" id="{377C66FD-529A-4A29-AA0C-66E0F4A85000}"/>
-              </a:ext>
-            </a:extLst>
-          </p:cNvPr>
-          <p:cNvCxnSpPr>
-            <a:cxnSpLocks/>
-          </p:cNvCxnSpPr>
-          <p:nvPr/>
-        </p:nvCxnSpPr>
-        <p:spPr>
-          <a:xfrm>
-            <a:off x="3291920" y="228596"/>
-            <a:ext cx="540000" cy="0"/>
-          </a:xfrm>
-          <a:prstGeom prst="line">
-            <a:avLst/>
-          </a:prstGeom>
-          <a:ln w="38100">
-            <a:solidFill>
-              <a:srgbClr val="0000FF"/>
-            </a:solidFill>
-          </a:ln>
-        </p:spPr>
-        <p:style>
-          <a:lnRef idx="1">
-            <a:schemeClr val="accent1"/>
-          </a:lnRef>
-          <a:fillRef idx="0">
-            <a:schemeClr val="accent1"/>
-          </a:fillRef>
-          <a:effectRef idx="0">
-            <a:schemeClr val="accent1"/>
-          </a:effectRef>
-          <a:fontRef idx="minor">
-            <a:schemeClr val="tx1"/>
-          </a:fontRef>
-        </p:style>
-      </p:cxnSp>
-      <p:cxnSp>
-        <p:nvCxnSpPr>
-          <p:cNvPr id="82" name="Straight Connector 81">
-            <a:extLst>
-              <a:ext uri="{FF2B5EF4-FFF2-40B4-BE49-F238E27FC236}">
-                <a16:creationId xmlns:a16="http://schemas.microsoft.com/office/drawing/2014/main" id="{090D61E3-A960-46E0-A7D3-BA34DFF9F090}"/>
-              </a:ext>
-            </a:extLst>
-          </p:cNvPr>
-          <p:cNvCxnSpPr>
-            <a:cxnSpLocks/>
-          </p:cNvCxnSpPr>
-          <p:nvPr/>
-        </p:nvCxnSpPr>
-        <p:spPr>
-          <a:xfrm>
-            <a:off x="2546673" y="228596"/>
-            <a:ext cx="540000" cy="0"/>
-          </a:xfrm>
-          <a:prstGeom prst="line">
-            <a:avLst/>
-          </a:prstGeom>
-          <a:ln w="38100">
-            <a:solidFill>
-              <a:srgbClr val="FF0000"/>
-            </a:solidFill>
-          </a:ln>
-        </p:spPr>
-        <p:style>
-          <a:lnRef idx="1">
-            <a:schemeClr val="accent1"/>
-          </a:lnRef>
-          <a:fillRef idx="0">
-            <a:schemeClr val="accent1"/>
-          </a:fillRef>
-          <a:effectRef idx="0">
-            <a:schemeClr val="accent1"/>
-          </a:effectRef>
-          <a:fontRef idx="minor">
-            <a:schemeClr val="tx1"/>
-          </a:fontRef>
-        </p:style>
-      </p:cxnSp>
-      <p:sp>
-        <p:nvSpPr>
-          <p:cNvPr id="83" name="TextBox 82">
-            <a:extLst>
-              <a:ext uri="{FF2B5EF4-FFF2-40B4-BE49-F238E27FC236}">
-                <a16:creationId xmlns:a16="http://schemas.microsoft.com/office/drawing/2014/main" id="{E87050D7-461D-4FA8-AAAA-B2927D17BF36}"/>
+                <a16:creationId xmlns:a16="http://schemas.microsoft.com/office/drawing/2014/main" id="{989CC310-3A85-4936-8D93-1EDBE70B42CA}"/>
               </a:ext>
             </a:extLst>
           </p:cNvPr>
@@ -4753,116 +4389,8 @@
         </p:nvSpPr>
         <p:spPr>
           <a:xfrm>
-            <a:off x="2578125" y="-17770"/>
-            <a:ext cx="477097" cy="246366"/>
-          </a:xfrm>
-          <a:prstGeom prst="rect">
-            <a:avLst/>
-          </a:prstGeom>
-          <a:noFill/>
-        </p:spPr>
-        <p:txBody>
-          <a:bodyPr wrap="square" rtlCol="0">
-            <a:spAutoFit/>
-          </a:bodyPr>
-          <a:lstStyle/>
-          <a:p>
-            <a:pPr algn="ctr"/>
-            <a:r>
-              <a:rPr lang="en-GB" sz="1000" dirty="0"/>
-              <a:t>ENS</a:t>
-            </a:r>
-          </a:p>
-        </p:txBody>
-      </p:sp>
-      <p:sp>
-        <p:nvSpPr>
-          <p:cNvPr id="84" name="TextBox 83">
-            <a:extLst>
-              <a:ext uri="{FF2B5EF4-FFF2-40B4-BE49-F238E27FC236}">
-                <a16:creationId xmlns:a16="http://schemas.microsoft.com/office/drawing/2014/main" id="{DCA229DB-8991-4C74-A0F1-F0C1F1931148}"/>
-              </a:ext>
-            </a:extLst>
-          </p:cNvPr>
-          <p:cNvSpPr txBox="1"/>
-          <p:nvPr/>
-        </p:nvSpPr>
-        <p:spPr>
-          <a:xfrm>
-            <a:off x="3233380" y="-17770"/>
-            <a:ext cx="657080" cy="246221"/>
-          </a:xfrm>
-          <a:prstGeom prst="rect">
-            <a:avLst/>
-          </a:prstGeom>
-          <a:noFill/>
-        </p:spPr>
-        <p:txBody>
-          <a:bodyPr wrap="square" rtlCol="0">
-            <a:spAutoFit/>
-          </a:bodyPr>
-          <a:lstStyle/>
-          <a:p>
-            <a:pPr algn="ctr"/>
-            <a:r>
-              <a:rPr lang="en-GB" sz="1000" dirty="0"/>
-              <a:t>ecPoint</a:t>
-            </a:r>
-          </a:p>
-        </p:txBody>
-      </p:sp>
-      <p:sp>
-        <p:nvSpPr>
-          <p:cNvPr id="85" name="TextBox 84">
-            <a:extLst>
-              <a:ext uri="{FF2B5EF4-FFF2-40B4-BE49-F238E27FC236}">
-                <a16:creationId xmlns:a16="http://schemas.microsoft.com/office/drawing/2014/main" id="{0249158A-4189-483C-8D72-5DD69FC3D3B2}"/>
-              </a:ext>
-            </a:extLst>
-          </p:cNvPr>
-          <p:cNvSpPr txBox="1"/>
-          <p:nvPr/>
-        </p:nvSpPr>
-        <p:spPr>
-          <a:xfrm rot="16200000">
-            <a:off x="-913387" y="3740776"/>
-            <a:ext cx="2099402" cy="215444"/>
-          </a:xfrm>
-          <a:prstGeom prst="rect">
-            <a:avLst/>
-          </a:prstGeom>
-          <a:noFill/>
-        </p:spPr>
-        <p:txBody>
-          <a:bodyPr wrap="square" rtlCol="0">
-            <a:spAutoFit/>
-          </a:bodyPr>
-          <a:lstStyle/>
-          <a:p>
-            <a:pPr algn="ctr"/>
-            <a:r>
-              <a:rPr lang="en-GB" sz="800" dirty="0"/>
-              <a:t>Area under the ROC</a:t>
-            </a:r>
-          </a:p>
-        </p:txBody>
-      </p:sp>
-      <p:sp>
-        <p:nvSpPr>
-          <p:cNvPr id="86" name="TextBox 85">
-            <a:extLst>
-              <a:ext uri="{FF2B5EF4-FFF2-40B4-BE49-F238E27FC236}">
-                <a16:creationId xmlns:a16="http://schemas.microsoft.com/office/drawing/2014/main" id="{9E48FFDA-5009-456E-AB67-6011D65FD542}"/>
-              </a:ext>
-            </a:extLst>
-          </p:cNvPr>
-          <p:cNvSpPr txBox="1"/>
-          <p:nvPr/>
-        </p:nvSpPr>
-        <p:spPr>
-          <a:xfrm>
-            <a:off x="1795630" y="4487547"/>
-            <a:ext cx="1152000" cy="338554"/>
+            <a:off x="1954500" y="4486559"/>
+            <a:ext cx="1152000" cy="215444"/>
           </a:xfrm>
           <a:prstGeom prst="rect">
             <a:avLst/>
@@ -4885,32 +4413,17 @@
             <a:pPr algn="ctr"/>
             <a:r>
               <a:rPr lang="en-GB" sz="800" dirty="0"/>
-              <a:t>99</a:t>
-            </a:r>
-            <a:r>
-              <a:rPr lang="en-GB" sz="800" baseline="30000" dirty="0"/>
-              <a:t>th</a:t>
-            </a:r>
-            <a:r>
-              <a:rPr lang="en-GB" sz="800" dirty="0"/>
-              <a:t> percentile</a:t>
-            </a:r>
-          </a:p>
-          <a:p>
-            <a:pPr algn="ctr"/>
-            <a:r>
-              <a:rPr lang="en-GB" sz="800" dirty="0"/>
-              <a:t>(tp &gt;= 46.786 mm/12h)</a:t>
-            </a:r>
-          </a:p>
-        </p:txBody>
-      </p:sp>
-      <p:sp>
-        <p:nvSpPr>
-          <p:cNvPr id="87" name="TextBox 86">
+              <a:t>tp &gt;= 46.786 mm/12h</a:t>
+            </a:r>
+          </a:p>
+        </p:txBody>
+      </p:sp>
+      <p:sp>
+        <p:nvSpPr>
+          <p:cNvPr id="26" name="TextBox 25">
             <a:extLst>
               <a:ext uri="{FF2B5EF4-FFF2-40B4-BE49-F238E27FC236}">
-                <a16:creationId xmlns:a16="http://schemas.microsoft.com/office/drawing/2014/main" id="{AA154F77-0799-4142-A090-A67AAC423B5D}"/>
+                <a16:creationId xmlns:a16="http://schemas.microsoft.com/office/drawing/2014/main" id="{3A5A59EC-905F-4773-9E33-4910A6BDE60B}"/>
               </a:ext>
             </a:extLst>
           </p:cNvPr>
@@ -4919,8 +4432,8 @@
         </p:nvSpPr>
         <p:spPr>
           <a:xfrm>
-            <a:off x="4750894" y="2940397"/>
-            <a:ext cx="1152000" cy="338554"/>
+            <a:off x="4809555" y="2829033"/>
+            <a:ext cx="1152000" cy="215444"/>
           </a:xfrm>
           <a:prstGeom prst="rect">
             <a:avLst/>
@@ -4943,32 +4456,17 @@
             <a:pPr algn="ctr"/>
             <a:r>
               <a:rPr lang="en-GB" sz="800" dirty="0"/>
-              <a:t>99</a:t>
-            </a:r>
-            <a:r>
-              <a:rPr lang="en-GB" sz="800" baseline="30000" dirty="0"/>
-              <a:t>th</a:t>
-            </a:r>
-            <a:r>
-              <a:rPr lang="en-GB" sz="800" dirty="0"/>
-              <a:t> percentile</a:t>
-            </a:r>
-          </a:p>
-          <a:p>
-            <a:pPr algn="ctr"/>
-            <a:r>
-              <a:rPr lang="en-GB" sz="800" dirty="0"/>
-              <a:t>(tp &gt;= 27.501 mm/12h)</a:t>
-            </a:r>
-          </a:p>
-        </p:txBody>
-      </p:sp>
-      <p:sp>
-        <p:nvSpPr>
-          <p:cNvPr id="89" name="TextBox 88">
+              <a:t>tp &gt;= 27.501 mm/12h</a:t>
+            </a:r>
+          </a:p>
+        </p:txBody>
+      </p:sp>
+      <p:sp>
+        <p:nvSpPr>
+          <p:cNvPr id="27" name="TextBox 26">
             <a:extLst>
               <a:ext uri="{FF2B5EF4-FFF2-40B4-BE49-F238E27FC236}">
-                <a16:creationId xmlns:a16="http://schemas.microsoft.com/office/drawing/2014/main" id="{B39140BE-A13C-4AE0-A6FD-6EE6FEB5AC74}"/>
+                <a16:creationId xmlns:a16="http://schemas.microsoft.com/office/drawing/2014/main" id="{A26337D8-0FE5-4D9B-99EE-E080A3C756BA}"/>
               </a:ext>
             </a:extLst>
           </p:cNvPr>
@@ -4977,2033 +4475,8 @@
         </p:nvSpPr>
         <p:spPr>
           <a:xfrm>
-            <a:off x="489216" y="5170760"/>
-            <a:ext cx="2650484" cy="215444"/>
-          </a:xfrm>
-          <a:prstGeom prst="rect">
-            <a:avLst/>
-          </a:prstGeom>
-          <a:noFill/>
-        </p:spPr>
-        <p:txBody>
-          <a:bodyPr wrap="square" rtlCol="0">
-            <a:spAutoFit/>
-          </a:bodyPr>
-          <a:lstStyle/>
-          <a:p>
-            <a:pPr algn="ctr"/>
-            <a:r>
-              <a:rPr lang="en-GB" sz="800" dirty="0"/>
-              <a:t>Steps at the end of 12-h accumulation periods</a:t>
-            </a:r>
-          </a:p>
-        </p:txBody>
-      </p:sp>
-      <p:cxnSp>
-        <p:nvCxnSpPr>
-          <p:cNvPr id="90" name="Straight Connector 89">
-            <a:extLst>
-              <a:ext uri="{FF2B5EF4-FFF2-40B4-BE49-F238E27FC236}">
-                <a16:creationId xmlns:a16="http://schemas.microsoft.com/office/drawing/2014/main" id="{345F1F1F-24FA-4369-9630-5A3B8D20A985}"/>
-              </a:ext>
-            </a:extLst>
-          </p:cNvPr>
-          <p:cNvCxnSpPr>
-            <a:cxnSpLocks/>
-          </p:cNvCxnSpPr>
-          <p:nvPr/>
-        </p:nvCxnSpPr>
-        <p:spPr>
-          <a:xfrm flipV="1">
-            <a:off x="490754" y="431231"/>
-            <a:ext cx="0" cy="2016000"/>
-          </a:xfrm>
-          <a:prstGeom prst="line">
-            <a:avLst/>
-          </a:prstGeom>
-          <a:ln w="3175">
-            <a:solidFill>
-              <a:schemeClr val="bg1">
-                <a:lumMod val="85000"/>
-              </a:schemeClr>
-            </a:solidFill>
-          </a:ln>
-        </p:spPr>
-        <p:style>
-          <a:lnRef idx="1">
-            <a:schemeClr val="accent1"/>
-          </a:lnRef>
-          <a:fillRef idx="0">
-            <a:schemeClr val="accent1"/>
-          </a:fillRef>
-          <a:effectRef idx="0">
-            <a:schemeClr val="accent1"/>
-          </a:effectRef>
-          <a:fontRef idx="minor">
-            <a:schemeClr val="tx1"/>
-          </a:fontRef>
-        </p:style>
-      </p:cxnSp>
-      <p:cxnSp>
-        <p:nvCxnSpPr>
-          <p:cNvPr id="91" name="Straight Connector 90">
-            <a:extLst>
-              <a:ext uri="{FF2B5EF4-FFF2-40B4-BE49-F238E27FC236}">
-                <a16:creationId xmlns:a16="http://schemas.microsoft.com/office/drawing/2014/main" id="{52DA2BFD-9BF9-4C18-8459-5FED50E88395}"/>
-              </a:ext>
-            </a:extLst>
-          </p:cNvPr>
-          <p:cNvCxnSpPr>
-            <a:cxnSpLocks/>
-          </p:cNvCxnSpPr>
-          <p:nvPr/>
-        </p:nvCxnSpPr>
-        <p:spPr>
-          <a:xfrm flipV="1">
-            <a:off x="554537" y="431231"/>
-            <a:ext cx="0" cy="2016000"/>
-          </a:xfrm>
-          <a:prstGeom prst="line">
-            <a:avLst/>
-          </a:prstGeom>
-          <a:ln w="3175">
-            <a:solidFill>
-              <a:schemeClr val="bg1">
-                <a:lumMod val="85000"/>
-              </a:schemeClr>
-            </a:solidFill>
-          </a:ln>
-        </p:spPr>
-        <p:style>
-          <a:lnRef idx="1">
-            <a:schemeClr val="accent1"/>
-          </a:lnRef>
-          <a:fillRef idx="0">
-            <a:schemeClr val="accent1"/>
-          </a:fillRef>
-          <a:effectRef idx="0">
-            <a:schemeClr val="accent1"/>
-          </a:effectRef>
-          <a:fontRef idx="minor">
-            <a:schemeClr val="tx1"/>
-          </a:fontRef>
-        </p:style>
-      </p:cxnSp>
-      <p:cxnSp>
-        <p:nvCxnSpPr>
-          <p:cNvPr id="92" name="Straight Connector 91">
-            <a:extLst>
-              <a:ext uri="{FF2B5EF4-FFF2-40B4-BE49-F238E27FC236}">
-                <a16:creationId xmlns:a16="http://schemas.microsoft.com/office/drawing/2014/main" id="{A3E60E95-8A56-4184-B513-1C0DF77ED817}"/>
-              </a:ext>
-            </a:extLst>
-          </p:cNvPr>
-          <p:cNvCxnSpPr>
-            <a:cxnSpLocks/>
-          </p:cNvCxnSpPr>
-          <p:nvPr/>
-        </p:nvCxnSpPr>
-        <p:spPr>
-          <a:xfrm flipV="1">
-            <a:off x="820685" y="431231"/>
-            <a:ext cx="0" cy="2016000"/>
-          </a:xfrm>
-          <a:prstGeom prst="line">
-            <a:avLst/>
-          </a:prstGeom>
-          <a:ln w="3175">
-            <a:solidFill>
-              <a:schemeClr val="bg1">
-                <a:lumMod val="85000"/>
-              </a:schemeClr>
-            </a:solidFill>
-          </a:ln>
-        </p:spPr>
-        <p:style>
-          <a:lnRef idx="1">
-            <a:schemeClr val="accent1"/>
-          </a:lnRef>
-          <a:fillRef idx="0">
-            <a:schemeClr val="accent1"/>
-          </a:fillRef>
-          <a:effectRef idx="0">
-            <a:schemeClr val="accent1"/>
-          </a:effectRef>
-          <a:fontRef idx="minor">
-            <a:schemeClr val="tx1"/>
-          </a:fontRef>
-        </p:style>
-      </p:cxnSp>
-      <p:cxnSp>
-        <p:nvCxnSpPr>
-          <p:cNvPr id="93" name="Straight Connector 92">
-            <a:extLst>
-              <a:ext uri="{FF2B5EF4-FFF2-40B4-BE49-F238E27FC236}">
-                <a16:creationId xmlns:a16="http://schemas.microsoft.com/office/drawing/2014/main" id="{E0F7B734-A084-40C4-A161-F2293A25C0C6}"/>
-              </a:ext>
-            </a:extLst>
-          </p:cNvPr>
-          <p:cNvCxnSpPr>
-            <a:cxnSpLocks/>
-          </p:cNvCxnSpPr>
-          <p:nvPr/>
-        </p:nvCxnSpPr>
-        <p:spPr>
-          <a:xfrm flipV="1">
-            <a:off x="1089587" y="431231"/>
-            <a:ext cx="0" cy="2016000"/>
-          </a:xfrm>
-          <a:prstGeom prst="line">
-            <a:avLst/>
-          </a:prstGeom>
-          <a:ln w="3175">
-            <a:solidFill>
-              <a:schemeClr val="bg1">
-                <a:lumMod val="85000"/>
-              </a:schemeClr>
-            </a:solidFill>
-          </a:ln>
-        </p:spPr>
-        <p:style>
-          <a:lnRef idx="1">
-            <a:schemeClr val="accent1"/>
-          </a:lnRef>
-          <a:fillRef idx="0">
-            <a:schemeClr val="accent1"/>
-          </a:fillRef>
-          <a:effectRef idx="0">
-            <a:schemeClr val="accent1"/>
-          </a:effectRef>
-          <a:fontRef idx="minor">
-            <a:schemeClr val="tx1"/>
-          </a:fontRef>
-        </p:style>
-      </p:cxnSp>
-      <p:cxnSp>
-        <p:nvCxnSpPr>
-          <p:cNvPr id="94" name="Straight Connector 93">
-            <a:extLst>
-              <a:ext uri="{FF2B5EF4-FFF2-40B4-BE49-F238E27FC236}">
-                <a16:creationId xmlns:a16="http://schemas.microsoft.com/office/drawing/2014/main" id="{FD4C843F-CBA6-4B85-8F30-AC99A328A9AD}"/>
-              </a:ext>
-            </a:extLst>
-          </p:cNvPr>
-          <p:cNvCxnSpPr>
-            <a:cxnSpLocks/>
-          </p:cNvCxnSpPr>
-          <p:nvPr/>
-        </p:nvCxnSpPr>
-        <p:spPr>
-          <a:xfrm flipV="1">
-            <a:off x="1355735" y="431231"/>
-            <a:ext cx="0" cy="2016000"/>
-          </a:xfrm>
-          <a:prstGeom prst="line">
-            <a:avLst/>
-          </a:prstGeom>
-          <a:ln w="3175">
-            <a:solidFill>
-              <a:schemeClr val="bg1">
-                <a:lumMod val="85000"/>
-              </a:schemeClr>
-            </a:solidFill>
-          </a:ln>
-        </p:spPr>
-        <p:style>
-          <a:lnRef idx="1">
-            <a:schemeClr val="accent1"/>
-          </a:lnRef>
-          <a:fillRef idx="0">
-            <a:schemeClr val="accent1"/>
-          </a:fillRef>
-          <a:effectRef idx="0">
-            <a:schemeClr val="accent1"/>
-          </a:effectRef>
-          <a:fontRef idx="minor">
-            <a:schemeClr val="tx1"/>
-          </a:fontRef>
-        </p:style>
-      </p:cxnSp>
-      <p:cxnSp>
-        <p:nvCxnSpPr>
-          <p:cNvPr id="95" name="Straight Connector 94">
-            <a:extLst>
-              <a:ext uri="{FF2B5EF4-FFF2-40B4-BE49-F238E27FC236}">
-                <a16:creationId xmlns:a16="http://schemas.microsoft.com/office/drawing/2014/main" id="{7C0D8D8F-105D-4715-9519-65344A7B6C43}"/>
-              </a:ext>
-            </a:extLst>
-          </p:cNvPr>
-          <p:cNvCxnSpPr>
-            <a:cxnSpLocks/>
-          </p:cNvCxnSpPr>
-          <p:nvPr/>
-        </p:nvCxnSpPr>
-        <p:spPr>
-          <a:xfrm flipV="1">
-            <a:off x="1488809" y="431231"/>
-            <a:ext cx="0" cy="2016000"/>
-          </a:xfrm>
-          <a:prstGeom prst="line">
-            <a:avLst/>
-          </a:prstGeom>
-          <a:ln w="3175">
-            <a:solidFill>
-              <a:schemeClr val="bg1">
-                <a:lumMod val="85000"/>
-              </a:schemeClr>
-            </a:solidFill>
-          </a:ln>
-        </p:spPr>
-        <p:style>
-          <a:lnRef idx="1">
-            <a:schemeClr val="accent1"/>
-          </a:lnRef>
-          <a:fillRef idx="0">
-            <a:schemeClr val="accent1"/>
-          </a:fillRef>
-          <a:effectRef idx="0">
-            <a:schemeClr val="accent1"/>
-          </a:effectRef>
-          <a:fontRef idx="minor">
-            <a:schemeClr val="tx1"/>
-          </a:fontRef>
-        </p:style>
-      </p:cxnSp>
-      <p:cxnSp>
-        <p:nvCxnSpPr>
-          <p:cNvPr id="96" name="Straight Connector 95">
-            <a:extLst>
-              <a:ext uri="{FF2B5EF4-FFF2-40B4-BE49-F238E27FC236}">
-                <a16:creationId xmlns:a16="http://schemas.microsoft.com/office/drawing/2014/main" id="{792482D7-B865-4B40-AB03-1758A58AB4EC}"/>
-              </a:ext>
-            </a:extLst>
-          </p:cNvPr>
-          <p:cNvCxnSpPr>
-            <a:cxnSpLocks/>
-          </p:cNvCxnSpPr>
-          <p:nvPr/>
-        </p:nvCxnSpPr>
-        <p:spPr>
-          <a:xfrm flipV="1">
-            <a:off x="1621883" y="431231"/>
-            <a:ext cx="0" cy="2016000"/>
-          </a:xfrm>
-          <a:prstGeom prst="line">
-            <a:avLst/>
-          </a:prstGeom>
-          <a:ln w="3175">
-            <a:solidFill>
-              <a:schemeClr val="bg1">
-                <a:lumMod val="85000"/>
-              </a:schemeClr>
-            </a:solidFill>
-          </a:ln>
-        </p:spPr>
-        <p:style>
-          <a:lnRef idx="1">
-            <a:schemeClr val="accent1"/>
-          </a:lnRef>
-          <a:fillRef idx="0">
-            <a:schemeClr val="accent1"/>
-          </a:fillRef>
-          <a:effectRef idx="0">
-            <a:schemeClr val="accent1"/>
-          </a:effectRef>
-          <a:fontRef idx="minor">
-            <a:schemeClr val="tx1"/>
-          </a:fontRef>
-        </p:style>
-      </p:cxnSp>
-      <p:cxnSp>
-        <p:nvCxnSpPr>
-          <p:cNvPr id="97" name="Straight Connector 96">
-            <a:extLst>
-              <a:ext uri="{FF2B5EF4-FFF2-40B4-BE49-F238E27FC236}">
-                <a16:creationId xmlns:a16="http://schemas.microsoft.com/office/drawing/2014/main" id="{54845AC9-C388-4EEB-9596-1482E6E726C2}"/>
-              </a:ext>
-            </a:extLst>
-          </p:cNvPr>
-          <p:cNvCxnSpPr>
-            <a:cxnSpLocks/>
-          </p:cNvCxnSpPr>
-          <p:nvPr/>
-        </p:nvCxnSpPr>
-        <p:spPr>
-          <a:xfrm flipV="1">
-            <a:off x="1754957" y="431231"/>
-            <a:ext cx="0" cy="2016000"/>
-          </a:xfrm>
-          <a:prstGeom prst="line">
-            <a:avLst/>
-          </a:prstGeom>
-          <a:ln w="3175">
-            <a:solidFill>
-              <a:schemeClr val="bg1">
-                <a:lumMod val="85000"/>
-              </a:schemeClr>
-            </a:solidFill>
-          </a:ln>
-        </p:spPr>
-        <p:style>
-          <a:lnRef idx="1">
-            <a:schemeClr val="accent1"/>
-          </a:lnRef>
-          <a:fillRef idx="0">
-            <a:schemeClr val="accent1"/>
-          </a:fillRef>
-          <a:effectRef idx="0">
-            <a:schemeClr val="accent1"/>
-          </a:effectRef>
-          <a:fontRef idx="minor">
-            <a:schemeClr val="tx1"/>
-          </a:fontRef>
-        </p:style>
-      </p:cxnSp>
-      <p:cxnSp>
-        <p:nvCxnSpPr>
-          <p:cNvPr id="98" name="Straight Connector 97">
-            <a:extLst>
-              <a:ext uri="{FF2B5EF4-FFF2-40B4-BE49-F238E27FC236}">
-                <a16:creationId xmlns:a16="http://schemas.microsoft.com/office/drawing/2014/main" id="{DEB542EE-EDEE-47FA-8E4A-511401D672FA}"/>
-              </a:ext>
-            </a:extLst>
-          </p:cNvPr>
-          <p:cNvCxnSpPr>
-            <a:cxnSpLocks/>
-          </p:cNvCxnSpPr>
-          <p:nvPr/>
-        </p:nvCxnSpPr>
-        <p:spPr>
-          <a:xfrm flipV="1">
-            <a:off x="1888031" y="431231"/>
-            <a:ext cx="0" cy="2016000"/>
-          </a:xfrm>
-          <a:prstGeom prst="line">
-            <a:avLst/>
-          </a:prstGeom>
-          <a:ln w="3175">
-            <a:solidFill>
-              <a:schemeClr val="bg1">
-                <a:lumMod val="85000"/>
-              </a:schemeClr>
-            </a:solidFill>
-          </a:ln>
-        </p:spPr>
-        <p:style>
-          <a:lnRef idx="1">
-            <a:schemeClr val="accent1"/>
-          </a:lnRef>
-          <a:fillRef idx="0">
-            <a:schemeClr val="accent1"/>
-          </a:fillRef>
-          <a:effectRef idx="0">
-            <a:schemeClr val="accent1"/>
-          </a:effectRef>
-          <a:fontRef idx="minor">
-            <a:schemeClr val="tx1"/>
-          </a:fontRef>
-        </p:style>
-      </p:cxnSp>
-      <p:cxnSp>
-        <p:nvCxnSpPr>
-          <p:cNvPr id="99" name="Straight Connector 98">
-            <a:extLst>
-              <a:ext uri="{FF2B5EF4-FFF2-40B4-BE49-F238E27FC236}">
-                <a16:creationId xmlns:a16="http://schemas.microsoft.com/office/drawing/2014/main" id="{B174E479-DB75-4CBC-B336-7A04FB2ACFD8}"/>
-              </a:ext>
-            </a:extLst>
-          </p:cNvPr>
-          <p:cNvCxnSpPr>
-            <a:cxnSpLocks/>
-          </p:cNvCxnSpPr>
-          <p:nvPr/>
-        </p:nvCxnSpPr>
-        <p:spPr>
-          <a:xfrm flipV="1">
-            <a:off x="2021105" y="431231"/>
-            <a:ext cx="0" cy="2016000"/>
-          </a:xfrm>
-          <a:prstGeom prst="line">
-            <a:avLst/>
-          </a:prstGeom>
-          <a:ln w="3175">
-            <a:solidFill>
-              <a:schemeClr val="bg1">
-                <a:lumMod val="85000"/>
-              </a:schemeClr>
-            </a:solidFill>
-          </a:ln>
-        </p:spPr>
-        <p:style>
-          <a:lnRef idx="1">
-            <a:schemeClr val="accent1"/>
-          </a:lnRef>
-          <a:fillRef idx="0">
-            <a:schemeClr val="accent1"/>
-          </a:fillRef>
-          <a:effectRef idx="0">
-            <a:schemeClr val="accent1"/>
-          </a:effectRef>
-          <a:fontRef idx="minor">
-            <a:schemeClr val="tx1"/>
-          </a:fontRef>
-        </p:style>
-      </p:cxnSp>
-      <p:cxnSp>
-        <p:nvCxnSpPr>
-          <p:cNvPr id="100" name="Straight Connector 99">
-            <a:extLst>
-              <a:ext uri="{FF2B5EF4-FFF2-40B4-BE49-F238E27FC236}">
-                <a16:creationId xmlns:a16="http://schemas.microsoft.com/office/drawing/2014/main" id="{A0110D80-B1AD-45EB-AB8D-9EC44C439428}"/>
-              </a:ext>
-            </a:extLst>
-          </p:cNvPr>
-          <p:cNvCxnSpPr>
-            <a:cxnSpLocks/>
-          </p:cNvCxnSpPr>
-          <p:nvPr/>
-        </p:nvCxnSpPr>
-        <p:spPr>
-          <a:xfrm flipV="1">
-            <a:off x="2154179" y="431231"/>
-            <a:ext cx="0" cy="2016000"/>
-          </a:xfrm>
-          <a:prstGeom prst="line">
-            <a:avLst/>
-          </a:prstGeom>
-          <a:ln w="3175">
-            <a:solidFill>
-              <a:schemeClr val="bg1">
-                <a:lumMod val="85000"/>
-              </a:schemeClr>
-            </a:solidFill>
-          </a:ln>
-        </p:spPr>
-        <p:style>
-          <a:lnRef idx="1">
-            <a:schemeClr val="accent1"/>
-          </a:lnRef>
-          <a:fillRef idx="0">
-            <a:schemeClr val="accent1"/>
-          </a:fillRef>
-          <a:effectRef idx="0">
-            <a:schemeClr val="accent1"/>
-          </a:effectRef>
-          <a:fontRef idx="minor">
-            <a:schemeClr val="tx1"/>
-          </a:fontRef>
-        </p:style>
-      </p:cxnSp>
-      <p:cxnSp>
-        <p:nvCxnSpPr>
-          <p:cNvPr id="101" name="Straight Connector 100">
-            <a:extLst>
-              <a:ext uri="{FF2B5EF4-FFF2-40B4-BE49-F238E27FC236}">
-                <a16:creationId xmlns:a16="http://schemas.microsoft.com/office/drawing/2014/main" id="{0EE6CF00-665A-4C6E-AA69-E6921082FAF5}"/>
-              </a:ext>
-            </a:extLst>
-          </p:cNvPr>
-          <p:cNvCxnSpPr>
-            <a:cxnSpLocks/>
-          </p:cNvCxnSpPr>
-          <p:nvPr/>
-        </p:nvCxnSpPr>
-        <p:spPr>
-          <a:xfrm flipV="1">
-            <a:off x="2287253" y="431231"/>
-            <a:ext cx="0" cy="2016000"/>
-          </a:xfrm>
-          <a:prstGeom prst="line">
-            <a:avLst/>
-          </a:prstGeom>
-          <a:ln w="3175">
-            <a:solidFill>
-              <a:schemeClr val="bg1">
-                <a:lumMod val="85000"/>
-              </a:schemeClr>
-            </a:solidFill>
-          </a:ln>
-        </p:spPr>
-        <p:style>
-          <a:lnRef idx="1">
-            <a:schemeClr val="accent1"/>
-          </a:lnRef>
-          <a:fillRef idx="0">
-            <a:schemeClr val="accent1"/>
-          </a:fillRef>
-          <a:effectRef idx="0">
-            <a:schemeClr val="accent1"/>
-          </a:effectRef>
-          <a:fontRef idx="minor">
-            <a:schemeClr val="tx1"/>
-          </a:fontRef>
-        </p:style>
-      </p:cxnSp>
-      <p:cxnSp>
-        <p:nvCxnSpPr>
-          <p:cNvPr id="102" name="Straight Connector 101">
-            <a:extLst>
-              <a:ext uri="{FF2B5EF4-FFF2-40B4-BE49-F238E27FC236}">
-                <a16:creationId xmlns:a16="http://schemas.microsoft.com/office/drawing/2014/main" id="{74117661-CEC8-4490-A850-1D55A29634D4}"/>
-              </a:ext>
-            </a:extLst>
-          </p:cNvPr>
-          <p:cNvCxnSpPr>
-            <a:cxnSpLocks/>
-          </p:cNvCxnSpPr>
-          <p:nvPr/>
-        </p:nvCxnSpPr>
-        <p:spPr>
-          <a:xfrm flipV="1">
-            <a:off x="2420327" y="431231"/>
-            <a:ext cx="0" cy="2016000"/>
-          </a:xfrm>
-          <a:prstGeom prst="line">
-            <a:avLst/>
-          </a:prstGeom>
-          <a:ln w="3175">
-            <a:solidFill>
-              <a:schemeClr val="bg1">
-                <a:lumMod val="85000"/>
-              </a:schemeClr>
-            </a:solidFill>
-          </a:ln>
-        </p:spPr>
-        <p:style>
-          <a:lnRef idx="1">
-            <a:schemeClr val="accent1"/>
-          </a:lnRef>
-          <a:fillRef idx="0">
-            <a:schemeClr val="accent1"/>
-          </a:fillRef>
-          <a:effectRef idx="0">
-            <a:schemeClr val="accent1"/>
-          </a:effectRef>
-          <a:fontRef idx="minor">
-            <a:schemeClr val="tx1"/>
-          </a:fontRef>
-        </p:style>
-      </p:cxnSp>
-      <p:cxnSp>
-        <p:nvCxnSpPr>
-          <p:cNvPr id="103" name="Straight Connector 102">
-            <a:extLst>
-              <a:ext uri="{FF2B5EF4-FFF2-40B4-BE49-F238E27FC236}">
-                <a16:creationId xmlns:a16="http://schemas.microsoft.com/office/drawing/2014/main" id="{268F678A-468F-427F-BC81-0FF680BF3DA7}"/>
-              </a:ext>
-            </a:extLst>
-          </p:cNvPr>
-          <p:cNvCxnSpPr>
-            <a:cxnSpLocks/>
-          </p:cNvCxnSpPr>
-          <p:nvPr/>
-        </p:nvCxnSpPr>
-        <p:spPr>
-          <a:xfrm flipV="1">
-            <a:off x="2553401" y="431231"/>
-            <a:ext cx="0" cy="2016000"/>
-          </a:xfrm>
-          <a:prstGeom prst="line">
-            <a:avLst/>
-          </a:prstGeom>
-          <a:ln w="3175">
-            <a:solidFill>
-              <a:schemeClr val="bg1">
-                <a:lumMod val="85000"/>
-              </a:schemeClr>
-            </a:solidFill>
-          </a:ln>
-        </p:spPr>
-        <p:style>
-          <a:lnRef idx="1">
-            <a:schemeClr val="accent1"/>
-          </a:lnRef>
-          <a:fillRef idx="0">
-            <a:schemeClr val="accent1"/>
-          </a:fillRef>
-          <a:effectRef idx="0">
-            <a:schemeClr val="accent1"/>
-          </a:effectRef>
-          <a:fontRef idx="minor">
-            <a:schemeClr val="tx1"/>
-          </a:fontRef>
-        </p:style>
-      </p:cxnSp>
-      <p:cxnSp>
-        <p:nvCxnSpPr>
-          <p:cNvPr id="104" name="Straight Connector 103">
-            <a:extLst>
-              <a:ext uri="{FF2B5EF4-FFF2-40B4-BE49-F238E27FC236}">
-                <a16:creationId xmlns:a16="http://schemas.microsoft.com/office/drawing/2014/main" id="{308F3207-65D8-4CEC-9682-F1F214940F9F}"/>
-              </a:ext>
-            </a:extLst>
-          </p:cNvPr>
-          <p:cNvCxnSpPr>
-            <a:cxnSpLocks/>
-          </p:cNvCxnSpPr>
-          <p:nvPr/>
-        </p:nvCxnSpPr>
-        <p:spPr>
-          <a:xfrm flipV="1">
-            <a:off x="2689229" y="431231"/>
-            <a:ext cx="0" cy="2016000"/>
-          </a:xfrm>
-          <a:prstGeom prst="line">
-            <a:avLst/>
-          </a:prstGeom>
-          <a:ln w="3175">
-            <a:solidFill>
-              <a:schemeClr val="bg1">
-                <a:lumMod val="85000"/>
-              </a:schemeClr>
-            </a:solidFill>
-          </a:ln>
-        </p:spPr>
-        <p:style>
-          <a:lnRef idx="1">
-            <a:schemeClr val="accent1"/>
-          </a:lnRef>
-          <a:fillRef idx="0">
-            <a:schemeClr val="accent1"/>
-          </a:fillRef>
-          <a:effectRef idx="0">
-            <a:schemeClr val="accent1"/>
-          </a:effectRef>
-          <a:fontRef idx="minor">
-            <a:schemeClr val="tx1"/>
-          </a:fontRef>
-        </p:style>
-      </p:cxnSp>
-      <p:cxnSp>
-        <p:nvCxnSpPr>
-          <p:cNvPr id="105" name="Straight Connector 104">
-            <a:extLst>
-              <a:ext uri="{FF2B5EF4-FFF2-40B4-BE49-F238E27FC236}">
-                <a16:creationId xmlns:a16="http://schemas.microsoft.com/office/drawing/2014/main" id="{055DC60E-222B-4E21-BD96-9316959125E8}"/>
-              </a:ext>
-            </a:extLst>
-          </p:cNvPr>
-          <p:cNvCxnSpPr>
-            <a:cxnSpLocks/>
-          </p:cNvCxnSpPr>
-          <p:nvPr/>
-        </p:nvCxnSpPr>
-        <p:spPr>
-          <a:xfrm flipV="1">
-            <a:off x="2819549" y="431231"/>
-            <a:ext cx="0" cy="2016000"/>
-          </a:xfrm>
-          <a:prstGeom prst="line">
-            <a:avLst/>
-          </a:prstGeom>
-          <a:ln w="3175">
-            <a:solidFill>
-              <a:schemeClr val="bg1">
-                <a:lumMod val="85000"/>
-              </a:schemeClr>
-            </a:solidFill>
-          </a:ln>
-        </p:spPr>
-        <p:style>
-          <a:lnRef idx="1">
-            <a:schemeClr val="accent1"/>
-          </a:lnRef>
-          <a:fillRef idx="0">
-            <a:schemeClr val="accent1"/>
-          </a:fillRef>
-          <a:effectRef idx="0">
-            <a:schemeClr val="accent1"/>
-          </a:effectRef>
-          <a:fontRef idx="minor">
-            <a:schemeClr val="tx1"/>
-          </a:fontRef>
-        </p:style>
-      </p:cxnSp>
-      <p:cxnSp>
-        <p:nvCxnSpPr>
-          <p:cNvPr id="106" name="Straight Connector 105">
-            <a:extLst>
-              <a:ext uri="{FF2B5EF4-FFF2-40B4-BE49-F238E27FC236}">
-                <a16:creationId xmlns:a16="http://schemas.microsoft.com/office/drawing/2014/main" id="{1BCB4E40-8502-4B95-81EC-75D5B3A48AB9}"/>
-              </a:ext>
-            </a:extLst>
-          </p:cNvPr>
-          <p:cNvCxnSpPr>
-            <a:cxnSpLocks/>
-          </p:cNvCxnSpPr>
-          <p:nvPr/>
-        </p:nvCxnSpPr>
-        <p:spPr>
-          <a:xfrm flipV="1">
-            <a:off x="687611" y="431231"/>
-            <a:ext cx="0" cy="2016000"/>
-          </a:xfrm>
-          <a:prstGeom prst="line">
-            <a:avLst/>
-          </a:prstGeom>
-          <a:ln w="3175">
-            <a:solidFill>
-              <a:schemeClr val="bg1">
-                <a:lumMod val="85000"/>
-              </a:schemeClr>
-            </a:solidFill>
-          </a:ln>
-        </p:spPr>
-        <p:style>
-          <a:lnRef idx="1">
-            <a:schemeClr val="accent1"/>
-          </a:lnRef>
-          <a:fillRef idx="0">
-            <a:schemeClr val="accent1"/>
-          </a:fillRef>
-          <a:effectRef idx="0">
-            <a:schemeClr val="accent1"/>
-          </a:effectRef>
-          <a:fontRef idx="minor">
-            <a:schemeClr val="tx1"/>
-          </a:fontRef>
-        </p:style>
-      </p:cxnSp>
-      <p:cxnSp>
-        <p:nvCxnSpPr>
-          <p:cNvPr id="107" name="Straight Connector 106">
-            <a:extLst>
-              <a:ext uri="{FF2B5EF4-FFF2-40B4-BE49-F238E27FC236}">
-                <a16:creationId xmlns:a16="http://schemas.microsoft.com/office/drawing/2014/main" id="{C280B49A-2440-4B14-AD18-466E0FD82938}"/>
-              </a:ext>
-            </a:extLst>
-          </p:cNvPr>
-          <p:cNvCxnSpPr>
-            <a:cxnSpLocks/>
-          </p:cNvCxnSpPr>
-          <p:nvPr/>
-        </p:nvCxnSpPr>
-        <p:spPr>
-          <a:xfrm flipV="1">
-            <a:off x="956513" y="431231"/>
-            <a:ext cx="0" cy="2016000"/>
-          </a:xfrm>
-          <a:prstGeom prst="line">
-            <a:avLst/>
-          </a:prstGeom>
-          <a:ln w="3175">
-            <a:solidFill>
-              <a:schemeClr val="bg1">
-                <a:lumMod val="85000"/>
-              </a:schemeClr>
-            </a:solidFill>
-          </a:ln>
-        </p:spPr>
-        <p:style>
-          <a:lnRef idx="1">
-            <a:schemeClr val="accent1"/>
-          </a:lnRef>
-          <a:fillRef idx="0">
-            <a:schemeClr val="accent1"/>
-          </a:fillRef>
-          <a:effectRef idx="0">
-            <a:schemeClr val="accent1"/>
-          </a:effectRef>
-          <a:fontRef idx="minor">
-            <a:schemeClr val="tx1"/>
-          </a:fontRef>
-        </p:style>
-      </p:cxnSp>
-      <p:cxnSp>
-        <p:nvCxnSpPr>
-          <p:cNvPr id="108" name="Straight Connector 107">
-            <a:extLst>
-              <a:ext uri="{FF2B5EF4-FFF2-40B4-BE49-F238E27FC236}">
-                <a16:creationId xmlns:a16="http://schemas.microsoft.com/office/drawing/2014/main" id="{F7724B37-1EED-496A-AD30-4D6193E5C741}"/>
-              </a:ext>
-            </a:extLst>
-          </p:cNvPr>
-          <p:cNvCxnSpPr>
-            <a:cxnSpLocks/>
-          </p:cNvCxnSpPr>
-          <p:nvPr/>
-        </p:nvCxnSpPr>
-        <p:spPr>
-          <a:xfrm flipV="1">
-            <a:off x="1222661" y="431231"/>
-            <a:ext cx="0" cy="2016000"/>
-          </a:xfrm>
-          <a:prstGeom prst="line">
-            <a:avLst/>
-          </a:prstGeom>
-          <a:ln w="3175">
-            <a:solidFill>
-              <a:schemeClr val="bg1">
-                <a:lumMod val="85000"/>
-              </a:schemeClr>
-            </a:solidFill>
-          </a:ln>
-        </p:spPr>
-        <p:style>
-          <a:lnRef idx="1">
-            <a:schemeClr val="accent1"/>
-          </a:lnRef>
-          <a:fillRef idx="0">
-            <a:schemeClr val="accent1"/>
-          </a:fillRef>
-          <a:effectRef idx="0">
-            <a:schemeClr val="accent1"/>
-          </a:effectRef>
-          <a:fontRef idx="minor">
-            <a:schemeClr val="tx1"/>
-          </a:fontRef>
-        </p:style>
-      </p:cxnSp>
-      <p:cxnSp>
-        <p:nvCxnSpPr>
-          <p:cNvPr id="109" name="Straight Connector 108">
-            <a:extLst>
-              <a:ext uri="{FF2B5EF4-FFF2-40B4-BE49-F238E27FC236}">
-                <a16:creationId xmlns:a16="http://schemas.microsoft.com/office/drawing/2014/main" id="{0A736758-5AC6-49AC-8C0D-113BE604462C}"/>
-              </a:ext>
-            </a:extLst>
-          </p:cNvPr>
-          <p:cNvCxnSpPr>
-            <a:cxnSpLocks/>
-          </p:cNvCxnSpPr>
-          <p:nvPr/>
-        </p:nvCxnSpPr>
-        <p:spPr>
-          <a:xfrm flipV="1">
-            <a:off x="1422272" y="431231"/>
-            <a:ext cx="0" cy="2016000"/>
-          </a:xfrm>
-          <a:prstGeom prst="line">
-            <a:avLst/>
-          </a:prstGeom>
-          <a:ln w="3175">
-            <a:solidFill>
-              <a:schemeClr val="bg1">
-                <a:lumMod val="85000"/>
-              </a:schemeClr>
-            </a:solidFill>
-          </a:ln>
-        </p:spPr>
-        <p:style>
-          <a:lnRef idx="1">
-            <a:schemeClr val="accent1"/>
-          </a:lnRef>
-          <a:fillRef idx="0">
-            <a:schemeClr val="accent1"/>
-          </a:fillRef>
-          <a:effectRef idx="0">
-            <a:schemeClr val="accent1"/>
-          </a:effectRef>
-          <a:fontRef idx="minor">
-            <a:schemeClr val="tx1"/>
-          </a:fontRef>
-        </p:style>
-      </p:cxnSp>
-      <p:cxnSp>
-        <p:nvCxnSpPr>
-          <p:cNvPr id="110" name="Straight Connector 109">
-            <a:extLst>
-              <a:ext uri="{FF2B5EF4-FFF2-40B4-BE49-F238E27FC236}">
-                <a16:creationId xmlns:a16="http://schemas.microsoft.com/office/drawing/2014/main" id="{254FDB97-6209-4A63-9C0B-D77D22DB2301}"/>
-              </a:ext>
-            </a:extLst>
-          </p:cNvPr>
-          <p:cNvCxnSpPr>
-            <a:cxnSpLocks/>
-          </p:cNvCxnSpPr>
-          <p:nvPr/>
-        </p:nvCxnSpPr>
-        <p:spPr>
-          <a:xfrm flipV="1">
-            <a:off x="1555346" y="431231"/>
-            <a:ext cx="0" cy="2016000"/>
-          </a:xfrm>
-          <a:prstGeom prst="line">
-            <a:avLst/>
-          </a:prstGeom>
-          <a:ln w="3175">
-            <a:solidFill>
-              <a:schemeClr val="bg1">
-                <a:lumMod val="85000"/>
-              </a:schemeClr>
-            </a:solidFill>
-          </a:ln>
-        </p:spPr>
-        <p:style>
-          <a:lnRef idx="1">
-            <a:schemeClr val="accent1"/>
-          </a:lnRef>
-          <a:fillRef idx="0">
-            <a:schemeClr val="accent1"/>
-          </a:fillRef>
-          <a:effectRef idx="0">
-            <a:schemeClr val="accent1"/>
-          </a:effectRef>
-          <a:fontRef idx="minor">
-            <a:schemeClr val="tx1"/>
-          </a:fontRef>
-        </p:style>
-      </p:cxnSp>
-      <p:cxnSp>
-        <p:nvCxnSpPr>
-          <p:cNvPr id="111" name="Straight Connector 110">
-            <a:extLst>
-              <a:ext uri="{FF2B5EF4-FFF2-40B4-BE49-F238E27FC236}">
-                <a16:creationId xmlns:a16="http://schemas.microsoft.com/office/drawing/2014/main" id="{9E9ECBA3-A02B-430E-872F-9BF13F214215}"/>
-              </a:ext>
-            </a:extLst>
-          </p:cNvPr>
-          <p:cNvCxnSpPr>
-            <a:cxnSpLocks/>
-          </p:cNvCxnSpPr>
-          <p:nvPr/>
-        </p:nvCxnSpPr>
-        <p:spPr>
-          <a:xfrm flipV="1">
-            <a:off x="1688420" y="431231"/>
-            <a:ext cx="0" cy="2016000"/>
-          </a:xfrm>
-          <a:prstGeom prst="line">
-            <a:avLst/>
-          </a:prstGeom>
-          <a:ln w="3175">
-            <a:solidFill>
-              <a:schemeClr val="bg1">
-                <a:lumMod val="85000"/>
-              </a:schemeClr>
-            </a:solidFill>
-          </a:ln>
-        </p:spPr>
-        <p:style>
-          <a:lnRef idx="1">
-            <a:schemeClr val="accent1"/>
-          </a:lnRef>
-          <a:fillRef idx="0">
-            <a:schemeClr val="accent1"/>
-          </a:fillRef>
-          <a:effectRef idx="0">
-            <a:schemeClr val="accent1"/>
-          </a:effectRef>
-          <a:fontRef idx="minor">
-            <a:schemeClr val="tx1"/>
-          </a:fontRef>
-        </p:style>
-      </p:cxnSp>
-      <p:cxnSp>
-        <p:nvCxnSpPr>
-          <p:cNvPr id="112" name="Straight Connector 111">
-            <a:extLst>
-              <a:ext uri="{FF2B5EF4-FFF2-40B4-BE49-F238E27FC236}">
-                <a16:creationId xmlns:a16="http://schemas.microsoft.com/office/drawing/2014/main" id="{C365EFD3-7C0F-430A-996A-DDEE151103A2}"/>
-              </a:ext>
-            </a:extLst>
-          </p:cNvPr>
-          <p:cNvCxnSpPr>
-            <a:cxnSpLocks/>
-          </p:cNvCxnSpPr>
-          <p:nvPr/>
-        </p:nvCxnSpPr>
-        <p:spPr>
-          <a:xfrm flipV="1">
-            <a:off x="1821494" y="431231"/>
-            <a:ext cx="0" cy="2016000"/>
-          </a:xfrm>
-          <a:prstGeom prst="line">
-            <a:avLst/>
-          </a:prstGeom>
-          <a:ln w="3175">
-            <a:solidFill>
-              <a:schemeClr val="bg1">
-                <a:lumMod val="85000"/>
-              </a:schemeClr>
-            </a:solidFill>
-          </a:ln>
-        </p:spPr>
-        <p:style>
-          <a:lnRef idx="1">
-            <a:schemeClr val="accent1"/>
-          </a:lnRef>
-          <a:fillRef idx="0">
-            <a:schemeClr val="accent1"/>
-          </a:fillRef>
-          <a:effectRef idx="0">
-            <a:schemeClr val="accent1"/>
-          </a:effectRef>
-          <a:fontRef idx="minor">
-            <a:schemeClr val="tx1"/>
-          </a:fontRef>
-        </p:style>
-      </p:cxnSp>
-      <p:cxnSp>
-        <p:nvCxnSpPr>
-          <p:cNvPr id="113" name="Straight Connector 112">
-            <a:extLst>
-              <a:ext uri="{FF2B5EF4-FFF2-40B4-BE49-F238E27FC236}">
-                <a16:creationId xmlns:a16="http://schemas.microsoft.com/office/drawing/2014/main" id="{67FC9C21-CF99-4A03-87A2-CB94F23282CD}"/>
-              </a:ext>
-            </a:extLst>
-          </p:cNvPr>
-          <p:cNvCxnSpPr>
-            <a:cxnSpLocks/>
-          </p:cNvCxnSpPr>
-          <p:nvPr/>
-        </p:nvCxnSpPr>
-        <p:spPr>
-          <a:xfrm flipV="1">
-            <a:off x="1951814" y="431231"/>
-            <a:ext cx="0" cy="2016000"/>
-          </a:xfrm>
-          <a:prstGeom prst="line">
-            <a:avLst/>
-          </a:prstGeom>
-          <a:ln w="3175">
-            <a:solidFill>
-              <a:schemeClr val="bg1">
-                <a:lumMod val="85000"/>
-              </a:schemeClr>
-            </a:solidFill>
-          </a:ln>
-        </p:spPr>
-        <p:style>
-          <a:lnRef idx="1">
-            <a:schemeClr val="accent1"/>
-          </a:lnRef>
-          <a:fillRef idx="0">
-            <a:schemeClr val="accent1"/>
-          </a:fillRef>
-          <a:effectRef idx="0">
-            <a:schemeClr val="accent1"/>
-          </a:effectRef>
-          <a:fontRef idx="minor">
-            <a:schemeClr val="tx1"/>
-          </a:fontRef>
-        </p:style>
-      </p:cxnSp>
-      <p:cxnSp>
-        <p:nvCxnSpPr>
-          <p:cNvPr id="114" name="Straight Connector 113">
-            <a:extLst>
-              <a:ext uri="{FF2B5EF4-FFF2-40B4-BE49-F238E27FC236}">
-                <a16:creationId xmlns:a16="http://schemas.microsoft.com/office/drawing/2014/main" id="{E03E486F-3A32-4C9E-9AC4-A09AB0F561FF}"/>
-              </a:ext>
-            </a:extLst>
-          </p:cNvPr>
-          <p:cNvCxnSpPr>
-            <a:cxnSpLocks/>
-          </p:cNvCxnSpPr>
-          <p:nvPr/>
-        </p:nvCxnSpPr>
-        <p:spPr>
-          <a:xfrm flipV="1">
-            <a:off x="2087642" y="431231"/>
-            <a:ext cx="0" cy="2016000"/>
-          </a:xfrm>
-          <a:prstGeom prst="line">
-            <a:avLst/>
-          </a:prstGeom>
-          <a:ln w="3175">
-            <a:solidFill>
-              <a:schemeClr val="bg1">
-                <a:lumMod val="85000"/>
-              </a:schemeClr>
-            </a:solidFill>
-          </a:ln>
-        </p:spPr>
-        <p:style>
-          <a:lnRef idx="1">
-            <a:schemeClr val="accent1"/>
-          </a:lnRef>
-          <a:fillRef idx="0">
-            <a:schemeClr val="accent1"/>
-          </a:fillRef>
-          <a:effectRef idx="0">
-            <a:schemeClr val="accent1"/>
-          </a:effectRef>
-          <a:fontRef idx="minor">
-            <a:schemeClr val="tx1"/>
-          </a:fontRef>
-        </p:style>
-      </p:cxnSp>
-      <p:cxnSp>
-        <p:nvCxnSpPr>
-          <p:cNvPr id="115" name="Straight Connector 114">
-            <a:extLst>
-              <a:ext uri="{FF2B5EF4-FFF2-40B4-BE49-F238E27FC236}">
-                <a16:creationId xmlns:a16="http://schemas.microsoft.com/office/drawing/2014/main" id="{C39EEBFE-4D1E-4DFA-8F52-37FAB367DBD7}"/>
-              </a:ext>
-            </a:extLst>
-          </p:cNvPr>
-          <p:cNvCxnSpPr>
-            <a:cxnSpLocks/>
-          </p:cNvCxnSpPr>
-          <p:nvPr/>
-        </p:nvCxnSpPr>
-        <p:spPr>
-          <a:xfrm flipV="1">
-            <a:off x="2220716" y="431231"/>
-            <a:ext cx="0" cy="2016000"/>
-          </a:xfrm>
-          <a:prstGeom prst="line">
-            <a:avLst/>
-          </a:prstGeom>
-          <a:ln w="3175">
-            <a:solidFill>
-              <a:schemeClr val="bg1">
-                <a:lumMod val="85000"/>
-              </a:schemeClr>
-            </a:solidFill>
-          </a:ln>
-        </p:spPr>
-        <p:style>
-          <a:lnRef idx="1">
-            <a:schemeClr val="accent1"/>
-          </a:lnRef>
-          <a:fillRef idx="0">
-            <a:schemeClr val="accent1"/>
-          </a:fillRef>
-          <a:effectRef idx="0">
-            <a:schemeClr val="accent1"/>
-          </a:effectRef>
-          <a:fontRef idx="minor">
-            <a:schemeClr val="tx1"/>
-          </a:fontRef>
-        </p:style>
-      </p:cxnSp>
-      <p:cxnSp>
-        <p:nvCxnSpPr>
-          <p:cNvPr id="116" name="Straight Connector 115">
-            <a:extLst>
-              <a:ext uri="{FF2B5EF4-FFF2-40B4-BE49-F238E27FC236}">
-                <a16:creationId xmlns:a16="http://schemas.microsoft.com/office/drawing/2014/main" id="{316DCD4D-D2DF-45EC-9FA6-268E4BF01DC4}"/>
-              </a:ext>
-            </a:extLst>
-          </p:cNvPr>
-          <p:cNvCxnSpPr>
-            <a:cxnSpLocks/>
-          </p:cNvCxnSpPr>
-          <p:nvPr/>
-        </p:nvCxnSpPr>
-        <p:spPr>
-          <a:xfrm flipV="1">
-            <a:off x="2353790" y="431231"/>
-            <a:ext cx="0" cy="2016000"/>
-          </a:xfrm>
-          <a:prstGeom prst="line">
-            <a:avLst/>
-          </a:prstGeom>
-          <a:ln w="3175">
-            <a:solidFill>
-              <a:schemeClr val="bg1">
-                <a:lumMod val="85000"/>
-              </a:schemeClr>
-            </a:solidFill>
-          </a:ln>
-        </p:spPr>
-        <p:style>
-          <a:lnRef idx="1">
-            <a:schemeClr val="accent1"/>
-          </a:lnRef>
-          <a:fillRef idx="0">
-            <a:schemeClr val="accent1"/>
-          </a:fillRef>
-          <a:effectRef idx="0">
-            <a:schemeClr val="accent1"/>
-          </a:effectRef>
-          <a:fontRef idx="minor">
-            <a:schemeClr val="tx1"/>
-          </a:fontRef>
-        </p:style>
-      </p:cxnSp>
-      <p:cxnSp>
-        <p:nvCxnSpPr>
-          <p:cNvPr id="117" name="Straight Connector 116">
-            <a:extLst>
-              <a:ext uri="{FF2B5EF4-FFF2-40B4-BE49-F238E27FC236}">
-                <a16:creationId xmlns:a16="http://schemas.microsoft.com/office/drawing/2014/main" id="{EAEEC749-7FD3-43C0-9724-9B405773272E}"/>
-              </a:ext>
-            </a:extLst>
-          </p:cNvPr>
-          <p:cNvCxnSpPr>
-            <a:cxnSpLocks/>
-          </p:cNvCxnSpPr>
-          <p:nvPr/>
-        </p:nvCxnSpPr>
-        <p:spPr>
-          <a:xfrm flipV="1">
-            <a:off x="2486864" y="431231"/>
-            <a:ext cx="0" cy="2016000"/>
-          </a:xfrm>
-          <a:prstGeom prst="line">
-            <a:avLst/>
-          </a:prstGeom>
-          <a:ln w="3175">
-            <a:solidFill>
-              <a:schemeClr val="bg1">
-                <a:lumMod val="85000"/>
-              </a:schemeClr>
-            </a:solidFill>
-          </a:ln>
-        </p:spPr>
-        <p:style>
-          <a:lnRef idx="1">
-            <a:schemeClr val="accent1"/>
-          </a:lnRef>
-          <a:fillRef idx="0">
-            <a:schemeClr val="accent1"/>
-          </a:fillRef>
-          <a:effectRef idx="0">
-            <a:schemeClr val="accent1"/>
-          </a:effectRef>
-          <a:fontRef idx="minor">
-            <a:schemeClr val="tx1"/>
-          </a:fontRef>
-        </p:style>
-      </p:cxnSp>
-      <p:cxnSp>
-        <p:nvCxnSpPr>
-          <p:cNvPr id="118" name="Straight Connector 117">
-            <a:extLst>
-              <a:ext uri="{FF2B5EF4-FFF2-40B4-BE49-F238E27FC236}">
-                <a16:creationId xmlns:a16="http://schemas.microsoft.com/office/drawing/2014/main" id="{ACA9747F-D152-4E65-8A14-2951383A9672}"/>
-              </a:ext>
-            </a:extLst>
-          </p:cNvPr>
-          <p:cNvCxnSpPr>
-            <a:cxnSpLocks/>
-          </p:cNvCxnSpPr>
-          <p:nvPr/>
-        </p:nvCxnSpPr>
-        <p:spPr>
-          <a:xfrm flipV="1">
-            <a:off x="2619938" y="431231"/>
-            <a:ext cx="0" cy="2016000"/>
-          </a:xfrm>
-          <a:prstGeom prst="line">
-            <a:avLst/>
-          </a:prstGeom>
-          <a:ln w="3175">
-            <a:solidFill>
-              <a:schemeClr val="bg1">
-                <a:lumMod val="85000"/>
-              </a:schemeClr>
-            </a:solidFill>
-          </a:ln>
-        </p:spPr>
-        <p:style>
-          <a:lnRef idx="1">
-            <a:schemeClr val="accent1"/>
-          </a:lnRef>
-          <a:fillRef idx="0">
-            <a:schemeClr val="accent1"/>
-          </a:fillRef>
-          <a:effectRef idx="0">
-            <a:schemeClr val="accent1"/>
-          </a:effectRef>
-          <a:fontRef idx="minor">
-            <a:schemeClr val="tx1"/>
-          </a:fontRef>
-        </p:style>
-      </p:cxnSp>
-      <p:cxnSp>
-        <p:nvCxnSpPr>
-          <p:cNvPr id="119" name="Straight Connector 118">
-            <a:extLst>
-              <a:ext uri="{FF2B5EF4-FFF2-40B4-BE49-F238E27FC236}">
-                <a16:creationId xmlns:a16="http://schemas.microsoft.com/office/drawing/2014/main" id="{29CA71A9-3042-4E56-8B2A-6A1E0E9A1B8B}"/>
-              </a:ext>
-            </a:extLst>
-          </p:cNvPr>
-          <p:cNvCxnSpPr>
-            <a:cxnSpLocks/>
-          </p:cNvCxnSpPr>
-          <p:nvPr/>
-        </p:nvCxnSpPr>
-        <p:spPr>
-          <a:xfrm flipV="1">
-            <a:off x="2753012" y="431231"/>
-            <a:ext cx="0" cy="2016000"/>
-          </a:xfrm>
-          <a:prstGeom prst="line">
-            <a:avLst/>
-          </a:prstGeom>
-          <a:ln w="3175">
-            <a:solidFill>
-              <a:schemeClr val="bg1">
-                <a:lumMod val="85000"/>
-              </a:schemeClr>
-            </a:solidFill>
-          </a:ln>
-        </p:spPr>
-        <p:style>
-          <a:lnRef idx="1">
-            <a:schemeClr val="accent1"/>
-          </a:lnRef>
-          <a:fillRef idx="0">
-            <a:schemeClr val="accent1"/>
-          </a:fillRef>
-          <a:effectRef idx="0">
-            <a:schemeClr val="accent1"/>
-          </a:effectRef>
-          <a:fontRef idx="minor">
-            <a:schemeClr val="tx1"/>
-          </a:fontRef>
-        </p:style>
-      </p:cxnSp>
-      <p:cxnSp>
-        <p:nvCxnSpPr>
-          <p:cNvPr id="120" name="Straight Connector 119">
-            <a:extLst>
-              <a:ext uri="{FF2B5EF4-FFF2-40B4-BE49-F238E27FC236}">
-                <a16:creationId xmlns:a16="http://schemas.microsoft.com/office/drawing/2014/main" id="{513EE874-16CD-47BE-900D-105A02CC04CE}"/>
-              </a:ext>
-            </a:extLst>
-          </p:cNvPr>
-          <p:cNvCxnSpPr>
-            <a:cxnSpLocks/>
-          </p:cNvCxnSpPr>
-          <p:nvPr/>
-        </p:nvCxnSpPr>
-        <p:spPr>
-          <a:xfrm flipV="1">
-            <a:off x="2886086" y="431231"/>
-            <a:ext cx="0" cy="2016000"/>
-          </a:xfrm>
-          <a:prstGeom prst="line">
-            <a:avLst/>
-          </a:prstGeom>
-          <a:ln w="3175">
-            <a:solidFill>
-              <a:schemeClr val="bg1">
-                <a:lumMod val="85000"/>
-              </a:schemeClr>
-            </a:solidFill>
-          </a:ln>
-        </p:spPr>
-        <p:style>
-          <a:lnRef idx="1">
-            <a:schemeClr val="accent1"/>
-          </a:lnRef>
-          <a:fillRef idx="0">
-            <a:schemeClr val="accent1"/>
-          </a:fillRef>
-          <a:effectRef idx="0">
-            <a:schemeClr val="accent1"/>
-          </a:effectRef>
-          <a:fontRef idx="minor">
-            <a:schemeClr val="tx1"/>
-          </a:fontRef>
-        </p:style>
-      </p:cxnSp>
-      <p:cxnSp>
-        <p:nvCxnSpPr>
-          <p:cNvPr id="121" name="Straight Connector 120">
-            <a:extLst>
-              <a:ext uri="{FF2B5EF4-FFF2-40B4-BE49-F238E27FC236}">
-                <a16:creationId xmlns:a16="http://schemas.microsoft.com/office/drawing/2014/main" id="{3004E992-93FD-4AD1-90E7-783FB341BCAA}"/>
-              </a:ext>
-            </a:extLst>
-          </p:cNvPr>
-          <p:cNvCxnSpPr>
-            <a:cxnSpLocks/>
-          </p:cNvCxnSpPr>
-          <p:nvPr/>
-        </p:nvCxnSpPr>
-        <p:spPr>
-          <a:xfrm flipV="1">
-            <a:off x="2952628" y="431231"/>
-            <a:ext cx="0" cy="2016000"/>
-          </a:xfrm>
-          <a:prstGeom prst="line">
-            <a:avLst/>
-          </a:prstGeom>
-          <a:ln w="3175">
-            <a:solidFill>
-              <a:schemeClr val="bg1">
-                <a:lumMod val="85000"/>
-              </a:schemeClr>
-            </a:solidFill>
-          </a:ln>
-        </p:spPr>
-        <p:style>
-          <a:lnRef idx="1">
-            <a:schemeClr val="accent1"/>
-          </a:lnRef>
-          <a:fillRef idx="0">
-            <a:schemeClr val="accent1"/>
-          </a:fillRef>
-          <a:effectRef idx="0">
-            <a:schemeClr val="accent1"/>
-          </a:effectRef>
-          <a:fontRef idx="minor">
-            <a:schemeClr val="tx1"/>
-          </a:fontRef>
-        </p:style>
-      </p:cxnSp>
-      <p:cxnSp>
-        <p:nvCxnSpPr>
-          <p:cNvPr id="123" name="Straight Connector 122">
-            <a:extLst>
-              <a:ext uri="{FF2B5EF4-FFF2-40B4-BE49-F238E27FC236}">
-                <a16:creationId xmlns:a16="http://schemas.microsoft.com/office/drawing/2014/main" id="{4FDFC4D7-0D9C-45A8-B987-9402A73D9013}"/>
-              </a:ext>
-            </a:extLst>
-          </p:cNvPr>
-          <p:cNvCxnSpPr>
-            <a:cxnSpLocks/>
-          </p:cNvCxnSpPr>
-          <p:nvPr/>
-        </p:nvCxnSpPr>
-        <p:spPr>
-          <a:xfrm flipV="1">
-            <a:off x="623828" y="431231"/>
-            <a:ext cx="0" cy="2016000"/>
-          </a:xfrm>
-          <a:prstGeom prst="line">
-            <a:avLst/>
-          </a:prstGeom>
-          <a:ln w="3175">
-            <a:solidFill>
-              <a:schemeClr val="bg1">
-                <a:lumMod val="85000"/>
-              </a:schemeClr>
-            </a:solidFill>
-          </a:ln>
-        </p:spPr>
-        <p:style>
-          <a:lnRef idx="1">
-            <a:schemeClr val="accent1"/>
-          </a:lnRef>
-          <a:fillRef idx="0">
-            <a:schemeClr val="accent1"/>
-          </a:fillRef>
-          <a:effectRef idx="0">
-            <a:schemeClr val="accent1"/>
-          </a:effectRef>
-          <a:fontRef idx="minor">
-            <a:schemeClr val="tx1"/>
-          </a:fontRef>
-        </p:style>
-      </p:cxnSp>
-      <p:cxnSp>
-        <p:nvCxnSpPr>
-          <p:cNvPr id="124" name="Straight Connector 123">
-            <a:extLst>
-              <a:ext uri="{FF2B5EF4-FFF2-40B4-BE49-F238E27FC236}">
-                <a16:creationId xmlns:a16="http://schemas.microsoft.com/office/drawing/2014/main" id="{DC61E9BE-7D5F-47B6-805E-1DA10895EDB6}"/>
-              </a:ext>
-            </a:extLst>
-          </p:cNvPr>
-          <p:cNvCxnSpPr>
-            <a:cxnSpLocks/>
-          </p:cNvCxnSpPr>
-          <p:nvPr/>
-        </p:nvCxnSpPr>
-        <p:spPr>
-          <a:xfrm flipV="1">
-            <a:off x="751394" y="431231"/>
-            <a:ext cx="0" cy="2016000"/>
-          </a:xfrm>
-          <a:prstGeom prst="line">
-            <a:avLst/>
-          </a:prstGeom>
-          <a:ln w="3175">
-            <a:solidFill>
-              <a:schemeClr val="bg1">
-                <a:lumMod val="85000"/>
-              </a:schemeClr>
-            </a:solidFill>
-          </a:ln>
-        </p:spPr>
-        <p:style>
-          <a:lnRef idx="1">
-            <a:schemeClr val="accent1"/>
-          </a:lnRef>
-          <a:fillRef idx="0">
-            <a:schemeClr val="accent1"/>
-          </a:fillRef>
-          <a:effectRef idx="0">
-            <a:schemeClr val="accent1"/>
-          </a:effectRef>
-          <a:fontRef idx="minor">
-            <a:schemeClr val="tx1"/>
-          </a:fontRef>
-        </p:style>
-      </p:cxnSp>
-      <p:cxnSp>
-        <p:nvCxnSpPr>
-          <p:cNvPr id="125" name="Straight Connector 124">
-            <a:extLst>
-              <a:ext uri="{FF2B5EF4-FFF2-40B4-BE49-F238E27FC236}">
-                <a16:creationId xmlns:a16="http://schemas.microsoft.com/office/drawing/2014/main" id="{B4818C73-50B7-4001-ABEB-E7ECAA88AF8C}"/>
-              </a:ext>
-            </a:extLst>
-          </p:cNvPr>
-          <p:cNvCxnSpPr>
-            <a:cxnSpLocks/>
-          </p:cNvCxnSpPr>
-          <p:nvPr/>
-        </p:nvCxnSpPr>
-        <p:spPr>
-          <a:xfrm flipV="1">
-            <a:off x="1023050" y="431231"/>
-            <a:ext cx="0" cy="2016000"/>
-          </a:xfrm>
-          <a:prstGeom prst="line">
-            <a:avLst/>
-          </a:prstGeom>
-          <a:ln w="3175">
-            <a:solidFill>
-              <a:schemeClr val="bg1">
-                <a:lumMod val="85000"/>
-              </a:schemeClr>
-            </a:solidFill>
-          </a:ln>
-        </p:spPr>
-        <p:style>
-          <a:lnRef idx="1">
-            <a:schemeClr val="accent1"/>
-          </a:lnRef>
-          <a:fillRef idx="0">
-            <a:schemeClr val="accent1"/>
-          </a:fillRef>
-          <a:effectRef idx="0">
-            <a:schemeClr val="accent1"/>
-          </a:effectRef>
-          <a:fontRef idx="minor">
-            <a:schemeClr val="tx1"/>
-          </a:fontRef>
-        </p:style>
-      </p:cxnSp>
-      <p:cxnSp>
-        <p:nvCxnSpPr>
-          <p:cNvPr id="126" name="Straight Connector 125">
-            <a:extLst>
-              <a:ext uri="{FF2B5EF4-FFF2-40B4-BE49-F238E27FC236}">
-                <a16:creationId xmlns:a16="http://schemas.microsoft.com/office/drawing/2014/main" id="{D6EDD5C8-3336-4EA3-BD8D-9C243DDB7FBD}"/>
-              </a:ext>
-            </a:extLst>
-          </p:cNvPr>
-          <p:cNvCxnSpPr>
-            <a:cxnSpLocks/>
-          </p:cNvCxnSpPr>
-          <p:nvPr/>
-        </p:nvCxnSpPr>
-        <p:spPr>
-          <a:xfrm flipV="1">
-            <a:off x="1289198" y="431231"/>
-            <a:ext cx="0" cy="2016000"/>
-          </a:xfrm>
-          <a:prstGeom prst="line">
-            <a:avLst/>
-          </a:prstGeom>
-          <a:ln w="3175">
-            <a:solidFill>
-              <a:schemeClr val="bg1">
-                <a:lumMod val="85000"/>
-              </a:schemeClr>
-            </a:solidFill>
-          </a:ln>
-        </p:spPr>
-        <p:style>
-          <a:lnRef idx="1">
-            <a:schemeClr val="accent1"/>
-          </a:lnRef>
-          <a:fillRef idx="0">
-            <a:schemeClr val="accent1"/>
-          </a:fillRef>
-          <a:effectRef idx="0">
-            <a:schemeClr val="accent1"/>
-          </a:effectRef>
-          <a:fontRef idx="minor">
-            <a:schemeClr val="tx1"/>
-          </a:fontRef>
-        </p:style>
-      </p:cxnSp>
-      <p:cxnSp>
-        <p:nvCxnSpPr>
-          <p:cNvPr id="127" name="Straight Connector 126">
-            <a:extLst>
-              <a:ext uri="{FF2B5EF4-FFF2-40B4-BE49-F238E27FC236}">
-                <a16:creationId xmlns:a16="http://schemas.microsoft.com/office/drawing/2014/main" id="{69A33F02-114D-49FA-9DC0-E92B504966D4}"/>
-              </a:ext>
-            </a:extLst>
-          </p:cNvPr>
-          <p:cNvCxnSpPr>
-            <a:cxnSpLocks/>
-          </p:cNvCxnSpPr>
-          <p:nvPr/>
-        </p:nvCxnSpPr>
-        <p:spPr>
-          <a:xfrm flipV="1">
-            <a:off x="889976" y="431231"/>
-            <a:ext cx="0" cy="2016000"/>
-          </a:xfrm>
-          <a:prstGeom prst="line">
-            <a:avLst/>
-          </a:prstGeom>
-          <a:ln w="3175">
-            <a:solidFill>
-              <a:schemeClr val="bg1">
-                <a:lumMod val="85000"/>
-              </a:schemeClr>
-            </a:solidFill>
-          </a:ln>
-        </p:spPr>
-        <p:style>
-          <a:lnRef idx="1">
-            <a:schemeClr val="accent1"/>
-          </a:lnRef>
-          <a:fillRef idx="0">
-            <a:schemeClr val="accent1"/>
-          </a:fillRef>
-          <a:effectRef idx="0">
-            <a:schemeClr val="accent1"/>
-          </a:effectRef>
-          <a:fontRef idx="minor">
-            <a:schemeClr val="tx1"/>
-          </a:fontRef>
-        </p:style>
-      </p:cxnSp>
-      <p:cxnSp>
-        <p:nvCxnSpPr>
-          <p:cNvPr id="128" name="Straight Connector 127">
-            <a:extLst>
-              <a:ext uri="{FF2B5EF4-FFF2-40B4-BE49-F238E27FC236}">
-                <a16:creationId xmlns:a16="http://schemas.microsoft.com/office/drawing/2014/main" id="{8301B603-9482-4ED2-8F83-76DE781BCBA1}"/>
-              </a:ext>
-            </a:extLst>
-          </p:cNvPr>
-          <p:cNvCxnSpPr>
-            <a:cxnSpLocks/>
-          </p:cNvCxnSpPr>
-          <p:nvPr/>
-        </p:nvCxnSpPr>
-        <p:spPr>
-          <a:xfrm flipV="1">
-            <a:off x="1156124" y="431231"/>
-            <a:ext cx="0" cy="2016000"/>
-          </a:xfrm>
-          <a:prstGeom prst="line">
-            <a:avLst/>
-          </a:prstGeom>
-          <a:ln w="3175">
-            <a:solidFill>
-              <a:schemeClr val="bg1">
-                <a:lumMod val="85000"/>
-              </a:schemeClr>
-            </a:solidFill>
-          </a:ln>
-        </p:spPr>
-        <p:style>
-          <a:lnRef idx="1">
-            <a:schemeClr val="accent1"/>
-          </a:lnRef>
-          <a:fillRef idx="0">
-            <a:schemeClr val="accent1"/>
-          </a:fillRef>
-          <a:effectRef idx="0">
-            <a:schemeClr val="accent1"/>
-          </a:effectRef>
-          <a:fontRef idx="minor">
-            <a:schemeClr val="tx1"/>
-          </a:fontRef>
-        </p:style>
-      </p:cxnSp>
-      <p:sp>
-        <p:nvSpPr>
-          <p:cNvPr id="10" name="Rectangle 9">
-            <a:extLst>
-              <a:ext uri="{FF2B5EF4-FFF2-40B4-BE49-F238E27FC236}">
-                <a16:creationId xmlns:a16="http://schemas.microsoft.com/office/drawing/2014/main" id="{2D225424-BB11-4468-B2E7-0EC0AA14DDE6}"/>
-              </a:ext>
-            </a:extLst>
-          </p:cNvPr>
-          <p:cNvSpPr/>
-          <p:nvPr/>
-        </p:nvSpPr>
-        <p:spPr>
-          <a:xfrm>
-            <a:off x="418641" y="431231"/>
-            <a:ext cx="2599200" cy="2044800"/>
-          </a:xfrm>
-          <a:prstGeom prst="rect">
-            <a:avLst/>
-          </a:prstGeom>
-          <a:noFill/>
-          <a:ln w="6350">
-            <a:solidFill>
-              <a:schemeClr val="bg1">
-                <a:lumMod val="85000"/>
-              </a:schemeClr>
-            </a:solidFill>
-          </a:ln>
-        </p:spPr>
-        <p:style>
-          <a:lnRef idx="2">
-            <a:schemeClr val="accent1">
-              <a:shade val="50000"/>
-            </a:schemeClr>
-          </a:lnRef>
-          <a:fillRef idx="1">
-            <a:schemeClr val="accent1"/>
-          </a:fillRef>
-          <a:effectRef idx="0">
-            <a:schemeClr val="accent1"/>
-          </a:effectRef>
-          <a:fontRef idx="minor">
-            <a:schemeClr val="lt1"/>
-          </a:fontRef>
-        </p:style>
-        <p:txBody>
-          <a:bodyPr rtlCol="0" anchor="ctr"/>
-          <a:lstStyle/>
-          <a:p>
-            <a:pPr algn="ctr"/>
-            <a:endParaRPr lang="en-GB"/>
-          </a:p>
-        </p:txBody>
-      </p:sp>
-      <p:cxnSp>
-        <p:nvCxnSpPr>
-          <p:cNvPr id="129" name="Straight Connector 128">
-            <a:extLst>
-              <a:ext uri="{FF2B5EF4-FFF2-40B4-BE49-F238E27FC236}">
-                <a16:creationId xmlns:a16="http://schemas.microsoft.com/office/drawing/2014/main" id="{720985E9-3FD9-4AC5-A937-A35B5C0EE3DD}"/>
-              </a:ext>
-            </a:extLst>
-          </p:cNvPr>
-          <p:cNvCxnSpPr>
-            <a:cxnSpLocks/>
-          </p:cNvCxnSpPr>
-          <p:nvPr/>
-        </p:nvCxnSpPr>
-        <p:spPr>
-          <a:xfrm flipH="1">
-            <a:off x="459954" y="1798197"/>
-            <a:ext cx="2557889" cy="0"/>
-          </a:xfrm>
-          <a:prstGeom prst="line">
-            <a:avLst/>
-          </a:prstGeom>
-          <a:ln w="3175">
-            <a:solidFill>
-              <a:schemeClr val="bg1">
-                <a:lumMod val="85000"/>
-              </a:schemeClr>
-            </a:solidFill>
-          </a:ln>
-        </p:spPr>
-        <p:style>
-          <a:lnRef idx="1">
-            <a:schemeClr val="accent1"/>
-          </a:lnRef>
-          <a:fillRef idx="0">
-            <a:schemeClr val="accent1"/>
-          </a:fillRef>
-          <a:effectRef idx="0">
-            <a:schemeClr val="accent1"/>
-          </a:effectRef>
-          <a:fontRef idx="minor">
-            <a:schemeClr val="tx1"/>
-          </a:fontRef>
-        </p:style>
-      </p:cxnSp>
-      <p:cxnSp>
-        <p:nvCxnSpPr>
-          <p:cNvPr id="130" name="Straight Connector 129">
-            <a:extLst>
-              <a:ext uri="{FF2B5EF4-FFF2-40B4-BE49-F238E27FC236}">
-                <a16:creationId xmlns:a16="http://schemas.microsoft.com/office/drawing/2014/main" id="{C271842B-5A19-4B4B-8CA9-3BEF69DE3995}"/>
-              </a:ext>
-            </a:extLst>
-          </p:cNvPr>
-          <p:cNvCxnSpPr>
-            <a:cxnSpLocks/>
-          </p:cNvCxnSpPr>
-          <p:nvPr/>
-        </p:nvCxnSpPr>
-        <p:spPr>
-          <a:xfrm flipH="1">
-            <a:off x="459954" y="1457592"/>
-            <a:ext cx="2557889" cy="0"/>
-          </a:xfrm>
-          <a:prstGeom prst="line">
-            <a:avLst/>
-          </a:prstGeom>
-          <a:ln w="3175">
-            <a:solidFill>
-              <a:schemeClr val="bg1">
-                <a:lumMod val="85000"/>
-              </a:schemeClr>
-            </a:solidFill>
-          </a:ln>
-        </p:spPr>
-        <p:style>
-          <a:lnRef idx="1">
-            <a:schemeClr val="accent1"/>
-          </a:lnRef>
-          <a:fillRef idx="0">
-            <a:schemeClr val="accent1"/>
-          </a:fillRef>
-          <a:effectRef idx="0">
-            <a:schemeClr val="accent1"/>
-          </a:effectRef>
-          <a:fontRef idx="minor">
-            <a:schemeClr val="tx1"/>
-          </a:fontRef>
-        </p:style>
-      </p:cxnSp>
-      <p:cxnSp>
-        <p:nvCxnSpPr>
-          <p:cNvPr id="131" name="Straight Connector 130">
-            <a:extLst>
-              <a:ext uri="{FF2B5EF4-FFF2-40B4-BE49-F238E27FC236}">
-                <a16:creationId xmlns:a16="http://schemas.microsoft.com/office/drawing/2014/main" id="{3B78EF68-0462-4676-8BE2-F578098E6645}"/>
-              </a:ext>
-            </a:extLst>
-          </p:cNvPr>
-          <p:cNvCxnSpPr>
-            <a:cxnSpLocks/>
-          </p:cNvCxnSpPr>
-          <p:nvPr/>
-        </p:nvCxnSpPr>
-        <p:spPr>
-          <a:xfrm flipH="1">
-            <a:off x="459954" y="1116069"/>
-            <a:ext cx="2557889" cy="0"/>
-          </a:xfrm>
-          <a:prstGeom prst="line">
-            <a:avLst/>
-          </a:prstGeom>
-          <a:ln w="3175">
-            <a:solidFill>
-              <a:schemeClr val="bg1">
-                <a:lumMod val="85000"/>
-              </a:schemeClr>
-            </a:solidFill>
-          </a:ln>
-        </p:spPr>
-        <p:style>
-          <a:lnRef idx="1">
-            <a:schemeClr val="accent1"/>
-          </a:lnRef>
-          <a:fillRef idx="0">
-            <a:schemeClr val="accent1"/>
-          </a:fillRef>
-          <a:effectRef idx="0">
-            <a:schemeClr val="accent1"/>
-          </a:effectRef>
-          <a:fontRef idx="minor">
-            <a:schemeClr val="tx1"/>
-          </a:fontRef>
-        </p:style>
-      </p:cxnSp>
-      <p:cxnSp>
-        <p:nvCxnSpPr>
-          <p:cNvPr id="132" name="Straight Connector 131">
-            <a:extLst>
-              <a:ext uri="{FF2B5EF4-FFF2-40B4-BE49-F238E27FC236}">
-                <a16:creationId xmlns:a16="http://schemas.microsoft.com/office/drawing/2014/main" id="{34D9085C-5EF4-4A1C-810A-D63FD9359E76}"/>
-              </a:ext>
-            </a:extLst>
-          </p:cNvPr>
-          <p:cNvCxnSpPr>
-            <a:cxnSpLocks/>
-          </p:cNvCxnSpPr>
-          <p:nvPr/>
-        </p:nvCxnSpPr>
-        <p:spPr>
-          <a:xfrm flipH="1">
-            <a:off x="459954" y="772710"/>
-            <a:ext cx="2557889" cy="0"/>
-          </a:xfrm>
-          <a:prstGeom prst="line">
-            <a:avLst/>
-          </a:prstGeom>
-          <a:ln w="3175">
-            <a:solidFill>
-              <a:schemeClr val="bg1">
-                <a:lumMod val="85000"/>
-              </a:schemeClr>
-            </a:solidFill>
-          </a:ln>
-        </p:spPr>
-        <p:style>
-          <a:lnRef idx="1">
-            <a:schemeClr val="accent1"/>
-          </a:lnRef>
-          <a:fillRef idx="0">
-            <a:schemeClr val="accent1"/>
-          </a:fillRef>
-          <a:effectRef idx="0">
-            <a:schemeClr val="accent1"/>
-          </a:effectRef>
-          <a:fontRef idx="minor">
-            <a:schemeClr val="tx1"/>
-          </a:fontRef>
-        </p:style>
-      </p:cxnSp>
-      <p:cxnSp>
-        <p:nvCxnSpPr>
-          <p:cNvPr id="133" name="Straight Connector 132">
-            <a:extLst>
-              <a:ext uri="{FF2B5EF4-FFF2-40B4-BE49-F238E27FC236}">
-                <a16:creationId xmlns:a16="http://schemas.microsoft.com/office/drawing/2014/main" id="{918D9089-A0F9-4716-8941-1A5174365348}"/>
-              </a:ext>
-            </a:extLst>
-          </p:cNvPr>
-          <p:cNvCxnSpPr>
-            <a:cxnSpLocks/>
-          </p:cNvCxnSpPr>
-          <p:nvPr/>
-        </p:nvCxnSpPr>
-        <p:spPr>
-          <a:xfrm flipH="1">
-            <a:off x="418642" y="2137884"/>
-            <a:ext cx="2599199" cy="0"/>
-          </a:xfrm>
-          <a:prstGeom prst="line">
-            <a:avLst/>
-          </a:prstGeom>
-          <a:ln w="19050">
-            <a:solidFill>
-              <a:schemeClr val="accent2">
-                <a:lumMod val="75000"/>
-              </a:schemeClr>
-            </a:solidFill>
-          </a:ln>
-        </p:spPr>
-        <p:style>
-          <a:lnRef idx="1">
-            <a:schemeClr val="accent1"/>
-          </a:lnRef>
-          <a:fillRef idx="0">
-            <a:schemeClr val="accent1"/>
-          </a:fillRef>
-          <a:effectRef idx="0">
-            <a:schemeClr val="accent1"/>
-          </a:effectRef>
-          <a:fontRef idx="minor">
-            <a:schemeClr val="tx1"/>
-          </a:fontRef>
-        </p:style>
-      </p:cxnSp>
-      <p:sp>
-        <p:nvSpPr>
-          <p:cNvPr id="88" name="TextBox 87">
-            <a:extLst>
-              <a:ext uri="{FF2B5EF4-FFF2-40B4-BE49-F238E27FC236}">
-                <a16:creationId xmlns:a16="http://schemas.microsoft.com/office/drawing/2014/main" id="{6B46E34C-7AEE-46D7-9232-D2BE0C957E6E}"/>
-              </a:ext>
-            </a:extLst>
-          </p:cNvPr>
-          <p:cNvSpPr txBox="1"/>
-          <p:nvPr/>
-        </p:nvSpPr>
-        <p:spPr>
-          <a:xfrm>
-            <a:off x="1795630" y="2055807"/>
-            <a:ext cx="1152000" cy="338554"/>
+            <a:off x="1954500" y="2191388"/>
+            <a:ext cx="1152000" cy="215444"/>
           </a:xfrm>
           <a:prstGeom prst="rect">
             <a:avLst/>
@@ -7026,32 +4499,17 @@
             <a:pPr algn="ctr"/>
             <a:r>
               <a:rPr lang="en-GB" sz="800" dirty="0"/>
-              <a:t>85</a:t>
-            </a:r>
-            <a:r>
-              <a:rPr lang="en-GB" sz="800" baseline="30000" dirty="0"/>
-              <a:t>th</a:t>
-            </a:r>
-            <a:r>
-              <a:rPr lang="en-GB" sz="800" dirty="0"/>
-              <a:t> percentile</a:t>
-            </a:r>
-          </a:p>
-          <a:p>
-            <a:pPr algn="ctr"/>
-            <a:r>
-              <a:rPr lang="en-GB" sz="800" dirty="0"/>
-              <a:t>(tp &gt;= 9.419 mm/12h)</a:t>
-            </a:r>
-          </a:p>
-        </p:txBody>
-      </p:sp>
-      <p:sp>
-        <p:nvSpPr>
-          <p:cNvPr id="134" name="TextBox 133">
+              <a:t>tp &gt;= 9.419 mm/12h</a:t>
+            </a:r>
+          </a:p>
+        </p:txBody>
+      </p:sp>
+      <p:sp>
+        <p:nvSpPr>
+          <p:cNvPr id="28" name="TextBox 27">
             <a:extLst>
               <a:ext uri="{FF2B5EF4-FFF2-40B4-BE49-F238E27FC236}">
-                <a16:creationId xmlns:a16="http://schemas.microsoft.com/office/drawing/2014/main" id="{7E134258-FBD3-4275-B9A4-D69865C2A1A2}"/>
+                <a16:creationId xmlns:a16="http://schemas.microsoft.com/office/drawing/2014/main" id="{1B6DC95C-2A65-4E12-B9B5-6FA072B768AD}"/>
               </a:ext>
             </a:extLst>
           </p:cNvPr>
@@ -7059,9 +4517,9 @@
           <p:nvPr/>
         </p:nvSpPr>
         <p:spPr>
-          <a:xfrm>
-            <a:off x="368078" y="1957336"/>
-            <a:ext cx="537872" cy="215444"/>
+          <a:xfrm rot="16200000">
+            <a:off x="-636861" y="3667697"/>
+            <a:ext cx="1966466" cy="215444"/>
           </a:xfrm>
           <a:prstGeom prst="rect">
             <a:avLst/>
@@ -7074,15 +4532,98 @@
           </a:bodyPr>
           <a:lstStyle/>
           <a:p>
-            <a:r>
-              <a:rPr lang="en-GB" sz="800" b="1" dirty="0">
-                <a:solidFill>
-                  <a:schemeClr val="accent2">
-                    <a:lumMod val="75000"/>
-                  </a:schemeClr>
-                </a:solidFill>
-              </a:rPr>
-              <a:t>No Skill</a:t>
+            <a:pPr algn="ctr"/>
+            <a:r>
+              <a:rPr lang="en-GB" sz="800" dirty="0"/>
+              <a:t>Area under the ROC</a:t>
+            </a:r>
+          </a:p>
+        </p:txBody>
+      </p:sp>
+      <p:sp>
+        <p:nvSpPr>
+          <p:cNvPr id="29" name="TextBox 28">
+            <a:extLst>
+              <a:ext uri="{FF2B5EF4-FFF2-40B4-BE49-F238E27FC236}">
+                <a16:creationId xmlns:a16="http://schemas.microsoft.com/office/drawing/2014/main" id="{7E9D24DC-2D99-4FC8-9293-BBA859DAD20B}"/>
+              </a:ext>
+            </a:extLst>
+          </p:cNvPr>
+          <p:cNvSpPr txBox="1"/>
+          <p:nvPr/>
+        </p:nvSpPr>
+        <p:spPr>
+          <a:xfrm rot="16200000">
+            <a:off x="-856004" y="1351107"/>
+            <a:ext cx="1966466" cy="246221"/>
+          </a:xfrm>
+          <a:prstGeom prst="rect">
+            <a:avLst/>
+          </a:prstGeom>
+          <a:noFill/>
+        </p:spPr>
+        <p:txBody>
+          <a:bodyPr wrap="square" rtlCol="0">
+            <a:spAutoFit/>
+          </a:bodyPr>
+          <a:lstStyle/>
+          <a:p>
+            <a:pPr algn="ctr"/>
+            <a:r>
+              <a:rPr lang="en-GB" sz="1000" b="1" dirty="0"/>
+              <a:t>85</a:t>
+            </a:r>
+            <a:r>
+              <a:rPr lang="en-GB" sz="1000" b="1" baseline="30000" dirty="0"/>
+              <a:t>th</a:t>
+            </a:r>
+            <a:r>
+              <a:rPr lang="en-GB" sz="1000" b="1" dirty="0"/>
+              <a:t> percentile</a:t>
+            </a:r>
+          </a:p>
+        </p:txBody>
+      </p:sp>
+      <p:sp>
+        <p:nvSpPr>
+          <p:cNvPr id="30" name="TextBox 29">
+            <a:extLst>
+              <a:ext uri="{FF2B5EF4-FFF2-40B4-BE49-F238E27FC236}">
+                <a16:creationId xmlns:a16="http://schemas.microsoft.com/office/drawing/2014/main" id="{98873132-B7AF-401D-96F8-984F7D17D771}"/>
+              </a:ext>
+            </a:extLst>
+          </p:cNvPr>
+          <p:cNvSpPr txBox="1"/>
+          <p:nvPr/>
+        </p:nvSpPr>
+        <p:spPr>
+          <a:xfrm rot="16200000">
+            <a:off x="-856004" y="3652309"/>
+            <a:ext cx="1966466" cy="246221"/>
+          </a:xfrm>
+          <a:prstGeom prst="rect">
+            <a:avLst/>
+          </a:prstGeom>
+          <a:noFill/>
+        </p:spPr>
+        <p:txBody>
+          <a:bodyPr wrap="square" rtlCol="0">
+            <a:spAutoFit/>
+          </a:bodyPr>
+          <a:lstStyle/>
+          <a:p>
+            <a:pPr algn="ctr"/>
+            <a:r>
+              <a:rPr lang="en-GB" sz="1000" b="1" dirty="0"/>
+              <a:t>99</a:t>
+            </a:r>
+            <a:r>
+              <a:rPr lang="en-GB" sz="1000" b="1" baseline="30000" dirty="0"/>
+              <a:t>th</a:t>
+            </a:r>
+            <a:r>
+              <a:rPr lang="en-GB" sz="1000" b="1" dirty="0"/>
+              <a:t> percentile</a:t>
             </a:r>
           </a:p>
         </p:txBody>
@@ -7090,7 +4631,7 @@
     </p:spTree>
     <p:extLst>
       <p:ext uri="{BB962C8B-B14F-4D97-AF65-F5344CB8AC3E}">
-        <p14:creationId xmlns:p14="http://schemas.microsoft.com/office/powerpoint/2010/main" val="4285056876"/>
+        <p14:creationId xmlns:p14="http://schemas.microsoft.com/office/powerpoint/2010/main" val="1489261767"/>
       </p:ext>
     </p:extLst>
   </p:cSld>

</xml_diff>